<commit_message>
Update AlignTest test cases
</commit_message>
<xml_diff>
--- a/doc/test/PositionsLab/PositionsLabAlign.pptx
+++ b/doc/test/PositionsLab/PositionsLabAlign.pptx
@@ -27,20 +27,20 @@
     <p:sldId id="307" r:id="rId21"/>
     <p:sldId id="308" r:id="rId22"/>
     <p:sldId id="312" r:id="rId23"/>
-    <p:sldId id="319" r:id="rId24"/>
-    <p:sldId id="320" r:id="rId25"/>
-    <p:sldId id="321" r:id="rId26"/>
-    <p:sldId id="322" r:id="rId27"/>
-    <p:sldId id="323" r:id="rId28"/>
-    <p:sldId id="324" r:id="rId29"/>
-    <p:sldId id="325" r:id="rId30"/>
-    <p:sldId id="309" r:id="rId31"/>
-    <p:sldId id="313" r:id="rId32"/>
-    <p:sldId id="314" r:id="rId33"/>
-    <p:sldId id="315" r:id="rId34"/>
-    <p:sldId id="310" r:id="rId35"/>
-    <p:sldId id="316" r:id="rId36"/>
-    <p:sldId id="317" r:id="rId37"/>
+    <p:sldId id="326" r:id="rId24"/>
+    <p:sldId id="327" r:id="rId25"/>
+    <p:sldId id="328" r:id="rId26"/>
+    <p:sldId id="329" r:id="rId27"/>
+    <p:sldId id="330" r:id="rId28"/>
+    <p:sldId id="331" r:id="rId29"/>
+    <p:sldId id="332" r:id="rId30"/>
+    <p:sldId id="333" r:id="rId31"/>
+    <p:sldId id="334" r:id="rId32"/>
+    <p:sldId id="335" r:id="rId33"/>
+    <p:sldId id="336" r:id="rId34"/>
+    <p:sldId id="337" r:id="rId35"/>
+    <p:sldId id="338" r:id="rId36"/>
+    <p:sldId id="339" r:id="rId37"/>
     <p:sldId id="274" r:id="rId38"/>
   </p:sldIdLst>
   <p:sldSz cx="9144000" cy="6858000" type="screen4x3"/>
@@ -169,20 +169,20 @@
             <p14:sldId id="307"/>
             <p14:sldId id="308"/>
             <p14:sldId id="312"/>
-            <p14:sldId id="319"/>
-            <p14:sldId id="320"/>
-            <p14:sldId id="321"/>
-            <p14:sldId id="322"/>
-            <p14:sldId id="323"/>
-            <p14:sldId id="324"/>
-            <p14:sldId id="325"/>
-            <p14:sldId id="309"/>
-            <p14:sldId id="313"/>
-            <p14:sldId id="314"/>
-            <p14:sldId id="315"/>
-            <p14:sldId id="310"/>
-            <p14:sldId id="316"/>
-            <p14:sldId id="317"/>
+            <p14:sldId id="326"/>
+            <p14:sldId id="327"/>
+            <p14:sldId id="328"/>
+            <p14:sldId id="329"/>
+            <p14:sldId id="330"/>
+            <p14:sldId id="331"/>
+            <p14:sldId id="332"/>
+            <p14:sldId id="333"/>
+            <p14:sldId id="334"/>
+            <p14:sldId id="335"/>
+            <p14:sldId id="336"/>
+            <p14:sldId id="337"/>
+            <p14:sldId id="338"/>
+            <p14:sldId id="339"/>
             <p14:sldId id="274"/>
           </p14:sldIdLst>
         </p14:section>
@@ -374,7 +374,7 @@
           <a:p>
             <a:fld id="{699DC775-C286-4358-8C92-D7E584E969B3}" type="datetimeFigureOut">
               <a:rPr lang="en-US" smtClean="0"/>
-              <a:t>3/17/2016</a:t>
+              <a:t>3/24/2016</a:t>
             </a:fld>
             <a:endParaRPr lang="en-US"/>
           </a:p>
@@ -542,7 +542,7 @@
           <a:p>
             <a:fld id="{699DC775-C286-4358-8C92-D7E584E969B3}" type="datetimeFigureOut">
               <a:rPr lang="en-US" smtClean="0"/>
-              <a:t>3/17/2016</a:t>
+              <a:t>3/24/2016</a:t>
             </a:fld>
             <a:endParaRPr lang="en-US"/>
           </a:p>
@@ -720,7 +720,7 @@
           <a:p>
             <a:fld id="{699DC775-C286-4358-8C92-D7E584E969B3}" type="datetimeFigureOut">
               <a:rPr lang="en-US" smtClean="0"/>
-              <a:t>3/17/2016</a:t>
+              <a:t>3/24/2016</a:t>
             </a:fld>
             <a:endParaRPr lang="en-US"/>
           </a:p>
@@ -960,7 +960,7 @@
           <a:p>
             <a:fld id="{699DC775-C286-4358-8C92-D7E584E969B3}" type="datetimeFigureOut">
               <a:rPr lang="en-US" smtClean="0"/>
-              <a:t>3/17/2016</a:t>
+              <a:t>3/24/2016</a:t>
             </a:fld>
             <a:endParaRPr lang="en-US"/>
           </a:p>
@@ -1128,7 +1128,7 @@
           <a:p>
             <a:fld id="{699DC775-C286-4358-8C92-D7E584E969B3}" type="datetimeFigureOut">
               <a:rPr lang="en-US" smtClean="0"/>
-              <a:t>3/17/2016</a:t>
+              <a:t>3/24/2016</a:t>
             </a:fld>
             <a:endParaRPr lang="en-US"/>
           </a:p>
@@ -1373,7 +1373,7 @@
           <a:p>
             <a:fld id="{699DC775-C286-4358-8C92-D7E584E969B3}" type="datetimeFigureOut">
               <a:rPr lang="en-US" smtClean="0"/>
-              <a:t>3/17/2016</a:t>
+              <a:t>3/24/2016</a:t>
             </a:fld>
             <a:endParaRPr lang="en-US"/>
           </a:p>
@@ -1658,7 +1658,7 @@
           <a:p>
             <a:fld id="{699DC775-C286-4358-8C92-D7E584E969B3}" type="datetimeFigureOut">
               <a:rPr lang="en-US" smtClean="0"/>
-              <a:t>3/17/2016</a:t>
+              <a:t>3/24/2016</a:t>
             </a:fld>
             <a:endParaRPr lang="en-US"/>
           </a:p>
@@ -2077,7 +2077,7 @@
           <a:p>
             <a:fld id="{699DC775-C286-4358-8C92-D7E584E969B3}" type="datetimeFigureOut">
               <a:rPr lang="en-US" smtClean="0"/>
-              <a:t>3/17/2016</a:t>
+              <a:t>3/24/2016</a:t>
             </a:fld>
             <a:endParaRPr lang="en-US"/>
           </a:p>
@@ -2194,7 +2194,7 @@
           <a:p>
             <a:fld id="{699DC775-C286-4358-8C92-D7E584E969B3}" type="datetimeFigureOut">
               <a:rPr lang="en-US" smtClean="0"/>
-              <a:t>3/17/2016</a:t>
+              <a:t>3/24/2016</a:t>
             </a:fld>
             <a:endParaRPr lang="en-US"/>
           </a:p>
@@ -2289,7 +2289,7 @@
           <a:p>
             <a:fld id="{699DC775-C286-4358-8C92-D7E584E969B3}" type="datetimeFigureOut">
               <a:rPr lang="en-US" smtClean="0"/>
-              <a:t>3/17/2016</a:t>
+              <a:t>3/24/2016</a:t>
             </a:fld>
             <a:endParaRPr lang="en-US"/>
           </a:p>
@@ -2564,7 +2564,7 @@
           <a:p>
             <a:fld id="{699DC775-C286-4358-8C92-D7E584E969B3}" type="datetimeFigureOut">
               <a:rPr lang="en-US" smtClean="0"/>
-              <a:t>3/17/2016</a:t>
+              <a:t>3/24/2016</a:t>
             </a:fld>
             <a:endParaRPr lang="en-US"/>
           </a:p>
@@ -2732,7 +2732,7 @@
           <a:p>
             <a:fld id="{699DC775-C286-4358-8C92-D7E584E969B3}" type="datetimeFigureOut">
               <a:rPr lang="en-US" smtClean="0"/>
-              <a:t>3/17/2016</a:t>
+              <a:t>3/24/2016</a:t>
             </a:fld>
             <a:endParaRPr lang="en-US"/>
           </a:p>
@@ -2984,7 +2984,7 @@
           <a:p>
             <a:fld id="{699DC775-C286-4358-8C92-D7E584E969B3}" type="datetimeFigureOut">
               <a:rPr lang="en-US" smtClean="0"/>
-              <a:t>3/17/2016</a:t>
+              <a:t>3/24/2016</a:t>
             </a:fld>
             <a:endParaRPr lang="en-US"/>
           </a:p>
@@ -3152,7 +3152,7 @@
           <a:p>
             <a:fld id="{699DC775-C286-4358-8C92-D7E584E969B3}" type="datetimeFigureOut">
               <a:rPr lang="en-US" smtClean="0"/>
-              <a:t>3/17/2016</a:t>
+              <a:t>3/24/2016</a:t>
             </a:fld>
             <a:endParaRPr lang="en-US"/>
           </a:p>
@@ -3330,7 +3330,7 @@
           <a:p>
             <a:fld id="{699DC775-C286-4358-8C92-D7E584E969B3}" type="datetimeFigureOut">
               <a:rPr lang="en-US" smtClean="0"/>
-              <a:t>3/17/2016</a:t>
+              <a:t>3/24/2016</a:t>
             </a:fld>
             <a:endParaRPr lang="en-US"/>
           </a:p>
@@ -3578,7 +3578,7 @@
           <a:p>
             <a:fld id="{699DC775-C286-4358-8C92-D7E584E969B3}" type="datetimeFigureOut">
               <a:rPr lang="en-US" smtClean="0"/>
-              <a:t>3/17/2016</a:t>
+              <a:t>3/24/2016</a:t>
             </a:fld>
             <a:endParaRPr lang="en-US"/>
           </a:p>
@@ -3754,7 +3754,7 @@
           <a:p>
             <a:fld id="{699DC775-C286-4358-8C92-D7E584E969B3}" type="datetimeFigureOut">
               <a:rPr lang="en-US" smtClean="0"/>
-              <a:t>3/17/2016</a:t>
+              <a:t>3/24/2016</a:t>
             </a:fld>
             <a:endParaRPr lang="en-US"/>
           </a:p>
@@ -4007,7 +4007,7 @@
           <a:p>
             <a:fld id="{699DC775-C286-4358-8C92-D7E584E969B3}" type="datetimeFigureOut">
               <a:rPr lang="en-US" smtClean="0"/>
-              <a:t>3/17/2016</a:t>
+              <a:t>3/24/2016</a:t>
             </a:fld>
             <a:endParaRPr lang="en-US"/>
           </a:p>
@@ -4300,7 +4300,7 @@
           <a:p>
             <a:fld id="{699DC775-C286-4358-8C92-D7E584E969B3}" type="datetimeFigureOut">
               <a:rPr lang="en-US" smtClean="0"/>
-              <a:t>3/17/2016</a:t>
+              <a:t>3/24/2016</a:t>
             </a:fld>
             <a:endParaRPr lang="en-US"/>
           </a:p>
@@ -4727,7 +4727,7 @@
           <a:p>
             <a:fld id="{699DC775-C286-4358-8C92-D7E584E969B3}" type="datetimeFigureOut">
               <a:rPr lang="en-US" smtClean="0"/>
-              <a:t>3/17/2016</a:t>
+              <a:t>3/24/2016</a:t>
             </a:fld>
             <a:endParaRPr lang="en-US"/>
           </a:p>
@@ -4852,7 +4852,7 @@
           <a:p>
             <a:fld id="{699DC775-C286-4358-8C92-D7E584E969B3}" type="datetimeFigureOut">
               <a:rPr lang="en-US" smtClean="0"/>
-              <a:t>3/17/2016</a:t>
+              <a:t>3/24/2016</a:t>
             </a:fld>
             <a:endParaRPr lang="en-US"/>
           </a:p>
@@ -4955,7 +4955,7 @@
           <a:p>
             <a:fld id="{699DC775-C286-4358-8C92-D7E584E969B3}" type="datetimeFigureOut">
               <a:rPr lang="en-US" smtClean="0"/>
-              <a:t>3/17/2016</a:t>
+              <a:t>3/24/2016</a:t>
             </a:fld>
             <a:endParaRPr lang="en-US"/>
           </a:p>
@@ -5200,7 +5200,7 @@
           <a:p>
             <a:fld id="{699DC775-C286-4358-8C92-D7E584E969B3}" type="datetimeFigureOut">
               <a:rPr lang="en-US" smtClean="0"/>
-              <a:t>3/17/2016</a:t>
+              <a:t>3/24/2016</a:t>
             </a:fld>
             <a:endParaRPr lang="en-US"/>
           </a:p>
@@ -5483,7 +5483,7 @@
           <a:p>
             <a:fld id="{699DC775-C286-4358-8C92-D7E584E969B3}" type="datetimeFigureOut">
               <a:rPr lang="en-US" smtClean="0"/>
-              <a:t>3/17/2016</a:t>
+              <a:t>3/24/2016</a:t>
             </a:fld>
             <a:endParaRPr lang="en-US"/>
           </a:p>
@@ -5743,7 +5743,7 @@
           <a:p>
             <a:fld id="{699DC775-C286-4358-8C92-D7E584E969B3}" type="datetimeFigureOut">
               <a:rPr lang="en-US" smtClean="0"/>
-              <a:t>3/17/2016</a:t>
+              <a:t>3/24/2016</a:t>
             </a:fld>
             <a:endParaRPr lang="en-US"/>
           </a:p>
@@ -5919,7 +5919,7 @@
           <a:p>
             <a:fld id="{699DC775-C286-4358-8C92-D7E584E969B3}" type="datetimeFigureOut">
               <a:rPr lang="en-US" smtClean="0"/>
-              <a:t>3/17/2016</a:t>
+              <a:t>3/24/2016</a:t>
             </a:fld>
             <a:endParaRPr lang="en-US"/>
           </a:p>
@@ -6105,7 +6105,7 @@
           <a:p>
             <a:fld id="{699DC775-C286-4358-8C92-D7E584E969B3}" type="datetimeFigureOut">
               <a:rPr lang="en-US" smtClean="0"/>
-              <a:t>3/17/2016</a:t>
+              <a:t>3/24/2016</a:t>
             </a:fld>
             <a:endParaRPr lang="en-US"/>
           </a:p>
@@ -6390,7 +6390,7 @@
           <a:p>
             <a:fld id="{699DC775-C286-4358-8C92-D7E584E969B3}" type="datetimeFigureOut">
               <a:rPr lang="en-US" smtClean="0"/>
-              <a:t>3/17/2016</a:t>
+              <a:t>3/24/2016</a:t>
             </a:fld>
             <a:endParaRPr lang="en-US"/>
           </a:p>
@@ -6809,7 +6809,7 @@
           <a:p>
             <a:fld id="{699DC775-C286-4358-8C92-D7E584E969B3}" type="datetimeFigureOut">
               <a:rPr lang="en-US" smtClean="0"/>
-              <a:t>3/17/2016</a:t>
+              <a:t>3/24/2016</a:t>
             </a:fld>
             <a:endParaRPr lang="en-US"/>
           </a:p>
@@ -6926,7 +6926,7 @@
           <a:p>
             <a:fld id="{699DC775-C286-4358-8C92-D7E584E969B3}" type="datetimeFigureOut">
               <a:rPr lang="en-US" smtClean="0"/>
-              <a:t>3/17/2016</a:t>
+              <a:t>3/24/2016</a:t>
             </a:fld>
             <a:endParaRPr lang="en-US"/>
           </a:p>
@@ -7021,7 +7021,7 @@
           <a:p>
             <a:fld id="{699DC775-C286-4358-8C92-D7E584E969B3}" type="datetimeFigureOut">
               <a:rPr lang="en-US" smtClean="0"/>
-              <a:t>3/17/2016</a:t>
+              <a:t>3/24/2016</a:t>
             </a:fld>
             <a:endParaRPr lang="en-US"/>
           </a:p>
@@ -7296,7 +7296,7 @@
           <a:p>
             <a:fld id="{699DC775-C286-4358-8C92-D7E584E969B3}" type="datetimeFigureOut">
               <a:rPr lang="en-US" smtClean="0"/>
-              <a:t>3/17/2016</a:t>
+              <a:t>3/24/2016</a:t>
             </a:fld>
             <a:endParaRPr lang="en-US"/>
           </a:p>
@@ -7548,7 +7548,7 @@
           <a:p>
             <a:fld id="{699DC775-C286-4358-8C92-D7E584E969B3}" type="datetimeFigureOut">
               <a:rPr lang="en-US" smtClean="0"/>
-              <a:t>3/17/2016</a:t>
+              <a:t>3/24/2016</a:t>
             </a:fld>
             <a:endParaRPr lang="en-US"/>
           </a:p>
@@ -7759,7 +7759,7 @@
           <a:p>
             <a:fld id="{699DC775-C286-4358-8C92-D7E584E969B3}" type="datetimeFigureOut">
               <a:rPr lang="en-US" smtClean="0"/>
-              <a:t>3/17/2016</a:t>
+              <a:t>3/24/2016</a:t>
             </a:fld>
             <a:endParaRPr lang="en-US"/>
           </a:p>
@@ -8272,7 +8272,7 @@
           <a:p>
             <a:fld id="{699DC775-C286-4358-8C92-D7E584E969B3}" type="datetimeFigureOut">
               <a:rPr lang="en-US" smtClean="0"/>
-              <a:t>3/17/2016</a:t>
+              <a:t>3/24/2016</a:t>
             </a:fld>
             <a:endParaRPr lang="en-US"/>
           </a:p>
@@ -8783,7 +8783,7 @@
           <a:p>
             <a:fld id="{699DC775-C286-4358-8C92-D7E584E969B3}" type="datetimeFigureOut">
               <a:rPr lang="en-US" smtClean="0"/>
-              <a:t>3/17/2016</a:t>
+              <a:t>3/24/2016</a:t>
             </a:fld>
             <a:endParaRPr lang="en-US"/>
           </a:p>
@@ -14739,136 +14739,13 @@
           <p:nvPr/>
         </p:nvSpPr>
         <p:spPr>
-          <a:xfrm>
-            <a:off x="0" y="3124200"/>
-            <a:ext cx="2121971" cy="2179084"/>
+          <a:xfrm rot="18672083">
+            <a:off x="146585" y="3604142"/>
+            <a:ext cx="1828800" cy="1219200"/>
           </a:xfrm>
-          <a:custGeom>
+          <a:prstGeom prst="rect">
             <a:avLst/>
-            <a:gdLst>
-              <a:gd name="connsiteX0" fmla="*/ 0 w 1828800"/>
-              <a:gd name="connsiteY0" fmla="*/ 0 h 1219200"/>
-              <a:gd name="connsiteX1" fmla="*/ 1828800 w 1828800"/>
-              <a:gd name="connsiteY1" fmla="*/ 0 h 1219200"/>
-              <a:gd name="connsiteX2" fmla="*/ 1828800 w 1828800"/>
-              <a:gd name="connsiteY2" fmla="*/ 1219200 h 1219200"/>
-              <a:gd name="connsiteX3" fmla="*/ 0 w 1828800"/>
-              <a:gd name="connsiteY3" fmla="*/ 1219200 h 1219200"/>
-              <a:gd name="connsiteX4" fmla="*/ 0 w 1828800"/>
-              <a:gd name="connsiteY4" fmla="*/ 0 h 1219200"/>
-              <a:gd name="connsiteX0" fmla="*/ 1975386 w 3804186"/>
-              <a:gd name="connsiteY0" fmla="*/ 3604142 h 4823342"/>
-              <a:gd name="connsiteX1" fmla="*/ 0 w 3804186"/>
-              <a:gd name="connsiteY1" fmla="*/ 0 h 4823342"/>
-              <a:gd name="connsiteX2" fmla="*/ 3804186 w 3804186"/>
-              <a:gd name="connsiteY2" fmla="*/ 3604142 h 4823342"/>
-              <a:gd name="connsiteX3" fmla="*/ 3804186 w 3804186"/>
-              <a:gd name="connsiteY3" fmla="*/ 4823342 h 4823342"/>
-              <a:gd name="connsiteX4" fmla="*/ 1975386 w 3804186"/>
-              <a:gd name="connsiteY4" fmla="*/ 4823342 h 4823342"/>
-              <a:gd name="connsiteX5" fmla="*/ 1975386 w 3804186"/>
-              <a:gd name="connsiteY5" fmla="*/ 3604142 h 4823342"/>
-              <a:gd name="connsiteX0" fmla="*/ 0 w 1828800"/>
-              <a:gd name="connsiteY0" fmla="*/ 0 h 1219200"/>
-              <a:gd name="connsiteX1" fmla="*/ 1828800 w 1828800"/>
-              <a:gd name="connsiteY1" fmla="*/ 0 h 1219200"/>
-              <a:gd name="connsiteX2" fmla="*/ 1828800 w 1828800"/>
-              <a:gd name="connsiteY2" fmla="*/ 1219200 h 1219200"/>
-              <a:gd name="connsiteX3" fmla="*/ 0 w 1828800"/>
-              <a:gd name="connsiteY3" fmla="*/ 1219200 h 1219200"/>
-              <a:gd name="connsiteX4" fmla="*/ 0 w 1828800"/>
-              <a:gd name="connsiteY4" fmla="*/ 0 h 1219200"/>
-              <a:gd name="connsiteX0" fmla="*/ 0 w 1975385"/>
-              <a:gd name="connsiteY0" fmla="*/ 896045 h 1219200"/>
-              <a:gd name="connsiteX1" fmla="*/ 1975385 w 1975385"/>
-              <a:gd name="connsiteY1" fmla="*/ 0 h 1219200"/>
-              <a:gd name="connsiteX2" fmla="*/ 1975385 w 1975385"/>
-              <a:gd name="connsiteY2" fmla="*/ 1219200 h 1219200"/>
-              <a:gd name="connsiteX3" fmla="*/ 146585 w 1975385"/>
-              <a:gd name="connsiteY3" fmla="*/ 1219200 h 1219200"/>
-              <a:gd name="connsiteX4" fmla="*/ 146585 w 1975385"/>
-              <a:gd name="connsiteY4" fmla="*/ 0 h 1219200"/>
-              <a:gd name="connsiteX0" fmla="*/ 0 w 1975385"/>
-              <a:gd name="connsiteY0" fmla="*/ 1375987 h 1699142"/>
-              <a:gd name="connsiteX1" fmla="*/ 1204646 w 1975385"/>
-              <a:gd name="connsiteY1" fmla="*/ 0 h 1699142"/>
-              <a:gd name="connsiteX2" fmla="*/ 1975385 w 1975385"/>
-              <a:gd name="connsiteY2" fmla="*/ 1699142 h 1699142"/>
-              <a:gd name="connsiteX3" fmla="*/ 146585 w 1975385"/>
-              <a:gd name="connsiteY3" fmla="*/ 1699142 h 1699142"/>
-              <a:gd name="connsiteX4" fmla="*/ 146585 w 1975385"/>
-              <a:gd name="connsiteY4" fmla="*/ 479942 h 1699142"/>
-              <a:gd name="connsiteX0" fmla="*/ 0 w 2121971"/>
-              <a:gd name="connsiteY0" fmla="*/ 1375987 h 1699142"/>
-              <a:gd name="connsiteX1" fmla="*/ 1204646 w 2121971"/>
-              <a:gd name="connsiteY1" fmla="*/ 0 h 1699142"/>
-              <a:gd name="connsiteX2" fmla="*/ 2121971 w 2121971"/>
-              <a:gd name="connsiteY2" fmla="*/ 803097 h 1699142"/>
-              <a:gd name="connsiteX3" fmla="*/ 146585 w 2121971"/>
-              <a:gd name="connsiteY3" fmla="*/ 1699142 h 1699142"/>
-              <a:gd name="connsiteX4" fmla="*/ 146585 w 2121971"/>
-              <a:gd name="connsiteY4" fmla="*/ 479942 h 1699142"/>
-              <a:gd name="connsiteX0" fmla="*/ 0 w 2121971"/>
-              <a:gd name="connsiteY0" fmla="*/ 1375987 h 2179084"/>
-              <a:gd name="connsiteX1" fmla="*/ 1204646 w 2121971"/>
-              <a:gd name="connsiteY1" fmla="*/ 0 h 2179084"/>
-              <a:gd name="connsiteX2" fmla="*/ 2121971 w 2121971"/>
-              <a:gd name="connsiteY2" fmla="*/ 803097 h 2179084"/>
-              <a:gd name="connsiteX3" fmla="*/ 917326 w 2121971"/>
-              <a:gd name="connsiteY3" fmla="*/ 2179084 h 2179084"/>
-              <a:gd name="connsiteX4" fmla="*/ 146585 w 2121971"/>
-              <a:gd name="connsiteY4" fmla="*/ 479942 h 2179084"/>
-              <a:gd name="connsiteX0" fmla="*/ 0 w 2121971"/>
-              <a:gd name="connsiteY0" fmla="*/ 1375987 h 2179084"/>
-              <a:gd name="connsiteX1" fmla="*/ 1204646 w 2121971"/>
-              <a:gd name="connsiteY1" fmla="*/ 0 h 2179084"/>
-              <a:gd name="connsiteX2" fmla="*/ 2121971 w 2121971"/>
-              <a:gd name="connsiteY2" fmla="*/ 803097 h 2179084"/>
-              <a:gd name="connsiteX3" fmla="*/ 917326 w 2121971"/>
-              <a:gd name="connsiteY3" fmla="*/ 2179084 h 2179084"/>
-              <a:gd name="connsiteX4" fmla="*/ 1 w 2121971"/>
-              <a:gd name="connsiteY4" fmla="*/ 1375987 h 2179084"/>
-            </a:gdLst>
-            <a:ahLst/>
-            <a:cxnLst>
-              <a:cxn ang="0">
-                <a:pos x="connsiteX0" y="connsiteY0"/>
-              </a:cxn>
-              <a:cxn ang="0">
-                <a:pos x="connsiteX1" y="connsiteY1"/>
-              </a:cxn>
-              <a:cxn ang="0">
-                <a:pos x="connsiteX2" y="connsiteY2"/>
-              </a:cxn>
-              <a:cxn ang="0">
-                <a:pos x="connsiteX3" y="connsiteY3"/>
-              </a:cxn>
-              <a:cxn ang="0">
-                <a:pos x="connsiteX4" y="connsiteY4"/>
-              </a:cxn>
-            </a:cxnLst>
-            <a:rect l="l" t="t" r="r" b="b"/>
-            <a:pathLst>
-              <a:path w="2121971" h="2179084">
-                <a:moveTo>
-                  <a:pt x="0" y="1375987"/>
-                </a:moveTo>
-                <a:lnTo>
-                  <a:pt x="1204646" y="0"/>
-                </a:lnTo>
-                <a:lnTo>
-                  <a:pt x="2121971" y="803097"/>
-                </a:lnTo>
-                <a:lnTo>
-                  <a:pt x="917326" y="2179084"/>
-                </a:lnTo>
-                <a:lnTo>
-                  <a:pt x="1" y="1375987"/>
-                </a:lnTo>
-                <a:close/>
-              </a:path>
-            </a:pathLst>
-          </a:custGeom>
+          </a:prstGeom>
         </p:spPr>
         <p:style>
           <a:lnRef idx="2">
@@ -14898,7 +14775,7 @@
     </p:spTree>
     <p:extLst>
       <p:ext uri="{BB962C8B-B14F-4D97-AF65-F5344CB8AC3E}">
-        <p14:creationId xmlns:p14="http://schemas.microsoft.com/office/powerpoint/2010/main" val="2400491414"/>
+        <p14:creationId xmlns:p14="http://schemas.microsoft.com/office/powerpoint/2010/main" val="1046166889"/>
       </p:ext>
     </p:extLst>
   </p:cSld>
@@ -15052,136 +14929,13 @@
           <p:nvPr/>
         </p:nvSpPr>
         <p:spPr>
-          <a:xfrm>
-            <a:off x="7022029" y="3124200"/>
-            <a:ext cx="2121971" cy="2179084"/>
+          <a:xfrm rot="18672083">
+            <a:off x="7168615" y="3604142"/>
+            <a:ext cx="1828800" cy="1219200"/>
           </a:xfrm>
-          <a:custGeom>
+          <a:prstGeom prst="rect">
             <a:avLst/>
-            <a:gdLst>
-              <a:gd name="connsiteX0" fmla="*/ 0 w 1828800"/>
-              <a:gd name="connsiteY0" fmla="*/ 0 h 1219200"/>
-              <a:gd name="connsiteX1" fmla="*/ 1828800 w 1828800"/>
-              <a:gd name="connsiteY1" fmla="*/ 0 h 1219200"/>
-              <a:gd name="connsiteX2" fmla="*/ 1828800 w 1828800"/>
-              <a:gd name="connsiteY2" fmla="*/ 1219200 h 1219200"/>
-              <a:gd name="connsiteX3" fmla="*/ 0 w 1828800"/>
-              <a:gd name="connsiteY3" fmla="*/ 1219200 h 1219200"/>
-              <a:gd name="connsiteX4" fmla="*/ 0 w 1828800"/>
-              <a:gd name="connsiteY4" fmla="*/ 0 h 1219200"/>
-              <a:gd name="connsiteX0" fmla="*/ 1975386 w 3804186"/>
-              <a:gd name="connsiteY0" fmla="*/ 3604142 h 4823342"/>
-              <a:gd name="connsiteX1" fmla="*/ 0 w 3804186"/>
-              <a:gd name="connsiteY1" fmla="*/ 0 h 4823342"/>
-              <a:gd name="connsiteX2" fmla="*/ 3804186 w 3804186"/>
-              <a:gd name="connsiteY2" fmla="*/ 3604142 h 4823342"/>
-              <a:gd name="connsiteX3" fmla="*/ 3804186 w 3804186"/>
-              <a:gd name="connsiteY3" fmla="*/ 4823342 h 4823342"/>
-              <a:gd name="connsiteX4" fmla="*/ 1975386 w 3804186"/>
-              <a:gd name="connsiteY4" fmla="*/ 4823342 h 4823342"/>
-              <a:gd name="connsiteX5" fmla="*/ 1975386 w 3804186"/>
-              <a:gd name="connsiteY5" fmla="*/ 3604142 h 4823342"/>
-              <a:gd name="connsiteX0" fmla="*/ 0 w 1828800"/>
-              <a:gd name="connsiteY0" fmla="*/ 0 h 1219200"/>
-              <a:gd name="connsiteX1" fmla="*/ 1828800 w 1828800"/>
-              <a:gd name="connsiteY1" fmla="*/ 0 h 1219200"/>
-              <a:gd name="connsiteX2" fmla="*/ 1828800 w 1828800"/>
-              <a:gd name="connsiteY2" fmla="*/ 1219200 h 1219200"/>
-              <a:gd name="connsiteX3" fmla="*/ 0 w 1828800"/>
-              <a:gd name="connsiteY3" fmla="*/ 1219200 h 1219200"/>
-              <a:gd name="connsiteX4" fmla="*/ 0 w 1828800"/>
-              <a:gd name="connsiteY4" fmla="*/ 0 h 1219200"/>
-              <a:gd name="connsiteX0" fmla="*/ 0 w 1975385"/>
-              <a:gd name="connsiteY0" fmla="*/ 896045 h 1219200"/>
-              <a:gd name="connsiteX1" fmla="*/ 1975385 w 1975385"/>
-              <a:gd name="connsiteY1" fmla="*/ 0 h 1219200"/>
-              <a:gd name="connsiteX2" fmla="*/ 1975385 w 1975385"/>
-              <a:gd name="connsiteY2" fmla="*/ 1219200 h 1219200"/>
-              <a:gd name="connsiteX3" fmla="*/ 146585 w 1975385"/>
-              <a:gd name="connsiteY3" fmla="*/ 1219200 h 1219200"/>
-              <a:gd name="connsiteX4" fmla="*/ 146585 w 1975385"/>
-              <a:gd name="connsiteY4" fmla="*/ 0 h 1219200"/>
-              <a:gd name="connsiteX0" fmla="*/ 0 w 1975385"/>
-              <a:gd name="connsiteY0" fmla="*/ 1375987 h 1699142"/>
-              <a:gd name="connsiteX1" fmla="*/ 1204646 w 1975385"/>
-              <a:gd name="connsiteY1" fmla="*/ 0 h 1699142"/>
-              <a:gd name="connsiteX2" fmla="*/ 1975385 w 1975385"/>
-              <a:gd name="connsiteY2" fmla="*/ 1699142 h 1699142"/>
-              <a:gd name="connsiteX3" fmla="*/ 146585 w 1975385"/>
-              <a:gd name="connsiteY3" fmla="*/ 1699142 h 1699142"/>
-              <a:gd name="connsiteX4" fmla="*/ 146585 w 1975385"/>
-              <a:gd name="connsiteY4" fmla="*/ 479942 h 1699142"/>
-              <a:gd name="connsiteX0" fmla="*/ 0 w 2121971"/>
-              <a:gd name="connsiteY0" fmla="*/ 1375987 h 1699142"/>
-              <a:gd name="connsiteX1" fmla="*/ 1204646 w 2121971"/>
-              <a:gd name="connsiteY1" fmla="*/ 0 h 1699142"/>
-              <a:gd name="connsiteX2" fmla="*/ 2121971 w 2121971"/>
-              <a:gd name="connsiteY2" fmla="*/ 803097 h 1699142"/>
-              <a:gd name="connsiteX3" fmla="*/ 146585 w 2121971"/>
-              <a:gd name="connsiteY3" fmla="*/ 1699142 h 1699142"/>
-              <a:gd name="connsiteX4" fmla="*/ 146585 w 2121971"/>
-              <a:gd name="connsiteY4" fmla="*/ 479942 h 1699142"/>
-              <a:gd name="connsiteX0" fmla="*/ 0 w 2121971"/>
-              <a:gd name="connsiteY0" fmla="*/ 1375987 h 2179084"/>
-              <a:gd name="connsiteX1" fmla="*/ 1204646 w 2121971"/>
-              <a:gd name="connsiteY1" fmla="*/ 0 h 2179084"/>
-              <a:gd name="connsiteX2" fmla="*/ 2121971 w 2121971"/>
-              <a:gd name="connsiteY2" fmla="*/ 803097 h 2179084"/>
-              <a:gd name="connsiteX3" fmla="*/ 917326 w 2121971"/>
-              <a:gd name="connsiteY3" fmla="*/ 2179084 h 2179084"/>
-              <a:gd name="connsiteX4" fmla="*/ 146585 w 2121971"/>
-              <a:gd name="connsiteY4" fmla="*/ 479942 h 2179084"/>
-              <a:gd name="connsiteX0" fmla="*/ 0 w 2121971"/>
-              <a:gd name="connsiteY0" fmla="*/ 1375987 h 2179084"/>
-              <a:gd name="connsiteX1" fmla="*/ 1204646 w 2121971"/>
-              <a:gd name="connsiteY1" fmla="*/ 0 h 2179084"/>
-              <a:gd name="connsiteX2" fmla="*/ 2121971 w 2121971"/>
-              <a:gd name="connsiteY2" fmla="*/ 803097 h 2179084"/>
-              <a:gd name="connsiteX3" fmla="*/ 917326 w 2121971"/>
-              <a:gd name="connsiteY3" fmla="*/ 2179084 h 2179084"/>
-              <a:gd name="connsiteX4" fmla="*/ 1 w 2121971"/>
-              <a:gd name="connsiteY4" fmla="*/ 1375987 h 2179084"/>
-            </a:gdLst>
-            <a:ahLst/>
-            <a:cxnLst>
-              <a:cxn ang="0">
-                <a:pos x="connsiteX0" y="connsiteY0"/>
-              </a:cxn>
-              <a:cxn ang="0">
-                <a:pos x="connsiteX1" y="connsiteY1"/>
-              </a:cxn>
-              <a:cxn ang="0">
-                <a:pos x="connsiteX2" y="connsiteY2"/>
-              </a:cxn>
-              <a:cxn ang="0">
-                <a:pos x="connsiteX3" y="connsiteY3"/>
-              </a:cxn>
-              <a:cxn ang="0">
-                <a:pos x="connsiteX4" y="connsiteY4"/>
-              </a:cxn>
-            </a:cxnLst>
-            <a:rect l="l" t="t" r="r" b="b"/>
-            <a:pathLst>
-              <a:path w="2121971" h="2179084">
-                <a:moveTo>
-                  <a:pt x="0" y="1375987"/>
-                </a:moveTo>
-                <a:lnTo>
-                  <a:pt x="1204646" y="0"/>
-                </a:lnTo>
-                <a:lnTo>
-                  <a:pt x="2121971" y="803097"/>
-                </a:lnTo>
-                <a:lnTo>
-                  <a:pt x="917326" y="2179084"/>
-                </a:lnTo>
-                <a:lnTo>
-                  <a:pt x="1" y="1375987"/>
-                </a:lnTo>
-                <a:close/>
-              </a:path>
-            </a:pathLst>
-          </a:custGeom>
+          </a:prstGeom>
         </p:spPr>
         <p:style>
           <a:lnRef idx="2">
@@ -15211,7 +14965,7 @@
     </p:spTree>
     <p:extLst>
       <p:ext uri="{BB962C8B-B14F-4D97-AF65-F5344CB8AC3E}">
-        <p14:creationId xmlns:p14="http://schemas.microsoft.com/office/powerpoint/2010/main" val="977832313"/>
+        <p14:creationId xmlns:p14="http://schemas.microsoft.com/office/powerpoint/2010/main" val="1374420218"/>
       </p:ext>
     </p:extLst>
   </p:cSld>
@@ -15365,136 +15119,13 @@
           <p:nvPr/>
         </p:nvSpPr>
         <p:spPr>
-          <a:xfrm>
-            <a:off x="1828800" y="0"/>
-            <a:ext cx="2121971" cy="2179084"/>
+          <a:xfrm rot="18672083">
+            <a:off x="1975386" y="479942"/>
+            <a:ext cx="1828800" cy="1219200"/>
           </a:xfrm>
-          <a:custGeom>
+          <a:prstGeom prst="rect">
             <a:avLst/>
-            <a:gdLst>
-              <a:gd name="connsiteX0" fmla="*/ 0 w 1828800"/>
-              <a:gd name="connsiteY0" fmla="*/ 0 h 1219200"/>
-              <a:gd name="connsiteX1" fmla="*/ 1828800 w 1828800"/>
-              <a:gd name="connsiteY1" fmla="*/ 0 h 1219200"/>
-              <a:gd name="connsiteX2" fmla="*/ 1828800 w 1828800"/>
-              <a:gd name="connsiteY2" fmla="*/ 1219200 h 1219200"/>
-              <a:gd name="connsiteX3" fmla="*/ 0 w 1828800"/>
-              <a:gd name="connsiteY3" fmla="*/ 1219200 h 1219200"/>
-              <a:gd name="connsiteX4" fmla="*/ 0 w 1828800"/>
-              <a:gd name="connsiteY4" fmla="*/ 0 h 1219200"/>
-              <a:gd name="connsiteX0" fmla="*/ 1975386 w 3804186"/>
-              <a:gd name="connsiteY0" fmla="*/ 3604142 h 4823342"/>
-              <a:gd name="connsiteX1" fmla="*/ 0 w 3804186"/>
-              <a:gd name="connsiteY1" fmla="*/ 0 h 4823342"/>
-              <a:gd name="connsiteX2" fmla="*/ 3804186 w 3804186"/>
-              <a:gd name="connsiteY2" fmla="*/ 3604142 h 4823342"/>
-              <a:gd name="connsiteX3" fmla="*/ 3804186 w 3804186"/>
-              <a:gd name="connsiteY3" fmla="*/ 4823342 h 4823342"/>
-              <a:gd name="connsiteX4" fmla="*/ 1975386 w 3804186"/>
-              <a:gd name="connsiteY4" fmla="*/ 4823342 h 4823342"/>
-              <a:gd name="connsiteX5" fmla="*/ 1975386 w 3804186"/>
-              <a:gd name="connsiteY5" fmla="*/ 3604142 h 4823342"/>
-              <a:gd name="connsiteX0" fmla="*/ 0 w 1828800"/>
-              <a:gd name="connsiteY0" fmla="*/ 0 h 1219200"/>
-              <a:gd name="connsiteX1" fmla="*/ 1828800 w 1828800"/>
-              <a:gd name="connsiteY1" fmla="*/ 0 h 1219200"/>
-              <a:gd name="connsiteX2" fmla="*/ 1828800 w 1828800"/>
-              <a:gd name="connsiteY2" fmla="*/ 1219200 h 1219200"/>
-              <a:gd name="connsiteX3" fmla="*/ 0 w 1828800"/>
-              <a:gd name="connsiteY3" fmla="*/ 1219200 h 1219200"/>
-              <a:gd name="connsiteX4" fmla="*/ 0 w 1828800"/>
-              <a:gd name="connsiteY4" fmla="*/ 0 h 1219200"/>
-              <a:gd name="connsiteX0" fmla="*/ 0 w 1975385"/>
-              <a:gd name="connsiteY0" fmla="*/ 896045 h 1219200"/>
-              <a:gd name="connsiteX1" fmla="*/ 1975385 w 1975385"/>
-              <a:gd name="connsiteY1" fmla="*/ 0 h 1219200"/>
-              <a:gd name="connsiteX2" fmla="*/ 1975385 w 1975385"/>
-              <a:gd name="connsiteY2" fmla="*/ 1219200 h 1219200"/>
-              <a:gd name="connsiteX3" fmla="*/ 146585 w 1975385"/>
-              <a:gd name="connsiteY3" fmla="*/ 1219200 h 1219200"/>
-              <a:gd name="connsiteX4" fmla="*/ 146585 w 1975385"/>
-              <a:gd name="connsiteY4" fmla="*/ 0 h 1219200"/>
-              <a:gd name="connsiteX0" fmla="*/ 0 w 1975385"/>
-              <a:gd name="connsiteY0" fmla="*/ 1375987 h 1699142"/>
-              <a:gd name="connsiteX1" fmla="*/ 1204646 w 1975385"/>
-              <a:gd name="connsiteY1" fmla="*/ 0 h 1699142"/>
-              <a:gd name="connsiteX2" fmla="*/ 1975385 w 1975385"/>
-              <a:gd name="connsiteY2" fmla="*/ 1699142 h 1699142"/>
-              <a:gd name="connsiteX3" fmla="*/ 146585 w 1975385"/>
-              <a:gd name="connsiteY3" fmla="*/ 1699142 h 1699142"/>
-              <a:gd name="connsiteX4" fmla="*/ 146585 w 1975385"/>
-              <a:gd name="connsiteY4" fmla="*/ 479942 h 1699142"/>
-              <a:gd name="connsiteX0" fmla="*/ 0 w 2121971"/>
-              <a:gd name="connsiteY0" fmla="*/ 1375987 h 1699142"/>
-              <a:gd name="connsiteX1" fmla="*/ 1204646 w 2121971"/>
-              <a:gd name="connsiteY1" fmla="*/ 0 h 1699142"/>
-              <a:gd name="connsiteX2" fmla="*/ 2121971 w 2121971"/>
-              <a:gd name="connsiteY2" fmla="*/ 803097 h 1699142"/>
-              <a:gd name="connsiteX3" fmla="*/ 146585 w 2121971"/>
-              <a:gd name="connsiteY3" fmla="*/ 1699142 h 1699142"/>
-              <a:gd name="connsiteX4" fmla="*/ 146585 w 2121971"/>
-              <a:gd name="connsiteY4" fmla="*/ 479942 h 1699142"/>
-              <a:gd name="connsiteX0" fmla="*/ 0 w 2121971"/>
-              <a:gd name="connsiteY0" fmla="*/ 1375987 h 2179084"/>
-              <a:gd name="connsiteX1" fmla="*/ 1204646 w 2121971"/>
-              <a:gd name="connsiteY1" fmla="*/ 0 h 2179084"/>
-              <a:gd name="connsiteX2" fmla="*/ 2121971 w 2121971"/>
-              <a:gd name="connsiteY2" fmla="*/ 803097 h 2179084"/>
-              <a:gd name="connsiteX3" fmla="*/ 917326 w 2121971"/>
-              <a:gd name="connsiteY3" fmla="*/ 2179084 h 2179084"/>
-              <a:gd name="connsiteX4" fmla="*/ 146585 w 2121971"/>
-              <a:gd name="connsiteY4" fmla="*/ 479942 h 2179084"/>
-              <a:gd name="connsiteX0" fmla="*/ 0 w 2121971"/>
-              <a:gd name="connsiteY0" fmla="*/ 1375987 h 2179084"/>
-              <a:gd name="connsiteX1" fmla="*/ 1204646 w 2121971"/>
-              <a:gd name="connsiteY1" fmla="*/ 0 h 2179084"/>
-              <a:gd name="connsiteX2" fmla="*/ 2121971 w 2121971"/>
-              <a:gd name="connsiteY2" fmla="*/ 803097 h 2179084"/>
-              <a:gd name="connsiteX3" fmla="*/ 917326 w 2121971"/>
-              <a:gd name="connsiteY3" fmla="*/ 2179084 h 2179084"/>
-              <a:gd name="connsiteX4" fmla="*/ 1 w 2121971"/>
-              <a:gd name="connsiteY4" fmla="*/ 1375987 h 2179084"/>
-            </a:gdLst>
-            <a:ahLst/>
-            <a:cxnLst>
-              <a:cxn ang="0">
-                <a:pos x="connsiteX0" y="connsiteY0"/>
-              </a:cxn>
-              <a:cxn ang="0">
-                <a:pos x="connsiteX1" y="connsiteY1"/>
-              </a:cxn>
-              <a:cxn ang="0">
-                <a:pos x="connsiteX2" y="connsiteY2"/>
-              </a:cxn>
-              <a:cxn ang="0">
-                <a:pos x="connsiteX3" y="connsiteY3"/>
-              </a:cxn>
-              <a:cxn ang="0">
-                <a:pos x="connsiteX4" y="connsiteY4"/>
-              </a:cxn>
-            </a:cxnLst>
-            <a:rect l="l" t="t" r="r" b="b"/>
-            <a:pathLst>
-              <a:path w="2121971" h="2179084">
-                <a:moveTo>
-                  <a:pt x="0" y="1375987"/>
-                </a:moveTo>
-                <a:lnTo>
-                  <a:pt x="1204646" y="0"/>
-                </a:lnTo>
-                <a:lnTo>
-                  <a:pt x="2121971" y="803097"/>
-                </a:lnTo>
-                <a:lnTo>
-                  <a:pt x="917326" y="2179084"/>
-                </a:lnTo>
-                <a:lnTo>
-                  <a:pt x="1" y="1375987"/>
-                </a:lnTo>
-                <a:close/>
-              </a:path>
-            </a:pathLst>
-          </a:custGeom>
+          </a:prstGeom>
         </p:spPr>
         <p:style>
           <a:lnRef idx="2">
@@ -15524,7 +15155,7 @@
     </p:spTree>
     <p:extLst>
       <p:ext uri="{BB962C8B-B14F-4D97-AF65-F5344CB8AC3E}">
-        <p14:creationId xmlns:p14="http://schemas.microsoft.com/office/powerpoint/2010/main" val="1309555773"/>
+        <p14:creationId xmlns:p14="http://schemas.microsoft.com/office/powerpoint/2010/main" val="3306132084"/>
       </p:ext>
     </p:extLst>
   </p:cSld>
@@ -15678,136 +15309,13 @@
           <p:nvPr/>
         </p:nvSpPr>
         <p:spPr>
-          <a:xfrm>
-            <a:off x="1828799" y="4678916"/>
-            <a:ext cx="2121971" cy="2179084"/>
+          <a:xfrm rot="18672083">
+            <a:off x="1975386" y="5158858"/>
+            <a:ext cx="1828800" cy="1219200"/>
           </a:xfrm>
-          <a:custGeom>
+          <a:prstGeom prst="rect">
             <a:avLst/>
-            <a:gdLst>
-              <a:gd name="connsiteX0" fmla="*/ 0 w 1828800"/>
-              <a:gd name="connsiteY0" fmla="*/ 0 h 1219200"/>
-              <a:gd name="connsiteX1" fmla="*/ 1828800 w 1828800"/>
-              <a:gd name="connsiteY1" fmla="*/ 0 h 1219200"/>
-              <a:gd name="connsiteX2" fmla="*/ 1828800 w 1828800"/>
-              <a:gd name="connsiteY2" fmla="*/ 1219200 h 1219200"/>
-              <a:gd name="connsiteX3" fmla="*/ 0 w 1828800"/>
-              <a:gd name="connsiteY3" fmla="*/ 1219200 h 1219200"/>
-              <a:gd name="connsiteX4" fmla="*/ 0 w 1828800"/>
-              <a:gd name="connsiteY4" fmla="*/ 0 h 1219200"/>
-              <a:gd name="connsiteX0" fmla="*/ 1975385 w 3804185"/>
-              <a:gd name="connsiteY0" fmla="*/ 3604142 h 4823342"/>
-              <a:gd name="connsiteX1" fmla="*/ 0 w 3804185"/>
-              <a:gd name="connsiteY1" fmla="*/ 0 h 4823342"/>
-              <a:gd name="connsiteX2" fmla="*/ 3804185 w 3804185"/>
-              <a:gd name="connsiteY2" fmla="*/ 3604142 h 4823342"/>
-              <a:gd name="connsiteX3" fmla="*/ 3804185 w 3804185"/>
-              <a:gd name="connsiteY3" fmla="*/ 4823342 h 4823342"/>
-              <a:gd name="connsiteX4" fmla="*/ 1975385 w 3804185"/>
-              <a:gd name="connsiteY4" fmla="*/ 4823342 h 4823342"/>
-              <a:gd name="connsiteX5" fmla="*/ 1975385 w 3804185"/>
-              <a:gd name="connsiteY5" fmla="*/ 3604142 h 4823342"/>
-              <a:gd name="connsiteX0" fmla="*/ 0 w 1828800"/>
-              <a:gd name="connsiteY0" fmla="*/ 0 h 1219200"/>
-              <a:gd name="connsiteX1" fmla="*/ 1828800 w 1828800"/>
-              <a:gd name="connsiteY1" fmla="*/ 0 h 1219200"/>
-              <a:gd name="connsiteX2" fmla="*/ 1828800 w 1828800"/>
-              <a:gd name="connsiteY2" fmla="*/ 1219200 h 1219200"/>
-              <a:gd name="connsiteX3" fmla="*/ 0 w 1828800"/>
-              <a:gd name="connsiteY3" fmla="*/ 1219200 h 1219200"/>
-              <a:gd name="connsiteX4" fmla="*/ 0 w 1828800"/>
-              <a:gd name="connsiteY4" fmla="*/ 0 h 1219200"/>
-              <a:gd name="connsiteX0" fmla="*/ 0 w 1975385"/>
-              <a:gd name="connsiteY0" fmla="*/ 896045 h 1219200"/>
-              <a:gd name="connsiteX1" fmla="*/ 1975385 w 1975385"/>
-              <a:gd name="connsiteY1" fmla="*/ 0 h 1219200"/>
-              <a:gd name="connsiteX2" fmla="*/ 1975385 w 1975385"/>
-              <a:gd name="connsiteY2" fmla="*/ 1219200 h 1219200"/>
-              <a:gd name="connsiteX3" fmla="*/ 146585 w 1975385"/>
-              <a:gd name="connsiteY3" fmla="*/ 1219200 h 1219200"/>
-              <a:gd name="connsiteX4" fmla="*/ 146585 w 1975385"/>
-              <a:gd name="connsiteY4" fmla="*/ 0 h 1219200"/>
-              <a:gd name="connsiteX0" fmla="*/ 0 w 1975385"/>
-              <a:gd name="connsiteY0" fmla="*/ 1375987 h 1699142"/>
-              <a:gd name="connsiteX1" fmla="*/ 1204646 w 1975385"/>
-              <a:gd name="connsiteY1" fmla="*/ 0 h 1699142"/>
-              <a:gd name="connsiteX2" fmla="*/ 1975385 w 1975385"/>
-              <a:gd name="connsiteY2" fmla="*/ 1699142 h 1699142"/>
-              <a:gd name="connsiteX3" fmla="*/ 146585 w 1975385"/>
-              <a:gd name="connsiteY3" fmla="*/ 1699142 h 1699142"/>
-              <a:gd name="connsiteX4" fmla="*/ 146585 w 1975385"/>
-              <a:gd name="connsiteY4" fmla="*/ 479942 h 1699142"/>
-              <a:gd name="connsiteX0" fmla="*/ 0 w 2121971"/>
-              <a:gd name="connsiteY0" fmla="*/ 1375987 h 1699142"/>
-              <a:gd name="connsiteX1" fmla="*/ 1204646 w 2121971"/>
-              <a:gd name="connsiteY1" fmla="*/ 0 h 1699142"/>
-              <a:gd name="connsiteX2" fmla="*/ 2121971 w 2121971"/>
-              <a:gd name="connsiteY2" fmla="*/ 803097 h 1699142"/>
-              <a:gd name="connsiteX3" fmla="*/ 146585 w 2121971"/>
-              <a:gd name="connsiteY3" fmla="*/ 1699142 h 1699142"/>
-              <a:gd name="connsiteX4" fmla="*/ 146585 w 2121971"/>
-              <a:gd name="connsiteY4" fmla="*/ 479942 h 1699142"/>
-              <a:gd name="connsiteX0" fmla="*/ 0 w 2121971"/>
-              <a:gd name="connsiteY0" fmla="*/ 1375987 h 2179084"/>
-              <a:gd name="connsiteX1" fmla="*/ 1204646 w 2121971"/>
-              <a:gd name="connsiteY1" fmla="*/ 0 h 2179084"/>
-              <a:gd name="connsiteX2" fmla="*/ 2121971 w 2121971"/>
-              <a:gd name="connsiteY2" fmla="*/ 803097 h 2179084"/>
-              <a:gd name="connsiteX3" fmla="*/ 917326 w 2121971"/>
-              <a:gd name="connsiteY3" fmla="*/ 2179084 h 2179084"/>
-              <a:gd name="connsiteX4" fmla="*/ 146585 w 2121971"/>
-              <a:gd name="connsiteY4" fmla="*/ 479942 h 2179084"/>
-              <a:gd name="connsiteX0" fmla="*/ 0 w 2121971"/>
-              <a:gd name="connsiteY0" fmla="*/ 1375987 h 2179084"/>
-              <a:gd name="connsiteX1" fmla="*/ 1204646 w 2121971"/>
-              <a:gd name="connsiteY1" fmla="*/ 0 h 2179084"/>
-              <a:gd name="connsiteX2" fmla="*/ 2121971 w 2121971"/>
-              <a:gd name="connsiteY2" fmla="*/ 803097 h 2179084"/>
-              <a:gd name="connsiteX3" fmla="*/ 917326 w 2121971"/>
-              <a:gd name="connsiteY3" fmla="*/ 2179084 h 2179084"/>
-              <a:gd name="connsiteX4" fmla="*/ 1 w 2121971"/>
-              <a:gd name="connsiteY4" fmla="*/ 1375987 h 2179084"/>
-            </a:gdLst>
-            <a:ahLst/>
-            <a:cxnLst>
-              <a:cxn ang="0">
-                <a:pos x="connsiteX0" y="connsiteY0"/>
-              </a:cxn>
-              <a:cxn ang="0">
-                <a:pos x="connsiteX1" y="connsiteY1"/>
-              </a:cxn>
-              <a:cxn ang="0">
-                <a:pos x="connsiteX2" y="connsiteY2"/>
-              </a:cxn>
-              <a:cxn ang="0">
-                <a:pos x="connsiteX3" y="connsiteY3"/>
-              </a:cxn>
-              <a:cxn ang="0">
-                <a:pos x="connsiteX4" y="connsiteY4"/>
-              </a:cxn>
-            </a:cxnLst>
-            <a:rect l="l" t="t" r="r" b="b"/>
-            <a:pathLst>
-              <a:path w="2121971" h="2179084">
-                <a:moveTo>
-                  <a:pt x="0" y="1375987"/>
-                </a:moveTo>
-                <a:lnTo>
-                  <a:pt x="1204646" y="0"/>
-                </a:lnTo>
-                <a:lnTo>
-                  <a:pt x="2121971" y="803097"/>
-                </a:lnTo>
-                <a:lnTo>
-                  <a:pt x="917326" y="2179084"/>
-                </a:lnTo>
-                <a:lnTo>
-                  <a:pt x="1" y="1375987"/>
-                </a:lnTo>
-                <a:close/>
-              </a:path>
-            </a:pathLst>
-          </a:custGeom>
+          </a:prstGeom>
         </p:spPr>
         <p:style>
           <a:lnRef idx="2">
@@ -15837,7 +15345,7 @@
     </p:spTree>
     <p:extLst>
       <p:ext uri="{BB962C8B-B14F-4D97-AF65-F5344CB8AC3E}">
-        <p14:creationId xmlns:p14="http://schemas.microsoft.com/office/powerpoint/2010/main" val="1517652953"/>
+        <p14:creationId xmlns:p14="http://schemas.microsoft.com/office/powerpoint/2010/main" val="282346367"/>
       </p:ext>
     </p:extLst>
   </p:cSld>
@@ -15991,136 +15499,13 @@
           <p:nvPr/>
         </p:nvSpPr>
         <p:spPr>
-          <a:xfrm>
-            <a:off x="1828800" y="2339458"/>
-            <a:ext cx="2121971" cy="2179084"/>
+          <a:xfrm rot="18672083">
+            <a:off x="1975386" y="2819400"/>
+            <a:ext cx="1828800" cy="1219200"/>
           </a:xfrm>
-          <a:custGeom>
+          <a:prstGeom prst="rect">
             <a:avLst/>
-            <a:gdLst>
-              <a:gd name="connsiteX0" fmla="*/ 0 w 1828800"/>
-              <a:gd name="connsiteY0" fmla="*/ 0 h 1219200"/>
-              <a:gd name="connsiteX1" fmla="*/ 1828800 w 1828800"/>
-              <a:gd name="connsiteY1" fmla="*/ 0 h 1219200"/>
-              <a:gd name="connsiteX2" fmla="*/ 1828800 w 1828800"/>
-              <a:gd name="connsiteY2" fmla="*/ 1219200 h 1219200"/>
-              <a:gd name="connsiteX3" fmla="*/ 0 w 1828800"/>
-              <a:gd name="connsiteY3" fmla="*/ 1219200 h 1219200"/>
-              <a:gd name="connsiteX4" fmla="*/ 0 w 1828800"/>
-              <a:gd name="connsiteY4" fmla="*/ 0 h 1219200"/>
-              <a:gd name="connsiteX0" fmla="*/ 1975386 w 3804186"/>
-              <a:gd name="connsiteY0" fmla="*/ 3604142 h 4823342"/>
-              <a:gd name="connsiteX1" fmla="*/ 0 w 3804186"/>
-              <a:gd name="connsiteY1" fmla="*/ 0 h 4823342"/>
-              <a:gd name="connsiteX2" fmla="*/ 3804186 w 3804186"/>
-              <a:gd name="connsiteY2" fmla="*/ 3604142 h 4823342"/>
-              <a:gd name="connsiteX3" fmla="*/ 3804186 w 3804186"/>
-              <a:gd name="connsiteY3" fmla="*/ 4823342 h 4823342"/>
-              <a:gd name="connsiteX4" fmla="*/ 1975386 w 3804186"/>
-              <a:gd name="connsiteY4" fmla="*/ 4823342 h 4823342"/>
-              <a:gd name="connsiteX5" fmla="*/ 1975386 w 3804186"/>
-              <a:gd name="connsiteY5" fmla="*/ 3604142 h 4823342"/>
-              <a:gd name="connsiteX0" fmla="*/ 0 w 1828800"/>
-              <a:gd name="connsiteY0" fmla="*/ 0 h 1219200"/>
-              <a:gd name="connsiteX1" fmla="*/ 1828800 w 1828800"/>
-              <a:gd name="connsiteY1" fmla="*/ 0 h 1219200"/>
-              <a:gd name="connsiteX2" fmla="*/ 1828800 w 1828800"/>
-              <a:gd name="connsiteY2" fmla="*/ 1219200 h 1219200"/>
-              <a:gd name="connsiteX3" fmla="*/ 0 w 1828800"/>
-              <a:gd name="connsiteY3" fmla="*/ 1219200 h 1219200"/>
-              <a:gd name="connsiteX4" fmla="*/ 0 w 1828800"/>
-              <a:gd name="connsiteY4" fmla="*/ 0 h 1219200"/>
-              <a:gd name="connsiteX0" fmla="*/ 0 w 1975385"/>
-              <a:gd name="connsiteY0" fmla="*/ 896045 h 1219200"/>
-              <a:gd name="connsiteX1" fmla="*/ 1975385 w 1975385"/>
-              <a:gd name="connsiteY1" fmla="*/ 0 h 1219200"/>
-              <a:gd name="connsiteX2" fmla="*/ 1975385 w 1975385"/>
-              <a:gd name="connsiteY2" fmla="*/ 1219200 h 1219200"/>
-              <a:gd name="connsiteX3" fmla="*/ 146585 w 1975385"/>
-              <a:gd name="connsiteY3" fmla="*/ 1219200 h 1219200"/>
-              <a:gd name="connsiteX4" fmla="*/ 146585 w 1975385"/>
-              <a:gd name="connsiteY4" fmla="*/ 0 h 1219200"/>
-              <a:gd name="connsiteX0" fmla="*/ 0 w 1975385"/>
-              <a:gd name="connsiteY0" fmla="*/ 1375987 h 1699142"/>
-              <a:gd name="connsiteX1" fmla="*/ 1204646 w 1975385"/>
-              <a:gd name="connsiteY1" fmla="*/ 0 h 1699142"/>
-              <a:gd name="connsiteX2" fmla="*/ 1975385 w 1975385"/>
-              <a:gd name="connsiteY2" fmla="*/ 1699142 h 1699142"/>
-              <a:gd name="connsiteX3" fmla="*/ 146585 w 1975385"/>
-              <a:gd name="connsiteY3" fmla="*/ 1699142 h 1699142"/>
-              <a:gd name="connsiteX4" fmla="*/ 146585 w 1975385"/>
-              <a:gd name="connsiteY4" fmla="*/ 479942 h 1699142"/>
-              <a:gd name="connsiteX0" fmla="*/ 0 w 2121971"/>
-              <a:gd name="connsiteY0" fmla="*/ 1375987 h 1699142"/>
-              <a:gd name="connsiteX1" fmla="*/ 1204646 w 2121971"/>
-              <a:gd name="connsiteY1" fmla="*/ 0 h 1699142"/>
-              <a:gd name="connsiteX2" fmla="*/ 2121971 w 2121971"/>
-              <a:gd name="connsiteY2" fmla="*/ 803097 h 1699142"/>
-              <a:gd name="connsiteX3" fmla="*/ 146585 w 2121971"/>
-              <a:gd name="connsiteY3" fmla="*/ 1699142 h 1699142"/>
-              <a:gd name="connsiteX4" fmla="*/ 146585 w 2121971"/>
-              <a:gd name="connsiteY4" fmla="*/ 479942 h 1699142"/>
-              <a:gd name="connsiteX0" fmla="*/ 0 w 2121971"/>
-              <a:gd name="connsiteY0" fmla="*/ 1375987 h 2179084"/>
-              <a:gd name="connsiteX1" fmla="*/ 1204646 w 2121971"/>
-              <a:gd name="connsiteY1" fmla="*/ 0 h 2179084"/>
-              <a:gd name="connsiteX2" fmla="*/ 2121971 w 2121971"/>
-              <a:gd name="connsiteY2" fmla="*/ 803097 h 2179084"/>
-              <a:gd name="connsiteX3" fmla="*/ 917326 w 2121971"/>
-              <a:gd name="connsiteY3" fmla="*/ 2179084 h 2179084"/>
-              <a:gd name="connsiteX4" fmla="*/ 146585 w 2121971"/>
-              <a:gd name="connsiteY4" fmla="*/ 479942 h 2179084"/>
-              <a:gd name="connsiteX0" fmla="*/ 0 w 2121971"/>
-              <a:gd name="connsiteY0" fmla="*/ 1375987 h 2179084"/>
-              <a:gd name="connsiteX1" fmla="*/ 1204646 w 2121971"/>
-              <a:gd name="connsiteY1" fmla="*/ 0 h 2179084"/>
-              <a:gd name="connsiteX2" fmla="*/ 2121971 w 2121971"/>
-              <a:gd name="connsiteY2" fmla="*/ 803097 h 2179084"/>
-              <a:gd name="connsiteX3" fmla="*/ 917326 w 2121971"/>
-              <a:gd name="connsiteY3" fmla="*/ 2179084 h 2179084"/>
-              <a:gd name="connsiteX4" fmla="*/ 1 w 2121971"/>
-              <a:gd name="connsiteY4" fmla="*/ 1375987 h 2179084"/>
-            </a:gdLst>
-            <a:ahLst/>
-            <a:cxnLst>
-              <a:cxn ang="0">
-                <a:pos x="connsiteX0" y="connsiteY0"/>
-              </a:cxn>
-              <a:cxn ang="0">
-                <a:pos x="connsiteX1" y="connsiteY1"/>
-              </a:cxn>
-              <a:cxn ang="0">
-                <a:pos x="connsiteX2" y="connsiteY2"/>
-              </a:cxn>
-              <a:cxn ang="0">
-                <a:pos x="connsiteX3" y="connsiteY3"/>
-              </a:cxn>
-              <a:cxn ang="0">
-                <a:pos x="connsiteX4" y="connsiteY4"/>
-              </a:cxn>
-            </a:cxnLst>
-            <a:rect l="l" t="t" r="r" b="b"/>
-            <a:pathLst>
-              <a:path w="2121971" h="2179084">
-                <a:moveTo>
-                  <a:pt x="0" y="1375987"/>
-                </a:moveTo>
-                <a:lnTo>
-                  <a:pt x="1204646" y="0"/>
-                </a:lnTo>
-                <a:lnTo>
-                  <a:pt x="2121971" y="803097"/>
-                </a:lnTo>
-                <a:lnTo>
-                  <a:pt x="917326" y="2179084"/>
-                </a:lnTo>
-                <a:lnTo>
-                  <a:pt x="1" y="1375987"/>
-                </a:lnTo>
-                <a:close/>
-              </a:path>
-            </a:pathLst>
-          </a:custGeom>
+          </a:prstGeom>
         </p:spPr>
         <p:style>
           <a:lnRef idx="2">
@@ -16150,7 +15535,7 @@
     </p:spTree>
     <p:extLst>
       <p:ext uri="{BB962C8B-B14F-4D97-AF65-F5344CB8AC3E}">
-        <p14:creationId xmlns:p14="http://schemas.microsoft.com/office/powerpoint/2010/main" val="2704575877"/>
+        <p14:creationId xmlns:p14="http://schemas.microsoft.com/office/powerpoint/2010/main" val="2932883338"/>
       </p:ext>
     </p:extLst>
   </p:cSld>
@@ -16304,136 +15689,13 @@
           <p:nvPr/>
         </p:nvSpPr>
         <p:spPr>
-          <a:xfrm>
-            <a:off x="3511015" y="3124200"/>
-            <a:ext cx="2121971" cy="2179084"/>
+          <a:xfrm rot="18672083">
+            <a:off x="3657600" y="3604142"/>
+            <a:ext cx="1828800" cy="1219200"/>
           </a:xfrm>
-          <a:custGeom>
+          <a:prstGeom prst="rect">
             <a:avLst/>
-            <a:gdLst>
-              <a:gd name="connsiteX0" fmla="*/ 0 w 1828800"/>
-              <a:gd name="connsiteY0" fmla="*/ 0 h 1219200"/>
-              <a:gd name="connsiteX1" fmla="*/ 1828800 w 1828800"/>
-              <a:gd name="connsiteY1" fmla="*/ 0 h 1219200"/>
-              <a:gd name="connsiteX2" fmla="*/ 1828800 w 1828800"/>
-              <a:gd name="connsiteY2" fmla="*/ 1219200 h 1219200"/>
-              <a:gd name="connsiteX3" fmla="*/ 0 w 1828800"/>
-              <a:gd name="connsiteY3" fmla="*/ 1219200 h 1219200"/>
-              <a:gd name="connsiteX4" fmla="*/ 0 w 1828800"/>
-              <a:gd name="connsiteY4" fmla="*/ 0 h 1219200"/>
-              <a:gd name="connsiteX0" fmla="*/ 1975386 w 3804186"/>
-              <a:gd name="connsiteY0" fmla="*/ 3604142 h 4823342"/>
-              <a:gd name="connsiteX1" fmla="*/ 0 w 3804186"/>
-              <a:gd name="connsiteY1" fmla="*/ 0 h 4823342"/>
-              <a:gd name="connsiteX2" fmla="*/ 3804186 w 3804186"/>
-              <a:gd name="connsiteY2" fmla="*/ 3604142 h 4823342"/>
-              <a:gd name="connsiteX3" fmla="*/ 3804186 w 3804186"/>
-              <a:gd name="connsiteY3" fmla="*/ 4823342 h 4823342"/>
-              <a:gd name="connsiteX4" fmla="*/ 1975386 w 3804186"/>
-              <a:gd name="connsiteY4" fmla="*/ 4823342 h 4823342"/>
-              <a:gd name="connsiteX5" fmla="*/ 1975386 w 3804186"/>
-              <a:gd name="connsiteY5" fmla="*/ 3604142 h 4823342"/>
-              <a:gd name="connsiteX0" fmla="*/ 0 w 1828800"/>
-              <a:gd name="connsiteY0" fmla="*/ 0 h 1219200"/>
-              <a:gd name="connsiteX1" fmla="*/ 1828800 w 1828800"/>
-              <a:gd name="connsiteY1" fmla="*/ 0 h 1219200"/>
-              <a:gd name="connsiteX2" fmla="*/ 1828800 w 1828800"/>
-              <a:gd name="connsiteY2" fmla="*/ 1219200 h 1219200"/>
-              <a:gd name="connsiteX3" fmla="*/ 0 w 1828800"/>
-              <a:gd name="connsiteY3" fmla="*/ 1219200 h 1219200"/>
-              <a:gd name="connsiteX4" fmla="*/ 0 w 1828800"/>
-              <a:gd name="connsiteY4" fmla="*/ 0 h 1219200"/>
-              <a:gd name="connsiteX0" fmla="*/ 0 w 1975385"/>
-              <a:gd name="connsiteY0" fmla="*/ 896045 h 1219200"/>
-              <a:gd name="connsiteX1" fmla="*/ 1975385 w 1975385"/>
-              <a:gd name="connsiteY1" fmla="*/ 0 h 1219200"/>
-              <a:gd name="connsiteX2" fmla="*/ 1975385 w 1975385"/>
-              <a:gd name="connsiteY2" fmla="*/ 1219200 h 1219200"/>
-              <a:gd name="connsiteX3" fmla="*/ 146585 w 1975385"/>
-              <a:gd name="connsiteY3" fmla="*/ 1219200 h 1219200"/>
-              <a:gd name="connsiteX4" fmla="*/ 146585 w 1975385"/>
-              <a:gd name="connsiteY4" fmla="*/ 0 h 1219200"/>
-              <a:gd name="connsiteX0" fmla="*/ 0 w 1975385"/>
-              <a:gd name="connsiteY0" fmla="*/ 1375987 h 1699142"/>
-              <a:gd name="connsiteX1" fmla="*/ 1204646 w 1975385"/>
-              <a:gd name="connsiteY1" fmla="*/ 0 h 1699142"/>
-              <a:gd name="connsiteX2" fmla="*/ 1975385 w 1975385"/>
-              <a:gd name="connsiteY2" fmla="*/ 1699142 h 1699142"/>
-              <a:gd name="connsiteX3" fmla="*/ 146585 w 1975385"/>
-              <a:gd name="connsiteY3" fmla="*/ 1699142 h 1699142"/>
-              <a:gd name="connsiteX4" fmla="*/ 146585 w 1975385"/>
-              <a:gd name="connsiteY4" fmla="*/ 479942 h 1699142"/>
-              <a:gd name="connsiteX0" fmla="*/ 0 w 2121971"/>
-              <a:gd name="connsiteY0" fmla="*/ 1375987 h 1699142"/>
-              <a:gd name="connsiteX1" fmla="*/ 1204646 w 2121971"/>
-              <a:gd name="connsiteY1" fmla="*/ 0 h 1699142"/>
-              <a:gd name="connsiteX2" fmla="*/ 2121971 w 2121971"/>
-              <a:gd name="connsiteY2" fmla="*/ 803097 h 1699142"/>
-              <a:gd name="connsiteX3" fmla="*/ 146585 w 2121971"/>
-              <a:gd name="connsiteY3" fmla="*/ 1699142 h 1699142"/>
-              <a:gd name="connsiteX4" fmla="*/ 146585 w 2121971"/>
-              <a:gd name="connsiteY4" fmla="*/ 479942 h 1699142"/>
-              <a:gd name="connsiteX0" fmla="*/ 0 w 2121971"/>
-              <a:gd name="connsiteY0" fmla="*/ 1375987 h 2179084"/>
-              <a:gd name="connsiteX1" fmla="*/ 1204646 w 2121971"/>
-              <a:gd name="connsiteY1" fmla="*/ 0 h 2179084"/>
-              <a:gd name="connsiteX2" fmla="*/ 2121971 w 2121971"/>
-              <a:gd name="connsiteY2" fmla="*/ 803097 h 2179084"/>
-              <a:gd name="connsiteX3" fmla="*/ 917326 w 2121971"/>
-              <a:gd name="connsiteY3" fmla="*/ 2179084 h 2179084"/>
-              <a:gd name="connsiteX4" fmla="*/ 146585 w 2121971"/>
-              <a:gd name="connsiteY4" fmla="*/ 479942 h 2179084"/>
-              <a:gd name="connsiteX0" fmla="*/ 0 w 2121971"/>
-              <a:gd name="connsiteY0" fmla="*/ 1375987 h 2179084"/>
-              <a:gd name="connsiteX1" fmla="*/ 1204646 w 2121971"/>
-              <a:gd name="connsiteY1" fmla="*/ 0 h 2179084"/>
-              <a:gd name="connsiteX2" fmla="*/ 2121971 w 2121971"/>
-              <a:gd name="connsiteY2" fmla="*/ 803097 h 2179084"/>
-              <a:gd name="connsiteX3" fmla="*/ 917326 w 2121971"/>
-              <a:gd name="connsiteY3" fmla="*/ 2179084 h 2179084"/>
-              <a:gd name="connsiteX4" fmla="*/ 1 w 2121971"/>
-              <a:gd name="connsiteY4" fmla="*/ 1375987 h 2179084"/>
-            </a:gdLst>
-            <a:ahLst/>
-            <a:cxnLst>
-              <a:cxn ang="0">
-                <a:pos x="connsiteX0" y="connsiteY0"/>
-              </a:cxn>
-              <a:cxn ang="0">
-                <a:pos x="connsiteX1" y="connsiteY1"/>
-              </a:cxn>
-              <a:cxn ang="0">
-                <a:pos x="connsiteX2" y="connsiteY2"/>
-              </a:cxn>
-              <a:cxn ang="0">
-                <a:pos x="connsiteX3" y="connsiteY3"/>
-              </a:cxn>
-              <a:cxn ang="0">
-                <a:pos x="connsiteX4" y="connsiteY4"/>
-              </a:cxn>
-            </a:cxnLst>
-            <a:rect l="l" t="t" r="r" b="b"/>
-            <a:pathLst>
-              <a:path w="2121971" h="2179084">
-                <a:moveTo>
-                  <a:pt x="0" y="1375987"/>
-                </a:moveTo>
-                <a:lnTo>
-                  <a:pt x="1204646" y="0"/>
-                </a:lnTo>
-                <a:lnTo>
-                  <a:pt x="2121971" y="803097"/>
-                </a:lnTo>
-                <a:lnTo>
-                  <a:pt x="917326" y="2179084"/>
-                </a:lnTo>
-                <a:lnTo>
-                  <a:pt x="1" y="1375987"/>
-                </a:lnTo>
-                <a:close/>
-              </a:path>
-            </a:pathLst>
-          </a:custGeom>
+          </a:prstGeom>
         </p:spPr>
         <p:style>
           <a:lnRef idx="2">
@@ -16463,7 +15725,7 @@
     </p:spTree>
     <p:extLst>
       <p:ext uri="{BB962C8B-B14F-4D97-AF65-F5344CB8AC3E}">
-        <p14:creationId xmlns:p14="http://schemas.microsoft.com/office/powerpoint/2010/main" val="4207998303"/>
+        <p14:creationId xmlns:p14="http://schemas.microsoft.com/office/powerpoint/2010/main" val="2192533724"/>
       </p:ext>
     </p:extLst>
   </p:cSld>
@@ -16617,136 +15879,13 @@
           <p:nvPr/>
         </p:nvSpPr>
         <p:spPr>
-          <a:xfrm>
-            <a:off x="3511015" y="2339458"/>
-            <a:ext cx="2121971" cy="2179084"/>
+          <a:xfrm rot="18672083">
+            <a:off x="3657600" y="2819400"/>
+            <a:ext cx="1828800" cy="1219200"/>
           </a:xfrm>
-          <a:custGeom>
+          <a:prstGeom prst="rect">
             <a:avLst/>
-            <a:gdLst>
-              <a:gd name="connsiteX0" fmla="*/ 0 w 1828800"/>
-              <a:gd name="connsiteY0" fmla="*/ 0 h 1219200"/>
-              <a:gd name="connsiteX1" fmla="*/ 1828800 w 1828800"/>
-              <a:gd name="connsiteY1" fmla="*/ 0 h 1219200"/>
-              <a:gd name="connsiteX2" fmla="*/ 1828800 w 1828800"/>
-              <a:gd name="connsiteY2" fmla="*/ 1219200 h 1219200"/>
-              <a:gd name="connsiteX3" fmla="*/ 0 w 1828800"/>
-              <a:gd name="connsiteY3" fmla="*/ 1219200 h 1219200"/>
-              <a:gd name="connsiteX4" fmla="*/ 0 w 1828800"/>
-              <a:gd name="connsiteY4" fmla="*/ 0 h 1219200"/>
-              <a:gd name="connsiteX0" fmla="*/ 1975386 w 3804186"/>
-              <a:gd name="connsiteY0" fmla="*/ 3604142 h 4823342"/>
-              <a:gd name="connsiteX1" fmla="*/ 0 w 3804186"/>
-              <a:gd name="connsiteY1" fmla="*/ 0 h 4823342"/>
-              <a:gd name="connsiteX2" fmla="*/ 3804186 w 3804186"/>
-              <a:gd name="connsiteY2" fmla="*/ 3604142 h 4823342"/>
-              <a:gd name="connsiteX3" fmla="*/ 3804186 w 3804186"/>
-              <a:gd name="connsiteY3" fmla="*/ 4823342 h 4823342"/>
-              <a:gd name="connsiteX4" fmla="*/ 1975386 w 3804186"/>
-              <a:gd name="connsiteY4" fmla="*/ 4823342 h 4823342"/>
-              <a:gd name="connsiteX5" fmla="*/ 1975386 w 3804186"/>
-              <a:gd name="connsiteY5" fmla="*/ 3604142 h 4823342"/>
-              <a:gd name="connsiteX0" fmla="*/ 0 w 1828800"/>
-              <a:gd name="connsiteY0" fmla="*/ 0 h 1219200"/>
-              <a:gd name="connsiteX1" fmla="*/ 1828800 w 1828800"/>
-              <a:gd name="connsiteY1" fmla="*/ 0 h 1219200"/>
-              <a:gd name="connsiteX2" fmla="*/ 1828800 w 1828800"/>
-              <a:gd name="connsiteY2" fmla="*/ 1219200 h 1219200"/>
-              <a:gd name="connsiteX3" fmla="*/ 0 w 1828800"/>
-              <a:gd name="connsiteY3" fmla="*/ 1219200 h 1219200"/>
-              <a:gd name="connsiteX4" fmla="*/ 0 w 1828800"/>
-              <a:gd name="connsiteY4" fmla="*/ 0 h 1219200"/>
-              <a:gd name="connsiteX0" fmla="*/ 0 w 1975385"/>
-              <a:gd name="connsiteY0" fmla="*/ 896045 h 1219200"/>
-              <a:gd name="connsiteX1" fmla="*/ 1975385 w 1975385"/>
-              <a:gd name="connsiteY1" fmla="*/ 0 h 1219200"/>
-              <a:gd name="connsiteX2" fmla="*/ 1975385 w 1975385"/>
-              <a:gd name="connsiteY2" fmla="*/ 1219200 h 1219200"/>
-              <a:gd name="connsiteX3" fmla="*/ 146585 w 1975385"/>
-              <a:gd name="connsiteY3" fmla="*/ 1219200 h 1219200"/>
-              <a:gd name="connsiteX4" fmla="*/ 146585 w 1975385"/>
-              <a:gd name="connsiteY4" fmla="*/ 0 h 1219200"/>
-              <a:gd name="connsiteX0" fmla="*/ 0 w 1975385"/>
-              <a:gd name="connsiteY0" fmla="*/ 1375987 h 1699142"/>
-              <a:gd name="connsiteX1" fmla="*/ 1204646 w 1975385"/>
-              <a:gd name="connsiteY1" fmla="*/ 0 h 1699142"/>
-              <a:gd name="connsiteX2" fmla="*/ 1975385 w 1975385"/>
-              <a:gd name="connsiteY2" fmla="*/ 1699142 h 1699142"/>
-              <a:gd name="connsiteX3" fmla="*/ 146585 w 1975385"/>
-              <a:gd name="connsiteY3" fmla="*/ 1699142 h 1699142"/>
-              <a:gd name="connsiteX4" fmla="*/ 146585 w 1975385"/>
-              <a:gd name="connsiteY4" fmla="*/ 479942 h 1699142"/>
-              <a:gd name="connsiteX0" fmla="*/ 0 w 2121971"/>
-              <a:gd name="connsiteY0" fmla="*/ 1375987 h 1699142"/>
-              <a:gd name="connsiteX1" fmla="*/ 1204646 w 2121971"/>
-              <a:gd name="connsiteY1" fmla="*/ 0 h 1699142"/>
-              <a:gd name="connsiteX2" fmla="*/ 2121971 w 2121971"/>
-              <a:gd name="connsiteY2" fmla="*/ 803097 h 1699142"/>
-              <a:gd name="connsiteX3" fmla="*/ 146585 w 2121971"/>
-              <a:gd name="connsiteY3" fmla="*/ 1699142 h 1699142"/>
-              <a:gd name="connsiteX4" fmla="*/ 146585 w 2121971"/>
-              <a:gd name="connsiteY4" fmla="*/ 479942 h 1699142"/>
-              <a:gd name="connsiteX0" fmla="*/ 0 w 2121971"/>
-              <a:gd name="connsiteY0" fmla="*/ 1375987 h 2179084"/>
-              <a:gd name="connsiteX1" fmla="*/ 1204646 w 2121971"/>
-              <a:gd name="connsiteY1" fmla="*/ 0 h 2179084"/>
-              <a:gd name="connsiteX2" fmla="*/ 2121971 w 2121971"/>
-              <a:gd name="connsiteY2" fmla="*/ 803097 h 2179084"/>
-              <a:gd name="connsiteX3" fmla="*/ 917326 w 2121971"/>
-              <a:gd name="connsiteY3" fmla="*/ 2179084 h 2179084"/>
-              <a:gd name="connsiteX4" fmla="*/ 146585 w 2121971"/>
-              <a:gd name="connsiteY4" fmla="*/ 479942 h 2179084"/>
-              <a:gd name="connsiteX0" fmla="*/ 0 w 2121971"/>
-              <a:gd name="connsiteY0" fmla="*/ 1375987 h 2179084"/>
-              <a:gd name="connsiteX1" fmla="*/ 1204646 w 2121971"/>
-              <a:gd name="connsiteY1" fmla="*/ 0 h 2179084"/>
-              <a:gd name="connsiteX2" fmla="*/ 2121971 w 2121971"/>
-              <a:gd name="connsiteY2" fmla="*/ 803097 h 2179084"/>
-              <a:gd name="connsiteX3" fmla="*/ 917326 w 2121971"/>
-              <a:gd name="connsiteY3" fmla="*/ 2179084 h 2179084"/>
-              <a:gd name="connsiteX4" fmla="*/ 1 w 2121971"/>
-              <a:gd name="connsiteY4" fmla="*/ 1375987 h 2179084"/>
-            </a:gdLst>
-            <a:ahLst/>
-            <a:cxnLst>
-              <a:cxn ang="0">
-                <a:pos x="connsiteX0" y="connsiteY0"/>
-              </a:cxn>
-              <a:cxn ang="0">
-                <a:pos x="connsiteX1" y="connsiteY1"/>
-              </a:cxn>
-              <a:cxn ang="0">
-                <a:pos x="connsiteX2" y="connsiteY2"/>
-              </a:cxn>
-              <a:cxn ang="0">
-                <a:pos x="connsiteX3" y="connsiteY3"/>
-              </a:cxn>
-              <a:cxn ang="0">
-                <a:pos x="connsiteX4" y="connsiteY4"/>
-              </a:cxn>
-            </a:cxnLst>
-            <a:rect l="l" t="t" r="r" b="b"/>
-            <a:pathLst>
-              <a:path w="2121971" h="2179084">
-                <a:moveTo>
-                  <a:pt x="0" y="1375987"/>
-                </a:moveTo>
-                <a:lnTo>
-                  <a:pt x="1204646" y="0"/>
-                </a:lnTo>
-                <a:lnTo>
-                  <a:pt x="2121971" y="803097"/>
-                </a:lnTo>
-                <a:lnTo>
-                  <a:pt x="917326" y="2179084"/>
-                </a:lnTo>
-                <a:lnTo>
-                  <a:pt x="1" y="1375987"/>
-                </a:lnTo>
-                <a:close/>
-              </a:path>
-            </a:pathLst>
-          </a:custGeom>
+          </a:prstGeom>
         </p:spPr>
         <p:style>
           <a:lnRef idx="2">
@@ -16776,7 +15915,7 @@
     </p:spTree>
     <p:extLst>
       <p:ext uri="{BB962C8B-B14F-4D97-AF65-F5344CB8AC3E}">
-        <p14:creationId xmlns:p14="http://schemas.microsoft.com/office/powerpoint/2010/main" val="579464399"/>
+        <p14:creationId xmlns:p14="http://schemas.microsoft.com/office/powerpoint/2010/main" val="73585925"/>
       </p:ext>
     </p:extLst>
   </p:cSld>
@@ -16890,250 +16029,13 @@
           <p:nvPr/>
         </p:nvSpPr>
         <p:spPr>
-          <a:xfrm>
-            <a:off x="533400" y="2476500"/>
-            <a:ext cx="2216907" cy="3234934"/>
+          <a:xfrm rot="18000000">
+            <a:off x="99988" y="3493892"/>
+            <a:ext cx="3581400" cy="1066800"/>
           </a:xfrm>
-          <a:custGeom>
+          <a:prstGeom prst="rightArrow">
             <a:avLst/>
-            <a:gdLst>
-              <a:gd name="connsiteX0" fmla="*/ 0 w 3581400"/>
-              <a:gd name="connsiteY0" fmla="*/ 266700 h 1066800"/>
-              <a:gd name="connsiteX1" fmla="*/ 3048000 w 3581400"/>
-              <a:gd name="connsiteY1" fmla="*/ 266700 h 1066800"/>
-              <a:gd name="connsiteX2" fmla="*/ 3048000 w 3581400"/>
-              <a:gd name="connsiteY2" fmla="*/ 0 h 1066800"/>
-              <a:gd name="connsiteX3" fmla="*/ 3581400 w 3581400"/>
-              <a:gd name="connsiteY3" fmla="*/ 533400 h 1066800"/>
-              <a:gd name="connsiteX4" fmla="*/ 3048000 w 3581400"/>
-              <a:gd name="connsiteY4" fmla="*/ 1066800 h 1066800"/>
-              <a:gd name="connsiteX5" fmla="*/ 3048000 w 3581400"/>
-              <a:gd name="connsiteY5" fmla="*/ 800100 h 1066800"/>
-              <a:gd name="connsiteX6" fmla="*/ 0 w 3581400"/>
-              <a:gd name="connsiteY6" fmla="*/ 800100 h 1066800"/>
-              <a:gd name="connsiteX7" fmla="*/ 0 w 3581400"/>
-              <a:gd name="connsiteY7" fmla="*/ 266700 h 1066800"/>
-              <a:gd name="connsiteX0" fmla="*/ 5586387 w 9167787"/>
-              <a:gd name="connsiteY0" fmla="*/ 3760592 h 4560692"/>
-              <a:gd name="connsiteX1" fmla="*/ 0 w 9167787"/>
-              <a:gd name="connsiteY1" fmla="*/ 0 h 4560692"/>
-              <a:gd name="connsiteX2" fmla="*/ 8634387 w 9167787"/>
-              <a:gd name="connsiteY2" fmla="*/ 3760592 h 4560692"/>
-              <a:gd name="connsiteX3" fmla="*/ 8634387 w 9167787"/>
-              <a:gd name="connsiteY3" fmla="*/ 3493892 h 4560692"/>
-              <a:gd name="connsiteX4" fmla="*/ 9167787 w 9167787"/>
-              <a:gd name="connsiteY4" fmla="*/ 4027292 h 4560692"/>
-              <a:gd name="connsiteX5" fmla="*/ 8634387 w 9167787"/>
-              <a:gd name="connsiteY5" fmla="*/ 4560692 h 4560692"/>
-              <a:gd name="connsiteX6" fmla="*/ 8634387 w 9167787"/>
-              <a:gd name="connsiteY6" fmla="*/ 4293992 h 4560692"/>
-              <a:gd name="connsiteX7" fmla="*/ 5586387 w 9167787"/>
-              <a:gd name="connsiteY7" fmla="*/ 4293992 h 4560692"/>
-              <a:gd name="connsiteX8" fmla="*/ 5586387 w 9167787"/>
-              <a:gd name="connsiteY8" fmla="*/ 3760592 h 4560692"/>
-              <a:gd name="connsiteX0" fmla="*/ 0 w 3581400"/>
-              <a:gd name="connsiteY0" fmla="*/ 266700 h 1066800"/>
-              <a:gd name="connsiteX1" fmla="*/ 3048000 w 3581400"/>
-              <a:gd name="connsiteY1" fmla="*/ 266700 h 1066800"/>
-              <a:gd name="connsiteX2" fmla="*/ 3048000 w 3581400"/>
-              <a:gd name="connsiteY2" fmla="*/ 0 h 1066800"/>
-              <a:gd name="connsiteX3" fmla="*/ 3581400 w 3581400"/>
-              <a:gd name="connsiteY3" fmla="*/ 533400 h 1066800"/>
-              <a:gd name="connsiteX4" fmla="*/ 3048000 w 3581400"/>
-              <a:gd name="connsiteY4" fmla="*/ 1066800 h 1066800"/>
-              <a:gd name="connsiteX5" fmla="*/ 3048000 w 3581400"/>
-              <a:gd name="connsiteY5" fmla="*/ 800100 h 1066800"/>
-              <a:gd name="connsiteX6" fmla="*/ 0 w 3581400"/>
-              <a:gd name="connsiteY6" fmla="*/ 800100 h 1066800"/>
-              <a:gd name="connsiteX7" fmla="*/ 0 w 3581400"/>
-              <a:gd name="connsiteY7" fmla="*/ 266700 h 1066800"/>
-              <a:gd name="connsiteX0" fmla="*/ 664381 w 3581400"/>
-              <a:gd name="connsiteY0" fmla="*/ 1950842 h 1950842"/>
-              <a:gd name="connsiteX1" fmla="*/ 3048000 w 3581400"/>
-              <a:gd name="connsiteY1" fmla="*/ 266700 h 1950842"/>
-              <a:gd name="connsiteX2" fmla="*/ 3048000 w 3581400"/>
-              <a:gd name="connsiteY2" fmla="*/ 0 h 1950842"/>
-              <a:gd name="connsiteX3" fmla="*/ 3581400 w 3581400"/>
-              <a:gd name="connsiteY3" fmla="*/ 533400 h 1950842"/>
-              <a:gd name="connsiteX4" fmla="*/ 3048000 w 3581400"/>
-              <a:gd name="connsiteY4" fmla="*/ 1066800 h 1950842"/>
-              <a:gd name="connsiteX5" fmla="*/ 3048000 w 3581400"/>
-              <a:gd name="connsiteY5" fmla="*/ 800100 h 1950842"/>
-              <a:gd name="connsiteX6" fmla="*/ 0 w 3581400"/>
-              <a:gd name="connsiteY6" fmla="*/ 800100 h 1950842"/>
-              <a:gd name="connsiteX7" fmla="*/ 0 w 3581400"/>
-              <a:gd name="connsiteY7" fmla="*/ 266700 h 1950842"/>
-              <a:gd name="connsiteX0" fmla="*/ 664381 w 3581400"/>
-              <a:gd name="connsiteY0" fmla="*/ 2639646 h 2639646"/>
-              <a:gd name="connsiteX1" fmla="*/ 2188381 w 3581400"/>
-              <a:gd name="connsiteY1" fmla="*/ 0 h 2639646"/>
-              <a:gd name="connsiteX2" fmla="*/ 3048000 w 3581400"/>
-              <a:gd name="connsiteY2" fmla="*/ 688804 h 2639646"/>
-              <a:gd name="connsiteX3" fmla="*/ 3581400 w 3581400"/>
-              <a:gd name="connsiteY3" fmla="*/ 1222204 h 2639646"/>
-              <a:gd name="connsiteX4" fmla="*/ 3048000 w 3581400"/>
-              <a:gd name="connsiteY4" fmla="*/ 1755604 h 2639646"/>
-              <a:gd name="connsiteX5" fmla="*/ 3048000 w 3581400"/>
-              <a:gd name="connsiteY5" fmla="*/ 1488904 h 2639646"/>
-              <a:gd name="connsiteX6" fmla="*/ 0 w 3581400"/>
-              <a:gd name="connsiteY6" fmla="*/ 1488904 h 2639646"/>
-              <a:gd name="connsiteX7" fmla="*/ 0 w 3581400"/>
-              <a:gd name="connsiteY7" fmla="*/ 955504 h 2639646"/>
-              <a:gd name="connsiteX0" fmla="*/ 664381 w 3581400"/>
-              <a:gd name="connsiteY0" fmla="*/ 2772996 h 2772996"/>
-              <a:gd name="connsiteX1" fmla="*/ 2188381 w 3581400"/>
-              <a:gd name="connsiteY1" fmla="*/ 133350 h 2772996"/>
-              <a:gd name="connsiteX2" fmla="*/ 1957412 w 3581400"/>
-              <a:gd name="connsiteY2" fmla="*/ 0 h 2772996"/>
-              <a:gd name="connsiteX3" fmla="*/ 3581400 w 3581400"/>
-              <a:gd name="connsiteY3" fmla="*/ 1355554 h 2772996"/>
-              <a:gd name="connsiteX4" fmla="*/ 3048000 w 3581400"/>
-              <a:gd name="connsiteY4" fmla="*/ 1888954 h 2772996"/>
-              <a:gd name="connsiteX5" fmla="*/ 3048000 w 3581400"/>
-              <a:gd name="connsiteY5" fmla="*/ 1622254 h 2772996"/>
-              <a:gd name="connsiteX6" fmla="*/ 0 w 3581400"/>
-              <a:gd name="connsiteY6" fmla="*/ 1622254 h 2772996"/>
-              <a:gd name="connsiteX7" fmla="*/ 0 w 3581400"/>
-              <a:gd name="connsiteY7" fmla="*/ 1088854 h 2772996"/>
-              <a:gd name="connsiteX0" fmla="*/ 664381 w 3048000"/>
-              <a:gd name="connsiteY0" fmla="*/ 2968234 h 2968234"/>
-              <a:gd name="connsiteX1" fmla="*/ 2188381 w 3048000"/>
-              <a:gd name="connsiteY1" fmla="*/ 328588 h 2968234"/>
-              <a:gd name="connsiteX2" fmla="*/ 1957412 w 3048000"/>
-              <a:gd name="connsiteY2" fmla="*/ 195238 h 2968234"/>
-              <a:gd name="connsiteX3" fmla="*/ 2686050 w 3048000"/>
-              <a:gd name="connsiteY3" fmla="*/ 0 h 2968234"/>
-              <a:gd name="connsiteX4" fmla="*/ 3048000 w 3048000"/>
-              <a:gd name="connsiteY4" fmla="*/ 2084192 h 2968234"/>
-              <a:gd name="connsiteX5" fmla="*/ 3048000 w 3048000"/>
-              <a:gd name="connsiteY5" fmla="*/ 1817492 h 2968234"/>
-              <a:gd name="connsiteX6" fmla="*/ 0 w 3048000"/>
-              <a:gd name="connsiteY6" fmla="*/ 1817492 h 2968234"/>
-              <a:gd name="connsiteX7" fmla="*/ 0 w 3048000"/>
-              <a:gd name="connsiteY7" fmla="*/ 1284092 h 2968234"/>
-              <a:gd name="connsiteX0" fmla="*/ 664381 w 3048000"/>
-              <a:gd name="connsiteY0" fmla="*/ 2968234 h 2968234"/>
-              <a:gd name="connsiteX1" fmla="*/ 2188381 w 3048000"/>
-              <a:gd name="connsiteY1" fmla="*/ 328588 h 2968234"/>
-              <a:gd name="connsiteX2" fmla="*/ 1957412 w 3048000"/>
-              <a:gd name="connsiteY2" fmla="*/ 195238 h 2968234"/>
-              <a:gd name="connsiteX3" fmla="*/ 2686050 w 3048000"/>
-              <a:gd name="connsiteY3" fmla="*/ 0 h 2968234"/>
-              <a:gd name="connsiteX4" fmla="*/ 2881288 w 3048000"/>
-              <a:gd name="connsiteY4" fmla="*/ 728638 h 2968234"/>
-              <a:gd name="connsiteX5" fmla="*/ 3048000 w 3048000"/>
-              <a:gd name="connsiteY5" fmla="*/ 1817492 h 2968234"/>
-              <a:gd name="connsiteX6" fmla="*/ 0 w 3048000"/>
-              <a:gd name="connsiteY6" fmla="*/ 1817492 h 2968234"/>
-              <a:gd name="connsiteX7" fmla="*/ 0 w 3048000"/>
-              <a:gd name="connsiteY7" fmla="*/ 1284092 h 2968234"/>
-              <a:gd name="connsiteX0" fmla="*/ 664381 w 2881288"/>
-              <a:gd name="connsiteY0" fmla="*/ 2968234 h 2968234"/>
-              <a:gd name="connsiteX1" fmla="*/ 2188381 w 2881288"/>
-              <a:gd name="connsiteY1" fmla="*/ 328588 h 2968234"/>
-              <a:gd name="connsiteX2" fmla="*/ 1957412 w 2881288"/>
-              <a:gd name="connsiteY2" fmla="*/ 195238 h 2968234"/>
-              <a:gd name="connsiteX3" fmla="*/ 2686050 w 2881288"/>
-              <a:gd name="connsiteY3" fmla="*/ 0 h 2968234"/>
-              <a:gd name="connsiteX4" fmla="*/ 2881288 w 2881288"/>
-              <a:gd name="connsiteY4" fmla="*/ 728638 h 2968234"/>
-              <a:gd name="connsiteX5" fmla="*/ 2650319 w 2881288"/>
-              <a:gd name="connsiteY5" fmla="*/ 595288 h 2968234"/>
-              <a:gd name="connsiteX6" fmla="*/ 0 w 2881288"/>
-              <a:gd name="connsiteY6" fmla="*/ 1817492 h 2968234"/>
-              <a:gd name="connsiteX7" fmla="*/ 0 w 2881288"/>
-              <a:gd name="connsiteY7" fmla="*/ 1284092 h 2968234"/>
-              <a:gd name="connsiteX0" fmla="*/ 664381 w 2881288"/>
-              <a:gd name="connsiteY0" fmla="*/ 2968234 h 3234934"/>
-              <a:gd name="connsiteX1" fmla="*/ 2188381 w 2881288"/>
-              <a:gd name="connsiteY1" fmla="*/ 328588 h 3234934"/>
-              <a:gd name="connsiteX2" fmla="*/ 1957412 w 2881288"/>
-              <a:gd name="connsiteY2" fmla="*/ 195238 h 3234934"/>
-              <a:gd name="connsiteX3" fmla="*/ 2686050 w 2881288"/>
-              <a:gd name="connsiteY3" fmla="*/ 0 h 3234934"/>
-              <a:gd name="connsiteX4" fmla="*/ 2881288 w 2881288"/>
-              <a:gd name="connsiteY4" fmla="*/ 728638 h 3234934"/>
-              <a:gd name="connsiteX5" fmla="*/ 2650319 w 2881288"/>
-              <a:gd name="connsiteY5" fmla="*/ 595288 h 3234934"/>
-              <a:gd name="connsiteX6" fmla="*/ 1126319 w 2881288"/>
-              <a:gd name="connsiteY6" fmla="*/ 3234934 h 3234934"/>
-              <a:gd name="connsiteX7" fmla="*/ 0 w 2881288"/>
-              <a:gd name="connsiteY7" fmla="*/ 1284092 h 3234934"/>
-              <a:gd name="connsiteX0" fmla="*/ 0 w 2216907"/>
-              <a:gd name="connsiteY0" fmla="*/ 2968234 h 3234934"/>
-              <a:gd name="connsiteX1" fmla="*/ 1524000 w 2216907"/>
-              <a:gd name="connsiteY1" fmla="*/ 328588 h 3234934"/>
-              <a:gd name="connsiteX2" fmla="*/ 1293031 w 2216907"/>
-              <a:gd name="connsiteY2" fmla="*/ 195238 h 3234934"/>
-              <a:gd name="connsiteX3" fmla="*/ 2021669 w 2216907"/>
-              <a:gd name="connsiteY3" fmla="*/ 0 h 3234934"/>
-              <a:gd name="connsiteX4" fmla="*/ 2216907 w 2216907"/>
-              <a:gd name="connsiteY4" fmla="*/ 728638 h 3234934"/>
-              <a:gd name="connsiteX5" fmla="*/ 1985938 w 2216907"/>
-              <a:gd name="connsiteY5" fmla="*/ 595288 h 3234934"/>
-              <a:gd name="connsiteX6" fmla="*/ 461938 w 2216907"/>
-              <a:gd name="connsiteY6" fmla="*/ 3234934 h 3234934"/>
-              <a:gd name="connsiteX7" fmla="*/ 0 w 2216907"/>
-              <a:gd name="connsiteY7" fmla="*/ 2968234 h 3234934"/>
-            </a:gdLst>
-            <a:ahLst/>
-            <a:cxnLst>
-              <a:cxn ang="0">
-                <a:pos x="connsiteX0" y="connsiteY0"/>
-              </a:cxn>
-              <a:cxn ang="0">
-                <a:pos x="connsiteX1" y="connsiteY1"/>
-              </a:cxn>
-              <a:cxn ang="0">
-                <a:pos x="connsiteX2" y="connsiteY2"/>
-              </a:cxn>
-              <a:cxn ang="0">
-                <a:pos x="connsiteX3" y="connsiteY3"/>
-              </a:cxn>
-              <a:cxn ang="0">
-                <a:pos x="connsiteX4" y="connsiteY4"/>
-              </a:cxn>
-              <a:cxn ang="0">
-                <a:pos x="connsiteX5" y="connsiteY5"/>
-              </a:cxn>
-              <a:cxn ang="0">
-                <a:pos x="connsiteX6" y="connsiteY6"/>
-              </a:cxn>
-              <a:cxn ang="0">
-                <a:pos x="connsiteX7" y="connsiteY7"/>
-              </a:cxn>
-            </a:cxnLst>
-            <a:rect l="l" t="t" r="r" b="b"/>
-            <a:pathLst>
-              <a:path w="2216907" h="3234934">
-                <a:moveTo>
-                  <a:pt x="0" y="2968234"/>
-                </a:moveTo>
-                <a:lnTo>
-                  <a:pt x="1524000" y="328588"/>
-                </a:lnTo>
-                <a:lnTo>
-                  <a:pt x="1293031" y="195238"/>
-                </a:lnTo>
-                <a:lnTo>
-                  <a:pt x="2021669" y="0"/>
-                </a:lnTo>
-                <a:lnTo>
-                  <a:pt x="2216907" y="728638"/>
-                </a:lnTo>
-                <a:lnTo>
-                  <a:pt x="1985938" y="595288"/>
-                </a:lnTo>
-                <a:lnTo>
-                  <a:pt x="461938" y="3234934"/>
-                </a:lnTo>
-                <a:lnTo>
-                  <a:pt x="0" y="2968234"/>
-                </a:lnTo>
-                <a:close/>
-              </a:path>
-            </a:pathLst>
-          </a:custGeom>
+          </a:prstGeom>
         </p:spPr>
         <p:style>
           <a:lnRef idx="2">
@@ -17167,136 +16069,13 @@
           <p:nvPr/>
         </p:nvSpPr>
         <p:spPr>
-          <a:xfrm>
-            <a:off x="533400" y="3124200"/>
-            <a:ext cx="2121971" cy="2179084"/>
+          <a:xfrm rot="18672083">
+            <a:off x="679985" y="3604142"/>
+            <a:ext cx="1828800" cy="1219200"/>
           </a:xfrm>
-          <a:custGeom>
+          <a:prstGeom prst="rect">
             <a:avLst/>
-            <a:gdLst>
-              <a:gd name="connsiteX0" fmla="*/ 0 w 1828800"/>
-              <a:gd name="connsiteY0" fmla="*/ 0 h 1219200"/>
-              <a:gd name="connsiteX1" fmla="*/ 1828800 w 1828800"/>
-              <a:gd name="connsiteY1" fmla="*/ 0 h 1219200"/>
-              <a:gd name="connsiteX2" fmla="*/ 1828800 w 1828800"/>
-              <a:gd name="connsiteY2" fmla="*/ 1219200 h 1219200"/>
-              <a:gd name="connsiteX3" fmla="*/ 0 w 1828800"/>
-              <a:gd name="connsiteY3" fmla="*/ 1219200 h 1219200"/>
-              <a:gd name="connsiteX4" fmla="*/ 0 w 1828800"/>
-              <a:gd name="connsiteY4" fmla="*/ 0 h 1219200"/>
-              <a:gd name="connsiteX0" fmla="*/ 1975386 w 3804186"/>
-              <a:gd name="connsiteY0" fmla="*/ 3604142 h 4823342"/>
-              <a:gd name="connsiteX1" fmla="*/ 0 w 3804186"/>
-              <a:gd name="connsiteY1" fmla="*/ 0 h 4823342"/>
-              <a:gd name="connsiteX2" fmla="*/ 3804186 w 3804186"/>
-              <a:gd name="connsiteY2" fmla="*/ 3604142 h 4823342"/>
-              <a:gd name="connsiteX3" fmla="*/ 3804186 w 3804186"/>
-              <a:gd name="connsiteY3" fmla="*/ 4823342 h 4823342"/>
-              <a:gd name="connsiteX4" fmla="*/ 1975386 w 3804186"/>
-              <a:gd name="connsiteY4" fmla="*/ 4823342 h 4823342"/>
-              <a:gd name="connsiteX5" fmla="*/ 1975386 w 3804186"/>
-              <a:gd name="connsiteY5" fmla="*/ 3604142 h 4823342"/>
-              <a:gd name="connsiteX0" fmla="*/ 0 w 1828800"/>
-              <a:gd name="connsiteY0" fmla="*/ 0 h 1219200"/>
-              <a:gd name="connsiteX1" fmla="*/ 1828800 w 1828800"/>
-              <a:gd name="connsiteY1" fmla="*/ 0 h 1219200"/>
-              <a:gd name="connsiteX2" fmla="*/ 1828800 w 1828800"/>
-              <a:gd name="connsiteY2" fmla="*/ 1219200 h 1219200"/>
-              <a:gd name="connsiteX3" fmla="*/ 0 w 1828800"/>
-              <a:gd name="connsiteY3" fmla="*/ 1219200 h 1219200"/>
-              <a:gd name="connsiteX4" fmla="*/ 0 w 1828800"/>
-              <a:gd name="connsiteY4" fmla="*/ 0 h 1219200"/>
-              <a:gd name="connsiteX0" fmla="*/ 0 w 1975385"/>
-              <a:gd name="connsiteY0" fmla="*/ 896045 h 1219200"/>
-              <a:gd name="connsiteX1" fmla="*/ 1975385 w 1975385"/>
-              <a:gd name="connsiteY1" fmla="*/ 0 h 1219200"/>
-              <a:gd name="connsiteX2" fmla="*/ 1975385 w 1975385"/>
-              <a:gd name="connsiteY2" fmla="*/ 1219200 h 1219200"/>
-              <a:gd name="connsiteX3" fmla="*/ 146585 w 1975385"/>
-              <a:gd name="connsiteY3" fmla="*/ 1219200 h 1219200"/>
-              <a:gd name="connsiteX4" fmla="*/ 146585 w 1975385"/>
-              <a:gd name="connsiteY4" fmla="*/ 0 h 1219200"/>
-              <a:gd name="connsiteX0" fmla="*/ 0 w 1975385"/>
-              <a:gd name="connsiteY0" fmla="*/ 1375987 h 1699142"/>
-              <a:gd name="connsiteX1" fmla="*/ 1204646 w 1975385"/>
-              <a:gd name="connsiteY1" fmla="*/ 0 h 1699142"/>
-              <a:gd name="connsiteX2" fmla="*/ 1975385 w 1975385"/>
-              <a:gd name="connsiteY2" fmla="*/ 1699142 h 1699142"/>
-              <a:gd name="connsiteX3" fmla="*/ 146585 w 1975385"/>
-              <a:gd name="connsiteY3" fmla="*/ 1699142 h 1699142"/>
-              <a:gd name="connsiteX4" fmla="*/ 146585 w 1975385"/>
-              <a:gd name="connsiteY4" fmla="*/ 479942 h 1699142"/>
-              <a:gd name="connsiteX0" fmla="*/ 0 w 2121971"/>
-              <a:gd name="connsiteY0" fmla="*/ 1375987 h 1699142"/>
-              <a:gd name="connsiteX1" fmla="*/ 1204646 w 2121971"/>
-              <a:gd name="connsiteY1" fmla="*/ 0 h 1699142"/>
-              <a:gd name="connsiteX2" fmla="*/ 2121971 w 2121971"/>
-              <a:gd name="connsiteY2" fmla="*/ 803097 h 1699142"/>
-              <a:gd name="connsiteX3" fmla="*/ 146585 w 2121971"/>
-              <a:gd name="connsiteY3" fmla="*/ 1699142 h 1699142"/>
-              <a:gd name="connsiteX4" fmla="*/ 146585 w 2121971"/>
-              <a:gd name="connsiteY4" fmla="*/ 479942 h 1699142"/>
-              <a:gd name="connsiteX0" fmla="*/ 0 w 2121971"/>
-              <a:gd name="connsiteY0" fmla="*/ 1375987 h 2179084"/>
-              <a:gd name="connsiteX1" fmla="*/ 1204646 w 2121971"/>
-              <a:gd name="connsiteY1" fmla="*/ 0 h 2179084"/>
-              <a:gd name="connsiteX2" fmla="*/ 2121971 w 2121971"/>
-              <a:gd name="connsiteY2" fmla="*/ 803097 h 2179084"/>
-              <a:gd name="connsiteX3" fmla="*/ 917326 w 2121971"/>
-              <a:gd name="connsiteY3" fmla="*/ 2179084 h 2179084"/>
-              <a:gd name="connsiteX4" fmla="*/ 146585 w 2121971"/>
-              <a:gd name="connsiteY4" fmla="*/ 479942 h 2179084"/>
-              <a:gd name="connsiteX0" fmla="*/ 0 w 2121971"/>
-              <a:gd name="connsiteY0" fmla="*/ 1375987 h 2179084"/>
-              <a:gd name="connsiteX1" fmla="*/ 1204646 w 2121971"/>
-              <a:gd name="connsiteY1" fmla="*/ 0 h 2179084"/>
-              <a:gd name="connsiteX2" fmla="*/ 2121971 w 2121971"/>
-              <a:gd name="connsiteY2" fmla="*/ 803097 h 2179084"/>
-              <a:gd name="connsiteX3" fmla="*/ 917326 w 2121971"/>
-              <a:gd name="connsiteY3" fmla="*/ 2179084 h 2179084"/>
-              <a:gd name="connsiteX4" fmla="*/ 1 w 2121971"/>
-              <a:gd name="connsiteY4" fmla="*/ 1375987 h 2179084"/>
-            </a:gdLst>
-            <a:ahLst/>
-            <a:cxnLst>
-              <a:cxn ang="0">
-                <a:pos x="connsiteX0" y="connsiteY0"/>
-              </a:cxn>
-              <a:cxn ang="0">
-                <a:pos x="connsiteX1" y="connsiteY1"/>
-              </a:cxn>
-              <a:cxn ang="0">
-                <a:pos x="connsiteX2" y="connsiteY2"/>
-              </a:cxn>
-              <a:cxn ang="0">
-                <a:pos x="connsiteX3" y="connsiteY3"/>
-              </a:cxn>
-              <a:cxn ang="0">
-                <a:pos x="connsiteX4" y="connsiteY4"/>
-              </a:cxn>
-            </a:cxnLst>
-            <a:rect l="l" t="t" r="r" b="b"/>
-            <a:pathLst>
-              <a:path w="2121971" h="2179084">
-                <a:moveTo>
-                  <a:pt x="0" y="1375987"/>
-                </a:moveTo>
-                <a:lnTo>
-                  <a:pt x="1204646" y="0"/>
-                </a:lnTo>
-                <a:lnTo>
-                  <a:pt x="2121971" y="803097"/>
-                </a:lnTo>
-                <a:lnTo>
-                  <a:pt x="917326" y="2179084"/>
-                </a:lnTo>
-                <a:lnTo>
-                  <a:pt x="1" y="1375987"/>
-                </a:lnTo>
-                <a:close/>
-              </a:path>
-            </a:pathLst>
-          </a:custGeom>
+          </a:prstGeom>
         </p:spPr>
         <p:style>
           <a:lnRef idx="2">
@@ -17326,7 +16105,7 @@
     </p:spTree>
     <p:extLst>
       <p:ext uri="{BB962C8B-B14F-4D97-AF65-F5344CB8AC3E}">
-        <p14:creationId xmlns:p14="http://schemas.microsoft.com/office/powerpoint/2010/main" val="1009893987"/>
+        <p14:creationId xmlns:p14="http://schemas.microsoft.com/office/powerpoint/2010/main" val="1708627947"/>
       </p:ext>
     </p:extLst>
   </p:cSld>
@@ -17361,7 +16140,7 @@
         </p:nvSpPr>
         <p:spPr>
           <a:xfrm>
-            <a:off x="6638875" y="533400"/>
+            <a:off x="6905575" y="533400"/>
             <a:ext cx="1828800" cy="1219200"/>
           </a:xfrm>
           <a:prstGeom prst="rect">
@@ -17401,7 +16180,7 @@
         </p:nvSpPr>
         <p:spPr>
           <a:xfrm>
-            <a:off x="6638875" y="1284051"/>
+            <a:off x="6905575" y="1284051"/>
             <a:ext cx="1828800" cy="1828800"/>
           </a:xfrm>
           <a:prstGeom prst="ellipse">
@@ -17440,250 +16219,13 @@
           <p:nvPr/>
         </p:nvSpPr>
         <p:spPr>
-          <a:xfrm>
-            <a:off x="6250768" y="2476500"/>
-            <a:ext cx="2216907" cy="3234934"/>
+          <a:xfrm rot="18000000">
+            <a:off x="5586387" y="3493892"/>
+            <a:ext cx="3581400" cy="1066800"/>
           </a:xfrm>
-          <a:custGeom>
+          <a:prstGeom prst="rightArrow">
             <a:avLst/>
-            <a:gdLst>
-              <a:gd name="connsiteX0" fmla="*/ 0 w 3581400"/>
-              <a:gd name="connsiteY0" fmla="*/ 266700 h 1066800"/>
-              <a:gd name="connsiteX1" fmla="*/ 3048000 w 3581400"/>
-              <a:gd name="connsiteY1" fmla="*/ 266700 h 1066800"/>
-              <a:gd name="connsiteX2" fmla="*/ 3048000 w 3581400"/>
-              <a:gd name="connsiteY2" fmla="*/ 0 h 1066800"/>
-              <a:gd name="connsiteX3" fmla="*/ 3581400 w 3581400"/>
-              <a:gd name="connsiteY3" fmla="*/ 533400 h 1066800"/>
-              <a:gd name="connsiteX4" fmla="*/ 3048000 w 3581400"/>
-              <a:gd name="connsiteY4" fmla="*/ 1066800 h 1066800"/>
-              <a:gd name="connsiteX5" fmla="*/ 3048000 w 3581400"/>
-              <a:gd name="connsiteY5" fmla="*/ 800100 h 1066800"/>
-              <a:gd name="connsiteX6" fmla="*/ 0 w 3581400"/>
-              <a:gd name="connsiteY6" fmla="*/ 800100 h 1066800"/>
-              <a:gd name="connsiteX7" fmla="*/ 0 w 3581400"/>
-              <a:gd name="connsiteY7" fmla="*/ 266700 h 1066800"/>
-              <a:gd name="connsiteX0" fmla="*/ 5586387 w 9167787"/>
-              <a:gd name="connsiteY0" fmla="*/ 3760592 h 4560692"/>
-              <a:gd name="connsiteX1" fmla="*/ 0 w 9167787"/>
-              <a:gd name="connsiteY1" fmla="*/ 0 h 4560692"/>
-              <a:gd name="connsiteX2" fmla="*/ 8634387 w 9167787"/>
-              <a:gd name="connsiteY2" fmla="*/ 3760592 h 4560692"/>
-              <a:gd name="connsiteX3" fmla="*/ 8634387 w 9167787"/>
-              <a:gd name="connsiteY3" fmla="*/ 3493892 h 4560692"/>
-              <a:gd name="connsiteX4" fmla="*/ 9167787 w 9167787"/>
-              <a:gd name="connsiteY4" fmla="*/ 4027292 h 4560692"/>
-              <a:gd name="connsiteX5" fmla="*/ 8634387 w 9167787"/>
-              <a:gd name="connsiteY5" fmla="*/ 4560692 h 4560692"/>
-              <a:gd name="connsiteX6" fmla="*/ 8634387 w 9167787"/>
-              <a:gd name="connsiteY6" fmla="*/ 4293992 h 4560692"/>
-              <a:gd name="connsiteX7" fmla="*/ 5586387 w 9167787"/>
-              <a:gd name="connsiteY7" fmla="*/ 4293992 h 4560692"/>
-              <a:gd name="connsiteX8" fmla="*/ 5586387 w 9167787"/>
-              <a:gd name="connsiteY8" fmla="*/ 3760592 h 4560692"/>
-              <a:gd name="connsiteX0" fmla="*/ 0 w 3581400"/>
-              <a:gd name="connsiteY0" fmla="*/ 266700 h 1066800"/>
-              <a:gd name="connsiteX1" fmla="*/ 3048000 w 3581400"/>
-              <a:gd name="connsiteY1" fmla="*/ 266700 h 1066800"/>
-              <a:gd name="connsiteX2" fmla="*/ 3048000 w 3581400"/>
-              <a:gd name="connsiteY2" fmla="*/ 0 h 1066800"/>
-              <a:gd name="connsiteX3" fmla="*/ 3581400 w 3581400"/>
-              <a:gd name="connsiteY3" fmla="*/ 533400 h 1066800"/>
-              <a:gd name="connsiteX4" fmla="*/ 3048000 w 3581400"/>
-              <a:gd name="connsiteY4" fmla="*/ 1066800 h 1066800"/>
-              <a:gd name="connsiteX5" fmla="*/ 3048000 w 3581400"/>
-              <a:gd name="connsiteY5" fmla="*/ 800100 h 1066800"/>
-              <a:gd name="connsiteX6" fmla="*/ 0 w 3581400"/>
-              <a:gd name="connsiteY6" fmla="*/ 800100 h 1066800"/>
-              <a:gd name="connsiteX7" fmla="*/ 0 w 3581400"/>
-              <a:gd name="connsiteY7" fmla="*/ 266700 h 1066800"/>
-              <a:gd name="connsiteX0" fmla="*/ 664381 w 3581400"/>
-              <a:gd name="connsiteY0" fmla="*/ 1950842 h 1950842"/>
-              <a:gd name="connsiteX1" fmla="*/ 3048000 w 3581400"/>
-              <a:gd name="connsiteY1" fmla="*/ 266700 h 1950842"/>
-              <a:gd name="connsiteX2" fmla="*/ 3048000 w 3581400"/>
-              <a:gd name="connsiteY2" fmla="*/ 0 h 1950842"/>
-              <a:gd name="connsiteX3" fmla="*/ 3581400 w 3581400"/>
-              <a:gd name="connsiteY3" fmla="*/ 533400 h 1950842"/>
-              <a:gd name="connsiteX4" fmla="*/ 3048000 w 3581400"/>
-              <a:gd name="connsiteY4" fmla="*/ 1066800 h 1950842"/>
-              <a:gd name="connsiteX5" fmla="*/ 3048000 w 3581400"/>
-              <a:gd name="connsiteY5" fmla="*/ 800100 h 1950842"/>
-              <a:gd name="connsiteX6" fmla="*/ 0 w 3581400"/>
-              <a:gd name="connsiteY6" fmla="*/ 800100 h 1950842"/>
-              <a:gd name="connsiteX7" fmla="*/ 0 w 3581400"/>
-              <a:gd name="connsiteY7" fmla="*/ 266700 h 1950842"/>
-              <a:gd name="connsiteX0" fmla="*/ 664381 w 3581400"/>
-              <a:gd name="connsiteY0" fmla="*/ 2639646 h 2639646"/>
-              <a:gd name="connsiteX1" fmla="*/ 2188381 w 3581400"/>
-              <a:gd name="connsiteY1" fmla="*/ 0 h 2639646"/>
-              <a:gd name="connsiteX2" fmla="*/ 3048000 w 3581400"/>
-              <a:gd name="connsiteY2" fmla="*/ 688804 h 2639646"/>
-              <a:gd name="connsiteX3" fmla="*/ 3581400 w 3581400"/>
-              <a:gd name="connsiteY3" fmla="*/ 1222204 h 2639646"/>
-              <a:gd name="connsiteX4" fmla="*/ 3048000 w 3581400"/>
-              <a:gd name="connsiteY4" fmla="*/ 1755604 h 2639646"/>
-              <a:gd name="connsiteX5" fmla="*/ 3048000 w 3581400"/>
-              <a:gd name="connsiteY5" fmla="*/ 1488904 h 2639646"/>
-              <a:gd name="connsiteX6" fmla="*/ 0 w 3581400"/>
-              <a:gd name="connsiteY6" fmla="*/ 1488904 h 2639646"/>
-              <a:gd name="connsiteX7" fmla="*/ 0 w 3581400"/>
-              <a:gd name="connsiteY7" fmla="*/ 955504 h 2639646"/>
-              <a:gd name="connsiteX0" fmla="*/ 664381 w 3581400"/>
-              <a:gd name="connsiteY0" fmla="*/ 2772996 h 2772996"/>
-              <a:gd name="connsiteX1" fmla="*/ 2188381 w 3581400"/>
-              <a:gd name="connsiteY1" fmla="*/ 133350 h 2772996"/>
-              <a:gd name="connsiteX2" fmla="*/ 1957412 w 3581400"/>
-              <a:gd name="connsiteY2" fmla="*/ 0 h 2772996"/>
-              <a:gd name="connsiteX3" fmla="*/ 3581400 w 3581400"/>
-              <a:gd name="connsiteY3" fmla="*/ 1355554 h 2772996"/>
-              <a:gd name="connsiteX4" fmla="*/ 3048000 w 3581400"/>
-              <a:gd name="connsiteY4" fmla="*/ 1888954 h 2772996"/>
-              <a:gd name="connsiteX5" fmla="*/ 3048000 w 3581400"/>
-              <a:gd name="connsiteY5" fmla="*/ 1622254 h 2772996"/>
-              <a:gd name="connsiteX6" fmla="*/ 0 w 3581400"/>
-              <a:gd name="connsiteY6" fmla="*/ 1622254 h 2772996"/>
-              <a:gd name="connsiteX7" fmla="*/ 0 w 3581400"/>
-              <a:gd name="connsiteY7" fmla="*/ 1088854 h 2772996"/>
-              <a:gd name="connsiteX0" fmla="*/ 664381 w 3048000"/>
-              <a:gd name="connsiteY0" fmla="*/ 2968234 h 2968234"/>
-              <a:gd name="connsiteX1" fmla="*/ 2188381 w 3048000"/>
-              <a:gd name="connsiteY1" fmla="*/ 328588 h 2968234"/>
-              <a:gd name="connsiteX2" fmla="*/ 1957412 w 3048000"/>
-              <a:gd name="connsiteY2" fmla="*/ 195238 h 2968234"/>
-              <a:gd name="connsiteX3" fmla="*/ 2686050 w 3048000"/>
-              <a:gd name="connsiteY3" fmla="*/ 0 h 2968234"/>
-              <a:gd name="connsiteX4" fmla="*/ 3048000 w 3048000"/>
-              <a:gd name="connsiteY4" fmla="*/ 2084192 h 2968234"/>
-              <a:gd name="connsiteX5" fmla="*/ 3048000 w 3048000"/>
-              <a:gd name="connsiteY5" fmla="*/ 1817492 h 2968234"/>
-              <a:gd name="connsiteX6" fmla="*/ 0 w 3048000"/>
-              <a:gd name="connsiteY6" fmla="*/ 1817492 h 2968234"/>
-              <a:gd name="connsiteX7" fmla="*/ 0 w 3048000"/>
-              <a:gd name="connsiteY7" fmla="*/ 1284092 h 2968234"/>
-              <a:gd name="connsiteX0" fmla="*/ 664381 w 3048000"/>
-              <a:gd name="connsiteY0" fmla="*/ 2968234 h 2968234"/>
-              <a:gd name="connsiteX1" fmla="*/ 2188381 w 3048000"/>
-              <a:gd name="connsiteY1" fmla="*/ 328588 h 2968234"/>
-              <a:gd name="connsiteX2" fmla="*/ 1957412 w 3048000"/>
-              <a:gd name="connsiteY2" fmla="*/ 195238 h 2968234"/>
-              <a:gd name="connsiteX3" fmla="*/ 2686050 w 3048000"/>
-              <a:gd name="connsiteY3" fmla="*/ 0 h 2968234"/>
-              <a:gd name="connsiteX4" fmla="*/ 2881288 w 3048000"/>
-              <a:gd name="connsiteY4" fmla="*/ 728638 h 2968234"/>
-              <a:gd name="connsiteX5" fmla="*/ 3048000 w 3048000"/>
-              <a:gd name="connsiteY5" fmla="*/ 1817492 h 2968234"/>
-              <a:gd name="connsiteX6" fmla="*/ 0 w 3048000"/>
-              <a:gd name="connsiteY6" fmla="*/ 1817492 h 2968234"/>
-              <a:gd name="connsiteX7" fmla="*/ 0 w 3048000"/>
-              <a:gd name="connsiteY7" fmla="*/ 1284092 h 2968234"/>
-              <a:gd name="connsiteX0" fmla="*/ 664381 w 2881288"/>
-              <a:gd name="connsiteY0" fmla="*/ 2968234 h 2968234"/>
-              <a:gd name="connsiteX1" fmla="*/ 2188381 w 2881288"/>
-              <a:gd name="connsiteY1" fmla="*/ 328588 h 2968234"/>
-              <a:gd name="connsiteX2" fmla="*/ 1957412 w 2881288"/>
-              <a:gd name="connsiteY2" fmla="*/ 195238 h 2968234"/>
-              <a:gd name="connsiteX3" fmla="*/ 2686050 w 2881288"/>
-              <a:gd name="connsiteY3" fmla="*/ 0 h 2968234"/>
-              <a:gd name="connsiteX4" fmla="*/ 2881288 w 2881288"/>
-              <a:gd name="connsiteY4" fmla="*/ 728638 h 2968234"/>
-              <a:gd name="connsiteX5" fmla="*/ 2650319 w 2881288"/>
-              <a:gd name="connsiteY5" fmla="*/ 595288 h 2968234"/>
-              <a:gd name="connsiteX6" fmla="*/ 0 w 2881288"/>
-              <a:gd name="connsiteY6" fmla="*/ 1817492 h 2968234"/>
-              <a:gd name="connsiteX7" fmla="*/ 0 w 2881288"/>
-              <a:gd name="connsiteY7" fmla="*/ 1284092 h 2968234"/>
-              <a:gd name="connsiteX0" fmla="*/ 664381 w 2881288"/>
-              <a:gd name="connsiteY0" fmla="*/ 2968234 h 3234934"/>
-              <a:gd name="connsiteX1" fmla="*/ 2188381 w 2881288"/>
-              <a:gd name="connsiteY1" fmla="*/ 328588 h 3234934"/>
-              <a:gd name="connsiteX2" fmla="*/ 1957412 w 2881288"/>
-              <a:gd name="connsiteY2" fmla="*/ 195238 h 3234934"/>
-              <a:gd name="connsiteX3" fmla="*/ 2686050 w 2881288"/>
-              <a:gd name="connsiteY3" fmla="*/ 0 h 3234934"/>
-              <a:gd name="connsiteX4" fmla="*/ 2881288 w 2881288"/>
-              <a:gd name="connsiteY4" fmla="*/ 728638 h 3234934"/>
-              <a:gd name="connsiteX5" fmla="*/ 2650319 w 2881288"/>
-              <a:gd name="connsiteY5" fmla="*/ 595288 h 3234934"/>
-              <a:gd name="connsiteX6" fmla="*/ 1126319 w 2881288"/>
-              <a:gd name="connsiteY6" fmla="*/ 3234934 h 3234934"/>
-              <a:gd name="connsiteX7" fmla="*/ 0 w 2881288"/>
-              <a:gd name="connsiteY7" fmla="*/ 1284092 h 3234934"/>
-              <a:gd name="connsiteX0" fmla="*/ 0 w 2216907"/>
-              <a:gd name="connsiteY0" fmla="*/ 2968234 h 3234934"/>
-              <a:gd name="connsiteX1" fmla="*/ 1524000 w 2216907"/>
-              <a:gd name="connsiteY1" fmla="*/ 328588 h 3234934"/>
-              <a:gd name="connsiteX2" fmla="*/ 1293031 w 2216907"/>
-              <a:gd name="connsiteY2" fmla="*/ 195238 h 3234934"/>
-              <a:gd name="connsiteX3" fmla="*/ 2021669 w 2216907"/>
-              <a:gd name="connsiteY3" fmla="*/ 0 h 3234934"/>
-              <a:gd name="connsiteX4" fmla="*/ 2216907 w 2216907"/>
-              <a:gd name="connsiteY4" fmla="*/ 728638 h 3234934"/>
-              <a:gd name="connsiteX5" fmla="*/ 1985938 w 2216907"/>
-              <a:gd name="connsiteY5" fmla="*/ 595288 h 3234934"/>
-              <a:gd name="connsiteX6" fmla="*/ 461938 w 2216907"/>
-              <a:gd name="connsiteY6" fmla="*/ 3234934 h 3234934"/>
-              <a:gd name="connsiteX7" fmla="*/ 0 w 2216907"/>
-              <a:gd name="connsiteY7" fmla="*/ 2968234 h 3234934"/>
-            </a:gdLst>
-            <a:ahLst/>
-            <a:cxnLst>
-              <a:cxn ang="0">
-                <a:pos x="connsiteX0" y="connsiteY0"/>
-              </a:cxn>
-              <a:cxn ang="0">
-                <a:pos x="connsiteX1" y="connsiteY1"/>
-              </a:cxn>
-              <a:cxn ang="0">
-                <a:pos x="connsiteX2" y="connsiteY2"/>
-              </a:cxn>
-              <a:cxn ang="0">
-                <a:pos x="connsiteX3" y="connsiteY3"/>
-              </a:cxn>
-              <a:cxn ang="0">
-                <a:pos x="connsiteX4" y="connsiteY4"/>
-              </a:cxn>
-              <a:cxn ang="0">
-                <a:pos x="connsiteX5" y="connsiteY5"/>
-              </a:cxn>
-              <a:cxn ang="0">
-                <a:pos x="connsiteX6" y="connsiteY6"/>
-              </a:cxn>
-              <a:cxn ang="0">
-                <a:pos x="connsiteX7" y="connsiteY7"/>
-              </a:cxn>
-            </a:cxnLst>
-            <a:rect l="l" t="t" r="r" b="b"/>
-            <a:pathLst>
-              <a:path w="2216907" h="3234934">
-                <a:moveTo>
-                  <a:pt x="0" y="2968234"/>
-                </a:moveTo>
-                <a:lnTo>
-                  <a:pt x="1524000" y="328588"/>
-                </a:lnTo>
-                <a:lnTo>
-                  <a:pt x="1293031" y="195238"/>
-                </a:lnTo>
-                <a:lnTo>
-                  <a:pt x="2021669" y="0"/>
-                </a:lnTo>
-                <a:lnTo>
-                  <a:pt x="2216907" y="728638"/>
-                </a:lnTo>
-                <a:lnTo>
-                  <a:pt x="1985938" y="595288"/>
-                </a:lnTo>
-                <a:lnTo>
-                  <a:pt x="461938" y="3234934"/>
-                </a:lnTo>
-                <a:lnTo>
-                  <a:pt x="0" y="2968234"/>
-                </a:lnTo>
-                <a:close/>
-              </a:path>
-            </a:pathLst>
-          </a:custGeom>
+          </a:prstGeom>
         </p:spPr>
         <p:style>
           <a:lnRef idx="2">
@@ -17717,136 +16259,13 @@
           <p:nvPr/>
         </p:nvSpPr>
         <p:spPr>
-          <a:xfrm>
-            <a:off x="6345704" y="3124200"/>
-            <a:ext cx="2121971" cy="2179084"/>
+          <a:xfrm rot="18672083">
+            <a:off x="6758990" y="3604142"/>
+            <a:ext cx="1828800" cy="1219200"/>
           </a:xfrm>
-          <a:custGeom>
+          <a:prstGeom prst="rect">
             <a:avLst/>
-            <a:gdLst>
-              <a:gd name="connsiteX0" fmla="*/ 0 w 1828800"/>
-              <a:gd name="connsiteY0" fmla="*/ 0 h 1219200"/>
-              <a:gd name="connsiteX1" fmla="*/ 1828800 w 1828800"/>
-              <a:gd name="connsiteY1" fmla="*/ 0 h 1219200"/>
-              <a:gd name="connsiteX2" fmla="*/ 1828800 w 1828800"/>
-              <a:gd name="connsiteY2" fmla="*/ 1219200 h 1219200"/>
-              <a:gd name="connsiteX3" fmla="*/ 0 w 1828800"/>
-              <a:gd name="connsiteY3" fmla="*/ 1219200 h 1219200"/>
-              <a:gd name="connsiteX4" fmla="*/ 0 w 1828800"/>
-              <a:gd name="connsiteY4" fmla="*/ 0 h 1219200"/>
-              <a:gd name="connsiteX0" fmla="*/ 1975386 w 3804186"/>
-              <a:gd name="connsiteY0" fmla="*/ 3604142 h 4823342"/>
-              <a:gd name="connsiteX1" fmla="*/ 0 w 3804186"/>
-              <a:gd name="connsiteY1" fmla="*/ 0 h 4823342"/>
-              <a:gd name="connsiteX2" fmla="*/ 3804186 w 3804186"/>
-              <a:gd name="connsiteY2" fmla="*/ 3604142 h 4823342"/>
-              <a:gd name="connsiteX3" fmla="*/ 3804186 w 3804186"/>
-              <a:gd name="connsiteY3" fmla="*/ 4823342 h 4823342"/>
-              <a:gd name="connsiteX4" fmla="*/ 1975386 w 3804186"/>
-              <a:gd name="connsiteY4" fmla="*/ 4823342 h 4823342"/>
-              <a:gd name="connsiteX5" fmla="*/ 1975386 w 3804186"/>
-              <a:gd name="connsiteY5" fmla="*/ 3604142 h 4823342"/>
-              <a:gd name="connsiteX0" fmla="*/ 0 w 1828800"/>
-              <a:gd name="connsiteY0" fmla="*/ 0 h 1219200"/>
-              <a:gd name="connsiteX1" fmla="*/ 1828800 w 1828800"/>
-              <a:gd name="connsiteY1" fmla="*/ 0 h 1219200"/>
-              <a:gd name="connsiteX2" fmla="*/ 1828800 w 1828800"/>
-              <a:gd name="connsiteY2" fmla="*/ 1219200 h 1219200"/>
-              <a:gd name="connsiteX3" fmla="*/ 0 w 1828800"/>
-              <a:gd name="connsiteY3" fmla="*/ 1219200 h 1219200"/>
-              <a:gd name="connsiteX4" fmla="*/ 0 w 1828800"/>
-              <a:gd name="connsiteY4" fmla="*/ 0 h 1219200"/>
-              <a:gd name="connsiteX0" fmla="*/ 0 w 1975385"/>
-              <a:gd name="connsiteY0" fmla="*/ 896045 h 1219200"/>
-              <a:gd name="connsiteX1" fmla="*/ 1975385 w 1975385"/>
-              <a:gd name="connsiteY1" fmla="*/ 0 h 1219200"/>
-              <a:gd name="connsiteX2" fmla="*/ 1975385 w 1975385"/>
-              <a:gd name="connsiteY2" fmla="*/ 1219200 h 1219200"/>
-              <a:gd name="connsiteX3" fmla="*/ 146585 w 1975385"/>
-              <a:gd name="connsiteY3" fmla="*/ 1219200 h 1219200"/>
-              <a:gd name="connsiteX4" fmla="*/ 146585 w 1975385"/>
-              <a:gd name="connsiteY4" fmla="*/ 0 h 1219200"/>
-              <a:gd name="connsiteX0" fmla="*/ 0 w 1975385"/>
-              <a:gd name="connsiteY0" fmla="*/ 1375987 h 1699142"/>
-              <a:gd name="connsiteX1" fmla="*/ 1204646 w 1975385"/>
-              <a:gd name="connsiteY1" fmla="*/ 0 h 1699142"/>
-              <a:gd name="connsiteX2" fmla="*/ 1975385 w 1975385"/>
-              <a:gd name="connsiteY2" fmla="*/ 1699142 h 1699142"/>
-              <a:gd name="connsiteX3" fmla="*/ 146585 w 1975385"/>
-              <a:gd name="connsiteY3" fmla="*/ 1699142 h 1699142"/>
-              <a:gd name="connsiteX4" fmla="*/ 146585 w 1975385"/>
-              <a:gd name="connsiteY4" fmla="*/ 479942 h 1699142"/>
-              <a:gd name="connsiteX0" fmla="*/ 0 w 2121971"/>
-              <a:gd name="connsiteY0" fmla="*/ 1375987 h 1699142"/>
-              <a:gd name="connsiteX1" fmla="*/ 1204646 w 2121971"/>
-              <a:gd name="connsiteY1" fmla="*/ 0 h 1699142"/>
-              <a:gd name="connsiteX2" fmla="*/ 2121971 w 2121971"/>
-              <a:gd name="connsiteY2" fmla="*/ 803097 h 1699142"/>
-              <a:gd name="connsiteX3" fmla="*/ 146585 w 2121971"/>
-              <a:gd name="connsiteY3" fmla="*/ 1699142 h 1699142"/>
-              <a:gd name="connsiteX4" fmla="*/ 146585 w 2121971"/>
-              <a:gd name="connsiteY4" fmla="*/ 479942 h 1699142"/>
-              <a:gd name="connsiteX0" fmla="*/ 0 w 2121971"/>
-              <a:gd name="connsiteY0" fmla="*/ 1375987 h 2179084"/>
-              <a:gd name="connsiteX1" fmla="*/ 1204646 w 2121971"/>
-              <a:gd name="connsiteY1" fmla="*/ 0 h 2179084"/>
-              <a:gd name="connsiteX2" fmla="*/ 2121971 w 2121971"/>
-              <a:gd name="connsiteY2" fmla="*/ 803097 h 2179084"/>
-              <a:gd name="connsiteX3" fmla="*/ 917326 w 2121971"/>
-              <a:gd name="connsiteY3" fmla="*/ 2179084 h 2179084"/>
-              <a:gd name="connsiteX4" fmla="*/ 146585 w 2121971"/>
-              <a:gd name="connsiteY4" fmla="*/ 479942 h 2179084"/>
-              <a:gd name="connsiteX0" fmla="*/ 0 w 2121971"/>
-              <a:gd name="connsiteY0" fmla="*/ 1375987 h 2179084"/>
-              <a:gd name="connsiteX1" fmla="*/ 1204646 w 2121971"/>
-              <a:gd name="connsiteY1" fmla="*/ 0 h 2179084"/>
-              <a:gd name="connsiteX2" fmla="*/ 2121971 w 2121971"/>
-              <a:gd name="connsiteY2" fmla="*/ 803097 h 2179084"/>
-              <a:gd name="connsiteX3" fmla="*/ 917326 w 2121971"/>
-              <a:gd name="connsiteY3" fmla="*/ 2179084 h 2179084"/>
-              <a:gd name="connsiteX4" fmla="*/ 1 w 2121971"/>
-              <a:gd name="connsiteY4" fmla="*/ 1375987 h 2179084"/>
-            </a:gdLst>
-            <a:ahLst/>
-            <a:cxnLst>
-              <a:cxn ang="0">
-                <a:pos x="connsiteX0" y="connsiteY0"/>
-              </a:cxn>
-              <a:cxn ang="0">
-                <a:pos x="connsiteX1" y="connsiteY1"/>
-              </a:cxn>
-              <a:cxn ang="0">
-                <a:pos x="connsiteX2" y="connsiteY2"/>
-              </a:cxn>
-              <a:cxn ang="0">
-                <a:pos x="connsiteX3" y="connsiteY3"/>
-              </a:cxn>
-              <a:cxn ang="0">
-                <a:pos x="connsiteX4" y="connsiteY4"/>
-              </a:cxn>
-            </a:cxnLst>
-            <a:rect l="l" t="t" r="r" b="b"/>
-            <a:pathLst>
-              <a:path w="2121971" h="2179084">
-                <a:moveTo>
-                  <a:pt x="0" y="1375987"/>
-                </a:moveTo>
-                <a:lnTo>
-                  <a:pt x="1204646" y="0"/>
-                </a:lnTo>
-                <a:lnTo>
-                  <a:pt x="2121971" y="803097"/>
-                </a:lnTo>
-                <a:lnTo>
-                  <a:pt x="917326" y="2179084"/>
-                </a:lnTo>
-                <a:lnTo>
-                  <a:pt x="1" y="1375987"/>
-                </a:lnTo>
-                <a:close/>
-              </a:path>
-            </a:pathLst>
-          </a:custGeom>
+          </a:prstGeom>
         </p:spPr>
         <p:style>
           <a:lnRef idx="2">
@@ -17876,7 +16295,7 @@
     </p:spTree>
     <p:extLst>
       <p:ext uri="{BB962C8B-B14F-4D97-AF65-F5344CB8AC3E}">
-        <p14:creationId xmlns:p14="http://schemas.microsoft.com/office/powerpoint/2010/main" val="1130569640"/>
+        <p14:creationId xmlns:p14="http://schemas.microsoft.com/office/powerpoint/2010/main" val="4070201812"/>
       </p:ext>
     </p:extLst>
   </p:cSld>
@@ -18062,250 +16481,13 @@
           <p:nvPr/>
         </p:nvSpPr>
         <p:spPr>
-          <a:xfrm>
-            <a:off x="6250768" y="533400"/>
-            <a:ext cx="2216907" cy="3234934"/>
+          <a:xfrm rot="18000000">
+            <a:off x="5586387" y="1817492"/>
+            <a:ext cx="3581400" cy="1066800"/>
           </a:xfrm>
-          <a:custGeom>
+          <a:prstGeom prst="rightArrow">
             <a:avLst/>
-            <a:gdLst>
-              <a:gd name="connsiteX0" fmla="*/ 0 w 3581400"/>
-              <a:gd name="connsiteY0" fmla="*/ 266700 h 1066800"/>
-              <a:gd name="connsiteX1" fmla="*/ 3048000 w 3581400"/>
-              <a:gd name="connsiteY1" fmla="*/ 266700 h 1066800"/>
-              <a:gd name="connsiteX2" fmla="*/ 3048000 w 3581400"/>
-              <a:gd name="connsiteY2" fmla="*/ 0 h 1066800"/>
-              <a:gd name="connsiteX3" fmla="*/ 3581400 w 3581400"/>
-              <a:gd name="connsiteY3" fmla="*/ 533400 h 1066800"/>
-              <a:gd name="connsiteX4" fmla="*/ 3048000 w 3581400"/>
-              <a:gd name="connsiteY4" fmla="*/ 1066800 h 1066800"/>
-              <a:gd name="connsiteX5" fmla="*/ 3048000 w 3581400"/>
-              <a:gd name="connsiteY5" fmla="*/ 800100 h 1066800"/>
-              <a:gd name="connsiteX6" fmla="*/ 0 w 3581400"/>
-              <a:gd name="connsiteY6" fmla="*/ 800100 h 1066800"/>
-              <a:gd name="connsiteX7" fmla="*/ 0 w 3581400"/>
-              <a:gd name="connsiteY7" fmla="*/ 266700 h 1066800"/>
-              <a:gd name="connsiteX0" fmla="*/ 5586387 w 9167787"/>
-              <a:gd name="connsiteY0" fmla="*/ 3760592 h 4560692"/>
-              <a:gd name="connsiteX1" fmla="*/ 0 w 9167787"/>
-              <a:gd name="connsiteY1" fmla="*/ 0 h 4560692"/>
-              <a:gd name="connsiteX2" fmla="*/ 8634387 w 9167787"/>
-              <a:gd name="connsiteY2" fmla="*/ 3760592 h 4560692"/>
-              <a:gd name="connsiteX3" fmla="*/ 8634387 w 9167787"/>
-              <a:gd name="connsiteY3" fmla="*/ 3493892 h 4560692"/>
-              <a:gd name="connsiteX4" fmla="*/ 9167787 w 9167787"/>
-              <a:gd name="connsiteY4" fmla="*/ 4027292 h 4560692"/>
-              <a:gd name="connsiteX5" fmla="*/ 8634387 w 9167787"/>
-              <a:gd name="connsiteY5" fmla="*/ 4560692 h 4560692"/>
-              <a:gd name="connsiteX6" fmla="*/ 8634387 w 9167787"/>
-              <a:gd name="connsiteY6" fmla="*/ 4293992 h 4560692"/>
-              <a:gd name="connsiteX7" fmla="*/ 5586387 w 9167787"/>
-              <a:gd name="connsiteY7" fmla="*/ 4293992 h 4560692"/>
-              <a:gd name="connsiteX8" fmla="*/ 5586387 w 9167787"/>
-              <a:gd name="connsiteY8" fmla="*/ 3760592 h 4560692"/>
-              <a:gd name="connsiteX0" fmla="*/ 0 w 3581400"/>
-              <a:gd name="connsiteY0" fmla="*/ 266700 h 1066800"/>
-              <a:gd name="connsiteX1" fmla="*/ 3048000 w 3581400"/>
-              <a:gd name="connsiteY1" fmla="*/ 266700 h 1066800"/>
-              <a:gd name="connsiteX2" fmla="*/ 3048000 w 3581400"/>
-              <a:gd name="connsiteY2" fmla="*/ 0 h 1066800"/>
-              <a:gd name="connsiteX3" fmla="*/ 3581400 w 3581400"/>
-              <a:gd name="connsiteY3" fmla="*/ 533400 h 1066800"/>
-              <a:gd name="connsiteX4" fmla="*/ 3048000 w 3581400"/>
-              <a:gd name="connsiteY4" fmla="*/ 1066800 h 1066800"/>
-              <a:gd name="connsiteX5" fmla="*/ 3048000 w 3581400"/>
-              <a:gd name="connsiteY5" fmla="*/ 800100 h 1066800"/>
-              <a:gd name="connsiteX6" fmla="*/ 0 w 3581400"/>
-              <a:gd name="connsiteY6" fmla="*/ 800100 h 1066800"/>
-              <a:gd name="connsiteX7" fmla="*/ 0 w 3581400"/>
-              <a:gd name="connsiteY7" fmla="*/ 266700 h 1066800"/>
-              <a:gd name="connsiteX0" fmla="*/ 664381 w 3581400"/>
-              <a:gd name="connsiteY0" fmla="*/ 1950842 h 1950842"/>
-              <a:gd name="connsiteX1" fmla="*/ 3048000 w 3581400"/>
-              <a:gd name="connsiteY1" fmla="*/ 266700 h 1950842"/>
-              <a:gd name="connsiteX2" fmla="*/ 3048000 w 3581400"/>
-              <a:gd name="connsiteY2" fmla="*/ 0 h 1950842"/>
-              <a:gd name="connsiteX3" fmla="*/ 3581400 w 3581400"/>
-              <a:gd name="connsiteY3" fmla="*/ 533400 h 1950842"/>
-              <a:gd name="connsiteX4" fmla="*/ 3048000 w 3581400"/>
-              <a:gd name="connsiteY4" fmla="*/ 1066800 h 1950842"/>
-              <a:gd name="connsiteX5" fmla="*/ 3048000 w 3581400"/>
-              <a:gd name="connsiteY5" fmla="*/ 800100 h 1950842"/>
-              <a:gd name="connsiteX6" fmla="*/ 0 w 3581400"/>
-              <a:gd name="connsiteY6" fmla="*/ 800100 h 1950842"/>
-              <a:gd name="connsiteX7" fmla="*/ 0 w 3581400"/>
-              <a:gd name="connsiteY7" fmla="*/ 266700 h 1950842"/>
-              <a:gd name="connsiteX0" fmla="*/ 664381 w 3581400"/>
-              <a:gd name="connsiteY0" fmla="*/ 2639646 h 2639646"/>
-              <a:gd name="connsiteX1" fmla="*/ 2188381 w 3581400"/>
-              <a:gd name="connsiteY1" fmla="*/ 0 h 2639646"/>
-              <a:gd name="connsiteX2" fmla="*/ 3048000 w 3581400"/>
-              <a:gd name="connsiteY2" fmla="*/ 688804 h 2639646"/>
-              <a:gd name="connsiteX3" fmla="*/ 3581400 w 3581400"/>
-              <a:gd name="connsiteY3" fmla="*/ 1222204 h 2639646"/>
-              <a:gd name="connsiteX4" fmla="*/ 3048000 w 3581400"/>
-              <a:gd name="connsiteY4" fmla="*/ 1755604 h 2639646"/>
-              <a:gd name="connsiteX5" fmla="*/ 3048000 w 3581400"/>
-              <a:gd name="connsiteY5" fmla="*/ 1488904 h 2639646"/>
-              <a:gd name="connsiteX6" fmla="*/ 0 w 3581400"/>
-              <a:gd name="connsiteY6" fmla="*/ 1488904 h 2639646"/>
-              <a:gd name="connsiteX7" fmla="*/ 0 w 3581400"/>
-              <a:gd name="connsiteY7" fmla="*/ 955504 h 2639646"/>
-              <a:gd name="connsiteX0" fmla="*/ 664381 w 3581400"/>
-              <a:gd name="connsiteY0" fmla="*/ 2772996 h 2772996"/>
-              <a:gd name="connsiteX1" fmla="*/ 2188381 w 3581400"/>
-              <a:gd name="connsiteY1" fmla="*/ 133350 h 2772996"/>
-              <a:gd name="connsiteX2" fmla="*/ 1957412 w 3581400"/>
-              <a:gd name="connsiteY2" fmla="*/ 0 h 2772996"/>
-              <a:gd name="connsiteX3" fmla="*/ 3581400 w 3581400"/>
-              <a:gd name="connsiteY3" fmla="*/ 1355554 h 2772996"/>
-              <a:gd name="connsiteX4" fmla="*/ 3048000 w 3581400"/>
-              <a:gd name="connsiteY4" fmla="*/ 1888954 h 2772996"/>
-              <a:gd name="connsiteX5" fmla="*/ 3048000 w 3581400"/>
-              <a:gd name="connsiteY5" fmla="*/ 1622254 h 2772996"/>
-              <a:gd name="connsiteX6" fmla="*/ 0 w 3581400"/>
-              <a:gd name="connsiteY6" fmla="*/ 1622254 h 2772996"/>
-              <a:gd name="connsiteX7" fmla="*/ 0 w 3581400"/>
-              <a:gd name="connsiteY7" fmla="*/ 1088854 h 2772996"/>
-              <a:gd name="connsiteX0" fmla="*/ 664381 w 3048000"/>
-              <a:gd name="connsiteY0" fmla="*/ 2968234 h 2968234"/>
-              <a:gd name="connsiteX1" fmla="*/ 2188381 w 3048000"/>
-              <a:gd name="connsiteY1" fmla="*/ 328588 h 2968234"/>
-              <a:gd name="connsiteX2" fmla="*/ 1957412 w 3048000"/>
-              <a:gd name="connsiteY2" fmla="*/ 195238 h 2968234"/>
-              <a:gd name="connsiteX3" fmla="*/ 2686050 w 3048000"/>
-              <a:gd name="connsiteY3" fmla="*/ 0 h 2968234"/>
-              <a:gd name="connsiteX4" fmla="*/ 3048000 w 3048000"/>
-              <a:gd name="connsiteY4" fmla="*/ 2084192 h 2968234"/>
-              <a:gd name="connsiteX5" fmla="*/ 3048000 w 3048000"/>
-              <a:gd name="connsiteY5" fmla="*/ 1817492 h 2968234"/>
-              <a:gd name="connsiteX6" fmla="*/ 0 w 3048000"/>
-              <a:gd name="connsiteY6" fmla="*/ 1817492 h 2968234"/>
-              <a:gd name="connsiteX7" fmla="*/ 0 w 3048000"/>
-              <a:gd name="connsiteY7" fmla="*/ 1284092 h 2968234"/>
-              <a:gd name="connsiteX0" fmla="*/ 664381 w 3048000"/>
-              <a:gd name="connsiteY0" fmla="*/ 2968234 h 2968234"/>
-              <a:gd name="connsiteX1" fmla="*/ 2188381 w 3048000"/>
-              <a:gd name="connsiteY1" fmla="*/ 328588 h 2968234"/>
-              <a:gd name="connsiteX2" fmla="*/ 1957412 w 3048000"/>
-              <a:gd name="connsiteY2" fmla="*/ 195238 h 2968234"/>
-              <a:gd name="connsiteX3" fmla="*/ 2686050 w 3048000"/>
-              <a:gd name="connsiteY3" fmla="*/ 0 h 2968234"/>
-              <a:gd name="connsiteX4" fmla="*/ 2881288 w 3048000"/>
-              <a:gd name="connsiteY4" fmla="*/ 728638 h 2968234"/>
-              <a:gd name="connsiteX5" fmla="*/ 3048000 w 3048000"/>
-              <a:gd name="connsiteY5" fmla="*/ 1817492 h 2968234"/>
-              <a:gd name="connsiteX6" fmla="*/ 0 w 3048000"/>
-              <a:gd name="connsiteY6" fmla="*/ 1817492 h 2968234"/>
-              <a:gd name="connsiteX7" fmla="*/ 0 w 3048000"/>
-              <a:gd name="connsiteY7" fmla="*/ 1284092 h 2968234"/>
-              <a:gd name="connsiteX0" fmla="*/ 664381 w 2881288"/>
-              <a:gd name="connsiteY0" fmla="*/ 2968234 h 2968234"/>
-              <a:gd name="connsiteX1" fmla="*/ 2188381 w 2881288"/>
-              <a:gd name="connsiteY1" fmla="*/ 328588 h 2968234"/>
-              <a:gd name="connsiteX2" fmla="*/ 1957412 w 2881288"/>
-              <a:gd name="connsiteY2" fmla="*/ 195238 h 2968234"/>
-              <a:gd name="connsiteX3" fmla="*/ 2686050 w 2881288"/>
-              <a:gd name="connsiteY3" fmla="*/ 0 h 2968234"/>
-              <a:gd name="connsiteX4" fmla="*/ 2881288 w 2881288"/>
-              <a:gd name="connsiteY4" fmla="*/ 728638 h 2968234"/>
-              <a:gd name="connsiteX5" fmla="*/ 2650319 w 2881288"/>
-              <a:gd name="connsiteY5" fmla="*/ 595288 h 2968234"/>
-              <a:gd name="connsiteX6" fmla="*/ 0 w 2881288"/>
-              <a:gd name="connsiteY6" fmla="*/ 1817492 h 2968234"/>
-              <a:gd name="connsiteX7" fmla="*/ 0 w 2881288"/>
-              <a:gd name="connsiteY7" fmla="*/ 1284092 h 2968234"/>
-              <a:gd name="connsiteX0" fmla="*/ 664381 w 2881288"/>
-              <a:gd name="connsiteY0" fmla="*/ 2968234 h 3234934"/>
-              <a:gd name="connsiteX1" fmla="*/ 2188381 w 2881288"/>
-              <a:gd name="connsiteY1" fmla="*/ 328588 h 3234934"/>
-              <a:gd name="connsiteX2" fmla="*/ 1957412 w 2881288"/>
-              <a:gd name="connsiteY2" fmla="*/ 195238 h 3234934"/>
-              <a:gd name="connsiteX3" fmla="*/ 2686050 w 2881288"/>
-              <a:gd name="connsiteY3" fmla="*/ 0 h 3234934"/>
-              <a:gd name="connsiteX4" fmla="*/ 2881288 w 2881288"/>
-              <a:gd name="connsiteY4" fmla="*/ 728638 h 3234934"/>
-              <a:gd name="connsiteX5" fmla="*/ 2650319 w 2881288"/>
-              <a:gd name="connsiteY5" fmla="*/ 595288 h 3234934"/>
-              <a:gd name="connsiteX6" fmla="*/ 1126319 w 2881288"/>
-              <a:gd name="connsiteY6" fmla="*/ 3234934 h 3234934"/>
-              <a:gd name="connsiteX7" fmla="*/ 0 w 2881288"/>
-              <a:gd name="connsiteY7" fmla="*/ 1284092 h 3234934"/>
-              <a:gd name="connsiteX0" fmla="*/ 0 w 2216907"/>
-              <a:gd name="connsiteY0" fmla="*/ 2968234 h 3234934"/>
-              <a:gd name="connsiteX1" fmla="*/ 1524000 w 2216907"/>
-              <a:gd name="connsiteY1" fmla="*/ 328588 h 3234934"/>
-              <a:gd name="connsiteX2" fmla="*/ 1293031 w 2216907"/>
-              <a:gd name="connsiteY2" fmla="*/ 195238 h 3234934"/>
-              <a:gd name="connsiteX3" fmla="*/ 2021669 w 2216907"/>
-              <a:gd name="connsiteY3" fmla="*/ 0 h 3234934"/>
-              <a:gd name="connsiteX4" fmla="*/ 2216907 w 2216907"/>
-              <a:gd name="connsiteY4" fmla="*/ 728638 h 3234934"/>
-              <a:gd name="connsiteX5" fmla="*/ 1985938 w 2216907"/>
-              <a:gd name="connsiteY5" fmla="*/ 595288 h 3234934"/>
-              <a:gd name="connsiteX6" fmla="*/ 461938 w 2216907"/>
-              <a:gd name="connsiteY6" fmla="*/ 3234934 h 3234934"/>
-              <a:gd name="connsiteX7" fmla="*/ 0 w 2216907"/>
-              <a:gd name="connsiteY7" fmla="*/ 2968234 h 3234934"/>
-            </a:gdLst>
-            <a:ahLst/>
-            <a:cxnLst>
-              <a:cxn ang="0">
-                <a:pos x="connsiteX0" y="connsiteY0"/>
-              </a:cxn>
-              <a:cxn ang="0">
-                <a:pos x="connsiteX1" y="connsiteY1"/>
-              </a:cxn>
-              <a:cxn ang="0">
-                <a:pos x="connsiteX2" y="connsiteY2"/>
-              </a:cxn>
-              <a:cxn ang="0">
-                <a:pos x="connsiteX3" y="connsiteY3"/>
-              </a:cxn>
-              <a:cxn ang="0">
-                <a:pos x="connsiteX4" y="connsiteY4"/>
-              </a:cxn>
-              <a:cxn ang="0">
-                <a:pos x="connsiteX5" y="connsiteY5"/>
-              </a:cxn>
-              <a:cxn ang="0">
-                <a:pos x="connsiteX6" y="connsiteY6"/>
-              </a:cxn>
-              <a:cxn ang="0">
-                <a:pos x="connsiteX7" y="connsiteY7"/>
-              </a:cxn>
-            </a:cxnLst>
-            <a:rect l="l" t="t" r="r" b="b"/>
-            <a:pathLst>
-              <a:path w="2216907" h="3234934">
-                <a:moveTo>
-                  <a:pt x="0" y="2968234"/>
-                </a:moveTo>
-                <a:lnTo>
-                  <a:pt x="1524000" y="328588"/>
-                </a:lnTo>
-                <a:lnTo>
-                  <a:pt x="1293031" y="195238"/>
-                </a:lnTo>
-                <a:lnTo>
-                  <a:pt x="2021669" y="0"/>
-                </a:lnTo>
-                <a:lnTo>
-                  <a:pt x="2216907" y="728638"/>
-                </a:lnTo>
-                <a:lnTo>
-                  <a:pt x="1985938" y="595288"/>
-                </a:lnTo>
-                <a:lnTo>
-                  <a:pt x="461938" y="3234934"/>
-                </a:lnTo>
-                <a:lnTo>
-                  <a:pt x="0" y="2968234"/>
-                </a:lnTo>
-                <a:close/>
-              </a:path>
-            </a:pathLst>
-          </a:custGeom>
+          </a:prstGeom>
         </p:spPr>
         <p:style>
           <a:lnRef idx="2">
@@ -18339,136 +16521,13 @@
           <p:nvPr/>
         </p:nvSpPr>
         <p:spPr>
-          <a:xfrm>
-            <a:off x="1828800" y="533400"/>
-            <a:ext cx="2121971" cy="2179084"/>
+          <a:xfrm rot="18672083">
+            <a:off x="1975386" y="1013342"/>
+            <a:ext cx="1828800" cy="1219200"/>
           </a:xfrm>
-          <a:custGeom>
+          <a:prstGeom prst="rect">
             <a:avLst/>
-            <a:gdLst>
-              <a:gd name="connsiteX0" fmla="*/ 0 w 1828800"/>
-              <a:gd name="connsiteY0" fmla="*/ 0 h 1219200"/>
-              <a:gd name="connsiteX1" fmla="*/ 1828800 w 1828800"/>
-              <a:gd name="connsiteY1" fmla="*/ 0 h 1219200"/>
-              <a:gd name="connsiteX2" fmla="*/ 1828800 w 1828800"/>
-              <a:gd name="connsiteY2" fmla="*/ 1219200 h 1219200"/>
-              <a:gd name="connsiteX3" fmla="*/ 0 w 1828800"/>
-              <a:gd name="connsiteY3" fmla="*/ 1219200 h 1219200"/>
-              <a:gd name="connsiteX4" fmla="*/ 0 w 1828800"/>
-              <a:gd name="connsiteY4" fmla="*/ 0 h 1219200"/>
-              <a:gd name="connsiteX0" fmla="*/ 1975386 w 3804186"/>
-              <a:gd name="connsiteY0" fmla="*/ 3604142 h 4823342"/>
-              <a:gd name="connsiteX1" fmla="*/ 0 w 3804186"/>
-              <a:gd name="connsiteY1" fmla="*/ 0 h 4823342"/>
-              <a:gd name="connsiteX2" fmla="*/ 3804186 w 3804186"/>
-              <a:gd name="connsiteY2" fmla="*/ 3604142 h 4823342"/>
-              <a:gd name="connsiteX3" fmla="*/ 3804186 w 3804186"/>
-              <a:gd name="connsiteY3" fmla="*/ 4823342 h 4823342"/>
-              <a:gd name="connsiteX4" fmla="*/ 1975386 w 3804186"/>
-              <a:gd name="connsiteY4" fmla="*/ 4823342 h 4823342"/>
-              <a:gd name="connsiteX5" fmla="*/ 1975386 w 3804186"/>
-              <a:gd name="connsiteY5" fmla="*/ 3604142 h 4823342"/>
-              <a:gd name="connsiteX0" fmla="*/ 0 w 1828800"/>
-              <a:gd name="connsiteY0" fmla="*/ 0 h 1219200"/>
-              <a:gd name="connsiteX1" fmla="*/ 1828800 w 1828800"/>
-              <a:gd name="connsiteY1" fmla="*/ 0 h 1219200"/>
-              <a:gd name="connsiteX2" fmla="*/ 1828800 w 1828800"/>
-              <a:gd name="connsiteY2" fmla="*/ 1219200 h 1219200"/>
-              <a:gd name="connsiteX3" fmla="*/ 0 w 1828800"/>
-              <a:gd name="connsiteY3" fmla="*/ 1219200 h 1219200"/>
-              <a:gd name="connsiteX4" fmla="*/ 0 w 1828800"/>
-              <a:gd name="connsiteY4" fmla="*/ 0 h 1219200"/>
-              <a:gd name="connsiteX0" fmla="*/ 0 w 1975385"/>
-              <a:gd name="connsiteY0" fmla="*/ 896045 h 1219200"/>
-              <a:gd name="connsiteX1" fmla="*/ 1975385 w 1975385"/>
-              <a:gd name="connsiteY1" fmla="*/ 0 h 1219200"/>
-              <a:gd name="connsiteX2" fmla="*/ 1975385 w 1975385"/>
-              <a:gd name="connsiteY2" fmla="*/ 1219200 h 1219200"/>
-              <a:gd name="connsiteX3" fmla="*/ 146585 w 1975385"/>
-              <a:gd name="connsiteY3" fmla="*/ 1219200 h 1219200"/>
-              <a:gd name="connsiteX4" fmla="*/ 146585 w 1975385"/>
-              <a:gd name="connsiteY4" fmla="*/ 0 h 1219200"/>
-              <a:gd name="connsiteX0" fmla="*/ 0 w 1975385"/>
-              <a:gd name="connsiteY0" fmla="*/ 1375987 h 1699142"/>
-              <a:gd name="connsiteX1" fmla="*/ 1204646 w 1975385"/>
-              <a:gd name="connsiteY1" fmla="*/ 0 h 1699142"/>
-              <a:gd name="connsiteX2" fmla="*/ 1975385 w 1975385"/>
-              <a:gd name="connsiteY2" fmla="*/ 1699142 h 1699142"/>
-              <a:gd name="connsiteX3" fmla="*/ 146585 w 1975385"/>
-              <a:gd name="connsiteY3" fmla="*/ 1699142 h 1699142"/>
-              <a:gd name="connsiteX4" fmla="*/ 146585 w 1975385"/>
-              <a:gd name="connsiteY4" fmla="*/ 479942 h 1699142"/>
-              <a:gd name="connsiteX0" fmla="*/ 0 w 2121971"/>
-              <a:gd name="connsiteY0" fmla="*/ 1375987 h 1699142"/>
-              <a:gd name="connsiteX1" fmla="*/ 1204646 w 2121971"/>
-              <a:gd name="connsiteY1" fmla="*/ 0 h 1699142"/>
-              <a:gd name="connsiteX2" fmla="*/ 2121971 w 2121971"/>
-              <a:gd name="connsiteY2" fmla="*/ 803097 h 1699142"/>
-              <a:gd name="connsiteX3" fmla="*/ 146585 w 2121971"/>
-              <a:gd name="connsiteY3" fmla="*/ 1699142 h 1699142"/>
-              <a:gd name="connsiteX4" fmla="*/ 146585 w 2121971"/>
-              <a:gd name="connsiteY4" fmla="*/ 479942 h 1699142"/>
-              <a:gd name="connsiteX0" fmla="*/ 0 w 2121971"/>
-              <a:gd name="connsiteY0" fmla="*/ 1375987 h 2179084"/>
-              <a:gd name="connsiteX1" fmla="*/ 1204646 w 2121971"/>
-              <a:gd name="connsiteY1" fmla="*/ 0 h 2179084"/>
-              <a:gd name="connsiteX2" fmla="*/ 2121971 w 2121971"/>
-              <a:gd name="connsiteY2" fmla="*/ 803097 h 2179084"/>
-              <a:gd name="connsiteX3" fmla="*/ 917326 w 2121971"/>
-              <a:gd name="connsiteY3" fmla="*/ 2179084 h 2179084"/>
-              <a:gd name="connsiteX4" fmla="*/ 146585 w 2121971"/>
-              <a:gd name="connsiteY4" fmla="*/ 479942 h 2179084"/>
-              <a:gd name="connsiteX0" fmla="*/ 0 w 2121971"/>
-              <a:gd name="connsiteY0" fmla="*/ 1375987 h 2179084"/>
-              <a:gd name="connsiteX1" fmla="*/ 1204646 w 2121971"/>
-              <a:gd name="connsiteY1" fmla="*/ 0 h 2179084"/>
-              <a:gd name="connsiteX2" fmla="*/ 2121971 w 2121971"/>
-              <a:gd name="connsiteY2" fmla="*/ 803097 h 2179084"/>
-              <a:gd name="connsiteX3" fmla="*/ 917326 w 2121971"/>
-              <a:gd name="connsiteY3" fmla="*/ 2179084 h 2179084"/>
-              <a:gd name="connsiteX4" fmla="*/ 1 w 2121971"/>
-              <a:gd name="connsiteY4" fmla="*/ 1375987 h 2179084"/>
-            </a:gdLst>
-            <a:ahLst/>
-            <a:cxnLst>
-              <a:cxn ang="0">
-                <a:pos x="connsiteX0" y="connsiteY0"/>
-              </a:cxn>
-              <a:cxn ang="0">
-                <a:pos x="connsiteX1" y="connsiteY1"/>
-              </a:cxn>
-              <a:cxn ang="0">
-                <a:pos x="connsiteX2" y="connsiteY2"/>
-              </a:cxn>
-              <a:cxn ang="0">
-                <a:pos x="connsiteX3" y="connsiteY3"/>
-              </a:cxn>
-              <a:cxn ang="0">
-                <a:pos x="connsiteX4" y="connsiteY4"/>
-              </a:cxn>
-            </a:cxnLst>
-            <a:rect l="l" t="t" r="r" b="b"/>
-            <a:pathLst>
-              <a:path w="2121971" h="2179084">
-                <a:moveTo>
-                  <a:pt x="0" y="1375987"/>
-                </a:moveTo>
-                <a:lnTo>
-                  <a:pt x="1204646" y="0"/>
-                </a:lnTo>
-                <a:lnTo>
-                  <a:pt x="2121971" y="803097"/>
-                </a:lnTo>
-                <a:lnTo>
-                  <a:pt x="917326" y="2179084"/>
-                </a:lnTo>
-                <a:lnTo>
-                  <a:pt x="1" y="1375987"/>
-                </a:lnTo>
-                <a:close/>
-              </a:path>
-            </a:pathLst>
-          </a:custGeom>
+          </a:prstGeom>
         </p:spPr>
         <p:style>
           <a:lnRef idx="2">
@@ -18498,7 +16557,7 @@
     </p:spTree>
     <p:extLst>
       <p:ext uri="{BB962C8B-B14F-4D97-AF65-F5344CB8AC3E}">
-        <p14:creationId xmlns:p14="http://schemas.microsoft.com/office/powerpoint/2010/main" val="4151295557"/>
+        <p14:creationId xmlns:p14="http://schemas.microsoft.com/office/powerpoint/2010/main" val="269745485"/>
       </p:ext>
     </p:extLst>
   </p:cSld>
@@ -18533,7 +16592,7 @@
         </p:nvSpPr>
         <p:spPr>
           <a:xfrm>
-            <a:off x="533400" y="4492234"/>
+            <a:off x="533400" y="4625584"/>
             <a:ext cx="1828800" cy="1219200"/>
           </a:xfrm>
           <a:prstGeom prst="rect">
@@ -18573,7 +16632,7 @@
         </p:nvSpPr>
         <p:spPr>
           <a:xfrm>
-            <a:off x="4431228" y="3882634"/>
+            <a:off x="4431228" y="4015984"/>
             <a:ext cx="1828800" cy="1828800"/>
           </a:xfrm>
           <a:prstGeom prst="ellipse">
@@ -18612,250 +16671,13 @@
           <p:nvPr/>
         </p:nvSpPr>
         <p:spPr>
-          <a:xfrm>
-            <a:off x="6250768" y="2476500"/>
-            <a:ext cx="2216907" cy="3234934"/>
+          <a:xfrm rot="18000000">
+            <a:off x="5586387" y="3493892"/>
+            <a:ext cx="3581400" cy="1066800"/>
           </a:xfrm>
-          <a:custGeom>
+          <a:prstGeom prst="rightArrow">
             <a:avLst/>
-            <a:gdLst>
-              <a:gd name="connsiteX0" fmla="*/ 0 w 3581400"/>
-              <a:gd name="connsiteY0" fmla="*/ 266700 h 1066800"/>
-              <a:gd name="connsiteX1" fmla="*/ 3048000 w 3581400"/>
-              <a:gd name="connsiteY1" fmla="*/ 266700 h 1066800"/>
-              <a:gd name="connsiteX2" fmla="*/ 3048000 w 3581400"/>
-              <a:gd name="connsiteY2" fmla="*/ 0 h 1066800"/>
-              <a:gd name="connsiteX3" fmla="*/ 3581400 w 3581400"/>
-              <a:gd name="connsiteY3" fmla="*/ 533400 h 1066800"/>
-              <a:gd name="connsiteX4" fmla="*/ 3048000 w 3581400"/>
-              <a:gd name="connsiteY4" fmla="*/ 1066800 h 1066800"/>
-              <a:gd name="connsiteX5" fmla="*/ 3048000 w 3581400"/>
-              <a:gd name="connsiteY5" fmla="*/ 800100 h 1066800"/>
-              <a:gd name="connsiteX6" fmla="*/ 0 w 3581400"/>
-              <a:gd name="connsiteY6" fmla="*/ 800100 h 1066800"/>
-              <a:gd name="connsiteX7" fmla="*/ 0 w 3581400"/>
-              <a:gd name="connsiteY7" fmla="*/ 266700 h 1066800"/>
-              <a:gd name="connsiteX0" fmla="*/ 5586387 w 9167787"/>
-              <a:gd name="connsiteY0" fmla="*/ 3760592 h 4560692"/>
-              <a:gd name="connsiteX1" fmla="*/ 0 w 9167787"/>
-              <a:gd name="connsiteY1" fmla="*/ 0 h 4560692"/>
-              <a:gd name="connsiteX2" fmla="*/ 8634387 w 9167787"/>
-              <a:gd name="connsiteY2" fmla="*/ 3760592 h 4560692"/>
-              <a:gd name="connsiteX3" fmla="*/ 8634387 w 9167787"/>
-              <a:gd name="connsiteY3" fmla="*/ 3493892 h 4560692"/>
-              <a:gd name="connsiteX4" fmla="*/ 9167787 w 9167787"/>
-              <a:gd name="connsiteY4" fmla="*/ 4027292 h 4560692"/>
-              <a:gd name="connsiteX5" fmla="*/ 8634387 w 9167787"/>
-              <a:gd name="connsiteY5" fmla="*/ 4560692 h 4560692"/>
-              <a:gd name="connsiteX6" fmla="*/ 8634387 w 9167787"/>
-              <a:gd name="connsiteY6" fmla="*/ 4293992 h 4560692"/>
-              <a:gd name="connsiteX7" fmla="*/ 5586387 w 9167787"/>
-              <a:gd name="connsiteY7" fmla="*/ 4293992 h 4560692"/>
-              <a:gd name="connsiteX8" fmla="*/ 5586387 w 9167787"/>
-              <a:gd name="connsiteY8" fmla="*/ 3760592 h 4560692"/>
-              <a:gd name="connsiteX0" fmla="*/ 0 w 3581400"/>
-              <a:gd name="connsiteY0" fmla="*/ 266700 h 1066800"/>
-              <a:gd name="connsiteX1" fmla="*/ 3048000 w 3581400"/>
-              <a:gd name="connsiteY1" fmla="*/ 266700 h 1066800"/>
-              <a:gd name="connsiteX2" fmla="*/ 3048000 w 3581400"/>
-              <a:gd name="connsiteY2" fmla="*/ 0 h 1066800"/>
-              <a:gd name="connsiteX3" fmla="*/ 3581400 w 3581400"/>
-              <a:gd name="connsiteY3" fmla="*/ 533400 h 1066800"/>
-              <a:gd name="connsiteX4" fmla="*/ 3048000 w 3581400"/>
-              <a:gd name="connsiteY4" fmla="*/ 1066800 h 1066800"/>
-              <a:gd name="connsiteX5" fmla="*/ 3048000 w 3581400"/>
-              <a:gd name="connsiteY5" fmla="*/ 800100 h 1066800"/>
-              <a:gd name="connsiteX6" fmla="*/ 0 w 3581400"/>
-              <a:gd name="connsiteY6" fmla="*/ 800100 h 1066800"/>
-              <a:gd name="connsiteX7" fmla="*/ 0 w 3581400"/>
-              <a:gd name="connsiteY7" fmla="*/ 266700 h 1066800"/>
-              <a:gd name="connsiteX0" fmla="*/ 664381 w 3581400"/>
-              <a:gd name="connsiteY0" fmla="*/ 1950842 h 1950842"/>
-              <a:gd name="connsiteX1" fmla="*/ 3048000 w 3581400"/>
-              <a:gd name="connsiteY1" fmla="*/ 266700 h 1950842"/>
-              <a:gd name="connsiteX2" fmla="*/ 3048000 w 3581400"/>
-              <a:gd name="connsiteY2" fmla="*/ 0 h 1950842"/>
-              <a:gd name="connsiteX3" fmla="*/ 3581400 w 3581400"/>
-              <a:gd name="connsiteY3" fmla="*/ 533400 h 1950842"/>
-              <a:gd name="connsiteX4" fmla="*/ 3048000 w 3581400"/>
-              <a:gd name="connsiteY4" fmla="*/ 1066800 h 1950842"/>
-              <a:gd name="connsiteX5" fmla="*/ 3048000 w 3581400"/>
-              <a:gd name="connsiteY5" fmla="*/ 800100 h 1950842"/>
-              <a:gd name="connsiteX6" fmla="*/ 0 w 3581400"/>
-              <a:gd name="connsiteY6" fmla="*/ 800100 h 1950842"/>
-              <a:gd name="connsiteX7" fmla="*/ 0 w 3581400"/>
-              <a:gd name="connsiteY7" fmla="*/ 266700 h 1950842"/>
-              <a:gd name="connsiteX0" fmla="*/ 664381 w 3581400"/>
-              <a:gd name="connsiteY0" fmla="*/ 2639646 h 2639646"/>
-              <a:gd name="connsiteX1" fmla="*/ 2188381 w 3581400"/>
-              <a:gd name="connsiteY1" fmla="*/ 0 h 2639646"/>
-              <a:gd name="connsiteX2" fmla="*/ 3048000 w 3581400"/>
-              <a:gd name="connsiteY2" fmla="*/ 688804 h 2639646"/>
-              <a:gd name="connsiteX3" fmla="*/ 3581400 w 3581400"/>
-              <a:gd name="connsiteY3" fmla="*/ 1222204 h 2639646"/>
-              <a:gd name="connsiteX4" fmla="*/ 3048000 w 3581400"/>
-              <a:gd name="connsiteY4" fmla="*/ 1755604 h 2639646"/>
-              <a:gd name="connsiteX5" fmla="*/ 3048000 w 3581400"/>
-              <a:gd name="connsiteY5" fmla="*/ 1488904 h 2639646"/>
-              <a:gd name="connsiteX6" fmla="*/ 0 w 3581400"/>
-              <a:gd name="connsiteY6" fmla="*/ 1488904 h 2639646"/>
-              <a:gd name="connsiteX7" fmla="*/ 0 w 3581400"/>
-              <a:gd name="connsiteY7" fmla="*/ 955504 h 2639646"/>
-              <a:gd name="connsiteX0" fmla="*/ 664381 w 3581400"/>
-              <a:gd name="connsiteY0" fmla="*/ 2772996 h 2772996"/>
-              <a:gd name="connsiteX1" fmla="*/ 2188381 w 3581400"/>
-              <a:gd name="connsiteY1" fmla="*/ 133350 h 2772996"/>
-              <a:gd name="connsiteX2" fmla="*/ 1957412 w 3581400"/>
-              <a:gd name="connsiteY2" fmla="*/ 0 h 2772996"/>
-              <a:gd name="connsiteX3" fmla="*/ 3581400 w 3581400"/>
-              <a:gd name="connsiteY3" fmla="*/ 1355554 h 2772996"/>
-              <a:gd name="connsiteX4" fmla="*/ 3048000 w 3581400"/>
-              <a:gd name="connsiteY4" fmla="*/ 1888954 h 2772996"/>
-              <a:gd name="connsiteX5" fmla="*/ 3048000 w 3581400"/>
-              <a:gd name="connsiteY5" fmla="*/ 1622254 h 2772996"/>
-              <a:gd name="connsiteX6" fmla="*/ 0 w 3581400"/>
-              <a:gd name="connsiteY6" fmla="*/ 1622254 h 2772996"/>
-              <a:gd name="connsiteX7" fmla="*/ 0 w 3581400"/>
-              <a:gd name="connsiteY7" fmla="*/ 1088854 h 2772996"/>
-              <a:gd name="connsiteX0" fmla="*/ 664381 w 3048000"/>
-              <a:gd name="connsiteY0" fmla="*/ 2968234 h 2968234"/>
-              <a:gd name="connsiteX1" fmla="*/ 2188381 w 3048000"/>
-              <a:gd name="connsiteY1" fmla="*/ 328588 h 2968234"/>
-              <a:gd name="connsiteX2" fmla="*/ 1957412 w 3048000"/>
-              <a:gd name="connsiteY2" fmla="*/ 195238 h 2968234"/>
-              <a:gd name="connsiteX3" fmla="*/ 2686050 w 3048000"/>
-              <a:gd name="connsiteY3" fmla="*/ 0 h 2968234"/>
-              <a:gd name="connsiteX4" fmla="*/ 3048000 w 3048000"/>
-              <a:gd name="connsiteY4" fmla="*/ 2084192 h 2968234"/>
-              <a:gd name="connsiteX5" fmla="*/ 3048000 w 3048000"/>
-              <a:gd name="connsiteY5" fmla="*/ 1817492 h 2968234"/>
-              <a:gd name="connsiteX6" fmla="*/ 0 w 3048000"/>
-              <a:gd name="connsiteY6" fmla="*/ 1817492 h 2968234"/>
-              <a:gd name="connsiteX7" fmla="*/ 0 w 3048000"/>
-              <a:gd name="connsiteY7" fmla="*/ 1284092 h 2968234"/>
-              <a:gd name="connsiteX0" fmla="*/ 664381 w 3048000"/>
-              <a:gd name="connsiteY0" fmla="*/ 2968234 h 2968234"/>
-              <a:gd name="connsiteX1" fmla="*/ 2188381 w 3048000"/>
-              <a:gd name="connsiteY1" fmla="*/ 328588 h 2968234"/>
-              <a:gd name="connsiteX2" fmla="*/ 1957412 w 3048000"/>
-              <a:gd name="connsiteY2" fmla="*/ 195238 h 2968234"/>
-              <a:gd name="connsiteX3" fmla="*/ 2686050 w 3048000"/>
-              <a:gd name="connsiteY3" fmla="*/ 0 h 2968234"/>
-              <a:gd name="connsiteX4" fmla="*/ 2881288 w 3048000"/>
-              <a:gd name="connsiteY4" fmla="*/ 728638 h 2968234"/>
-              <a:gd name="connsiteX5" fmla="*/ 3048000 w 3048000"/>
-              <a:gd name="connsiteY5" fmla="*/ 1817492 h 2968234"/>
-              <a:gd name="connsiteX6" fmla="*/ 0 w 3048000"/>
-              <a:gd name="connsiteY6" fmla="*/ 1817492 h 2968234"/>
-              <a:gd name="connsiteX7" fmla="*/ 0 w 3048000"/>
-              <a:gd name="connsiteY7" fmla="*/ 1284092 h 2968234"/>
-              <a:gd name="connsiteX0" fmla="*/ 664381 w 2881288"/>
-              <a:gd name="connsiteY0" fmla="*/ 2968234 h 2968234"/>
-              <a:gd name="connsiteX1" fmla="*/ 2188381 w 2881288"/>
-              <a:gd name="connsiteY1" fmla="*/ 328588 h 2968234"/>
-              <a:gd name="connsiteX2" fmla="*/ 1957412 w 2881288"/>
-              <a:gd name="connsiteY2" fmla="*/ 195238 h 2968234"/>
-              <a:gd name="connsiteX3" fmla="*/ 2686050 w 2881288"/>
-              <a:gd name="connsiteY3" fmla="*/ 0 h 2968234"/>
-              <a:gd name="connsiteX4" fmla="*/ 2881288 w 2881288"/>
-              <a:gd name="connsiteY4" fmla="*/ 728638 h 2968234"/>
-              <a:gd name="connsiteX5" fmla="*/ 2650319 w 2881288"/>
-              <a:gd name="connsiteY5" fmla="*/ 595288 h 2968234"/>
-              <a:gd name="connsiteX6" fmla="*/ 0 w 2881288"/>
-              <a:gd name="connsiteY6" fmla="*/ 1817492 h 2968234"/>
-              <a:gd name="connsiteX7" fmla="*/ 0 w 2881288"/>
-              <a:gd name="connsiteY7" fmla="*/ 1284092 h 2968234"/>
-              <a:gd name="connsiteX0" fmla="*/ 664381 w 2881288"/>
-              <a:gd name="connsiteY0" fmla="*/ 2968234 h 3234934"/>
-              <a:gd name="connsiteX1" fmla="*/ 2188381 w 2881288"/>
-              <a:gd name="connsiteY1" fmla="*/ 328588 h 3234934"/>
-              <a:gd name="connsiteX2" fmla="*/ 1957412 w 2881288"/>
-              <a:gd name="connsiteY2" fmla="*/ 195238 h 3234934"/>
-              <a:gd name="connsiteX3" fmla="*/ 2686050 w 2881288"/>
-              <a:gd name="connsiteY3" fmla="*/ 0 h 3234934"/>
-              <a:gd name="connsiteX4" fmla="*/ 2881288 w 2881288"/>
-              <a:gd name="connsiteY4" fmla="*/ 728638 h 3234934"/>
-              <a:gd name="connsiteX5" fmla="*/ 2650319 w 2881288"/>
-              <a:gd name="connsiteY5" fmla="*/ 595288 h 3234934"/>
-              <a:gd name="connsiteX6" fmla="*/ 1126319 w 2881288"/>
-              <a:gd name="connsiteY6" fmla="*/ 3234934 h 3234934"/>
-              <a:gd name="connsiteX7" fmla="*/ 0 w 2881288"/>
-              <a:gd name="connsiteY7" fmla="*/ 1284092 h 3234934"/>
-              <a:gd name="connsiteX0" fmla="*/ 0 w 2216907"/>
-              <a:gd name="connsiteY0" fmla="*/ 2968234 h 3234934"/>
-              <a:gd name="connsiteX1" fmla="*/ 1524000 w 2216907"/>
-              <a:gd name="connsiteY1" fmla="*/ 328588 h 3234934"/>
-              <a:gd name="connsiteX2" fmla="*/ 1293031 w 2216907"/>
-              <a:gd name="connsiteY2" fmla="*/ 195238 h 3234934"/>
-              <a:gd name="connsiteX3" fmla="*/ 2021669 w 2216907"/>
-              <a:gd name="connsiteY3" fmla="*/ 0 h 3234934"/>
-              <a:gd name="connsiteX4" fmla="*/ 2216907 w 2216907"/>
-              <a:gd name="connsiteY4" fmla="*/ 728638 h 3234934"/>
-              <a:gd name="connsiteX5" fmla="*/ 1985938 w 2216907"/>
-              <a:gd name="connsiteY5" fmla="*/ 595288 h 3234934"/>
-              <a:gd name="connsiteX6" fmla="*/ 461938 w 2216907"/>
-              <a:gd name="connsiteY6" fmla="*/ 3234934 h 3234934"/>
-              <a:gd name="connsiteX7" fmla="*/ 0 w 2216907"/>
-              <a:gd name="connsiteY7" fmla="*/ 2968234 h 3234934"/>
-            </a:gdLst>
-            <a:ahLst/>
-            <a:cxnLst>
-              <a:cxn ang="0">
-                <a:pos x="connsiteX0" y="connsiteY0"/>
-              </a:cxn>
-              <a:cxn ang="0">
-                <a:pos x="connsiteX1" y="connsiteY1"/>
-              </a:cxn>
-              <a:cxn ang="0">
-                <a:pos x="connsiteX2" y="connsiteY2"/>
-              </a:cxn>
-              <a:cxn ang="0">
-                <a:pos x="connsiteX3" y="connsiteY3"/>
-              </a:cxn>
-              <a:cxn ang="0">
-                <a:pos x="connsiteX4" y="connsiteY4"/>
-              </a:cxn>
-              <a:cxn ang="0">
-                <a:pos x="connsiteX5" y="connsiteY5"/>
-              </a:cxn>
-              <a:cxn ang="0">
-                <a:pos x="connsiteX6" y="connsiteY6"/>
-              </a:cxn>
-              <a:cxn ang="0">
-                <a:pos x="connsiteX7" y="connsiteY7"/>
-              </a:cxn>
-            </a:cxnLst>
-            <a:rect l="l" t="t" r="r" b="b"/>
-            <a:pathLst>
-              <a:path w="2216907" h="3234934">
-                <a:moveTo>
-                  <a:pt x="0" y="2968234"/>
-                </a:moveTo>
-                <a:lnTo>
-                  <a:pt x="1524000" y="328588"/>
-                </a:lnTo>
-                <a:lnTo>
-                  <a:pt x="1293031" y="195238"/>
-                </a:lnTo>
-                <a:lnTo>
-                  <a:pt x="2021669" y="0"/>
-                </a:lnTo>
-                <a:lnTo>
-                  <a:pt x="2216907" y="728638"/>
-                </a:lnTo>
-                <a:lnTo>
-                  <a:pt x="1985938" y="595288"/>
-                </a:lnTo>
-                <a:lnTo>
-                  <a:pt x="461938" y="3234934"/>
-                </a:lnTo>
-                <a:lnTo>
-                  <a:pt x="0" y="2968234"/>
-                </a:lnTo>
-                <a:close/>
-              </a:path>
-            </a:pathLst>
-          </a:custGeom>
+          </a:prstGeom>
         </p:spPr>
         <p:style>
           <a:lnRef idx="2">
@@ -18889,136 +16711,13 @@
           <p:nvPr/>
         </p:nvSpPr>
         <p:spPr>
-          <a:xfrm>
-            <a:off x="1828800" y="3532350"/>
-            <a:ext cx="2121971" cy="2179084"/>
+          <a:xfrm rot="18672083">
+            <a:off x="1975386" y="4145642"/>
+            <a:ext cx="1828800" cy="1219200"/>
           </a:xfrm>
-          <a:custGeom>
+          <a:prstGeom prst="rect">
             <a:avLst/>
-            <a:gdLst>
-              <a:gd name="connsiteX0" fmla="*/ 0 w 1828800"/>
-              <a:gd name="connsiteY0" fmla="*/ 0 h 1219200"/>
-              <a:gd name="connsiteX1" fmla="*/ 1828800 w 1828800"/>
-              <a:gd name="connsiteY1" fmla="*/ 0 h 1219200"/>
-              <a:gd name="connsiteX2" fmla="*/ 1828800 w 1828800"/>
-              <a:gd name="connsiteY2" fmla="*/ 1219200 h 1219200"/>
-              <a:gd name="connsiteX3" fmla="*/ 0 w 1828800"/>
-              <a:gd name="connsiteY3" fmla="*/ 1219200 h 1219200"/>
-              <a:gd name="connsiteX4" fmla="*/ 0 w 1828800"/>
-              <a:gd name="connsiteY4" fmla="*/ 0 h 1219200"/>
-              <a:gd name="connsiteX0" fmla="*/ 1975386 w 3804186"/>
-              <a:gd name="connsiteY0" fmla="*/ 3604142 h 4823342"/>
-              <a:gd name="connsiteX1" fmla="*/ 0 w 3804186"/>
-              <a:gd name="connsiteY1" fmla="*/ 0 h 4823342"/>
-              <a:gd name="connsiteX2" fmla="*/ 3804186 w 3804186"/>
-              <a:gd name="connsiteY2" fmla="*/ 3604142 h 4823342"/>
-              <a:gd name="connsiteX3" fmla="*/ 3804186 w 3804186"/>
-              <a:gd name="connsiteY3" fmla="*/ 4823342 h 4823342"/>
-              <a:gd name="connsiteX4" fmla="*/ 1975386 w 3804186"/>
-              <a:gd name="connsiteY4" fmla="*/ 4823342 h 4823342"/>
-              <a:gd name="connsiteX5" fmla="*/ 1975386 w 3804186"/>
-              <a:gd name="connsiteY5" fmla="*/ 3604142 h 4823342"/>
-              <a:gd name="connsiteX0" fmla="*/ 0 w 1828800"/>
-              <a:gd name="connsiteY0" fmla="*/ 0 h 1219200"/>
-              <a:gd name="connsiteX1" fmla="*/ 1828800 w 1828800"/>
-              <a:gd name="connsiteY1" fmla="*/ 0 h 1219200"/>
-              <a:gd name="connsiteX2" fmla="*/ 1828800 w 1828800"/>
-              <a:gd name="connsiteY2" fmla="*/ 1219200 h 1219200"/>
-              <a:gd name="connsiteX3" fmla="*/ 0 w 1828800"/>
-              <a:gd name="connsiteY3" fmla="*/ 1219200 h 1219200"/>
-              <a:gd name="connsiteX4" fmla="*/ 0 w 1828800"/>
-              <a:gd name="connsiteY4" fmla="*/ 0 h 1219200"/>
-              <a:gd name="connsiteX0" fmla="*/ 0 w 1975385"/>
-              <a:gd name="connsiteY0" fmla="*/ 896045 h 1219200"/>
-              <a:gd name="connsiteX1" fmla="*/ 1975385 w 1975385"/>
-              <a:gd name="connsiteY1" fmla="*/ 0 h 1219200"/>
-              <a:gd name="connsiteX2" fmla="*/ 1975385 w 1975385"/>
-              <a:gd name="connsiteY2" fmla="*/ 1219200 h 1219200"/>
-              <a:gd name="connsiteX3" fmla="*/ 146585 w 1975385"/>
-              <a:gd name="connsiteY3" fmla="*/ 1219200 h 1219200"/>
-              <a:gd name="connsiteX4" fmla="*/ 146585 w 1975385"/>
-              <a:gd name="connsiteY4" fmla="*/ 0 h 1219200"/>
-              <a:gd name="connsiteX0" fmla="*/ 0 w 1975385"/>
-              <a:gd name="connsiteY0" fmla="*/ 1375987 h 1699142"/>
-              <a:gd name="connsiteX1" fmla="*/ 1204646 w 1975385"/>
-              <a:gd name="connsiteY1" fmla="*/ 0 h 1699142"/>
-              <a:gd name="connsiteX2" fmla="*/ 1975385 w 1975385"/>
-              <a:gd name="connsiteY2" fmla="*/ 1699142 h 1699142"/>
-              <a:gd name="connsiteX3" fmla="*/ 146585 w 1975385"/>
-              <a:gd name="connsiteY3" fmla="*/ 1699142 h 1699142"/>
-              <a:gd name="connsiteX4" fmla="*/ 146585 w 1975385"/>
-              <a:gd name="connsiteY4" fmla="*/ 479942 h 1699142"/>
-              <a:gd name="connsiteX0" fmla="*/ 0 w 2121971"/>
-              <a:gd name="connsiteY0" fmla="*/ 1375987 h 1699142"/>
-              <a:gd name="connsiteX1" fmla="*/ 1204646 w 2121971"/>
-              <a:gd name="connsiteY1" fmla="*/ 0 h 1699142"/>
-              <a:gd name="connsiteX2" fmla="*/ 2121971 w 2121971"/>
-              <a:gd name="connsiteY2" fmla="*/ 803097 h 1699142"/>
-              <a:gd name="connsiteX3" fmla="*/ 146585 w 2121971"/>
-              <a:gd name="connsiteY3" fmla="*/ 1699142 h 1699142"/>
-              <a:gd name="connsiteX4" fmla="*/ 146585 w 2121971"/>
-              <a:gd name="connsiteY4" fmla="*/ 479942 h 1699142"/>
-              <a:gd name="connsiteX0" fmla="*/ 0 w 2121971"/>
-              <a:gd name="connsiteY0" fmla="*/ 1375987 h 2179084"/>
-              <a:gd name="connsiteX1" fmla="*/ 1204646 w 2121971"/>
-              <a:gd name="connsiteY1" fmla="*/ 0 h 2179084"/>
-              <a:gd name="connsiteX2" fmla="*/ 2121971 w 2121971"/>
-              <a:gd name="connsiteY2" fmla="*/ 803097 h 2179084"/>
-              <a:gd name="connsiteX3" fmla="*/ 917326 w 2121971"/>
-              <a:gd name="connsiteY3" fmla="*/ 2179084 h 2179084"/>
-              <a:gd name="connsiteX4" fmla="*/ 146585 w 2121971"/>
-              <a:gd name="connsiteY4" fmla="*/ 479942 h 2179084"/>
-              <a:gd name="connsiteX0" fmla="*/ 0 w 2121971"/>
-              <a:gd name="connsiteY0" fmla="*/ 1375987 h 2179084"/>
-              <a:gd name="connsiteX1" fmla="*/ 1204646 w 2121971"/>
-              <a:gd name="connsiteY1" fmla="*/ 0 h 2179084"/>
-              <a:gd name="connsiteX2" fmla="*/ 2121971 w 2121971"/>
-              <a:gd name="connsiteY2" fmla="*/ 803097 h 2179084"/>
-              <a:gd name="connsiteX3" fmla="*/ 917326 w 2121971"/>
-              <a:gd name="connsiteY3" fmla="*/ 2179084 h 2179084"/>
-              <a:gd name="connsiteX4" fmla="*/ 1 w 2121971"/>
-              <a:gd name="connsiteY4" fmla="*/ 1375987 h 2179084"/>
-            </a:gdLst>
-            <a:ahLst/>
-            <a:cxnLst>
-              <a:cxn ang="0">
-                <a:pos x="connsiteX0" y="connsiteY0"/>
-              </a:cxn>
-              <a:cxn ang="0">
-                <a:pos x="connsiteX1" y="connsiteY1"/>
-              </a:cxn>
-              <a:cxn ang="0">
-                <a:pos x="connsiteX2" y="connsiteY2"/>
-              </a:cxn>
-              <a:cxn ang="0">
-                <a:pos x="connsiteX3" y="connsiteY3"/>
-              </a:cxn>
-              <a:cxn ang="0">
-                <a:pos x="connsiteX4" y="connsiteY4"/>
-              </a:cxn>
-            </a:cxnLst>
-            <a:rect l="l" t="t" r="r" b="b"/>
-            <a:pathLst>
-              <a:path w="2121971" h="2179084">
-                <a:moveTo>
-                  <a:pt x="0" y="1375987"/>
-                </a:moveTo>
-                <a:lnTo>
-                  <a:pt x="1204646" y="0"/>
-                </a:lnTo>
-                <a:lnTo>
-                  <a:pt x="2121971" y="803097"/>
-                </a:lnTo>
-                <a:lnTo>
-                  <a:pt x="917326" y="2179084"/>
-                </a:lnTo>
-                <a:lnTo>
-                  <a:pt x="1" y="1375987"/>
-                </a:lnTo>
-                <a:close/>
-              </a:path>
-            </a:pathLst>
-          </a:custGeom>
+          </a:prstGeom>
         </p:spPr>
         <p:style>
           <a:lnRef idx="2">
@@ -19048,7 +16747,7 @@
     </p:spTree>
     <p:extLst>
       <p:ext uri="{BB962C8B-B14F-4D97-AF65-F5344CB8AC3E}">
-        <p14:creationId xmlns:p14="http://schemas.microsoft.com/office/powerpoint/2010/main" val="3607379794"/>
+        <p14:creationId xmlns:p14="http://schemas.microsoft.com/office/powerpoint/2010/main" val="774710383"/>
       </p:ext>
     </p:extLst>
   </p:cSld>
@@ -19083,7 +16782,7 @@
         </p:nvSpPr>
         <p:spPr>
           <a:xfrm>
-            <a:off x="533400" y="2512817"/>
+            <a:off x="533400" y="2579492"/>
             <a:ext cx="1828800" cy="1219200"/>
           </a:xfrm>
           <a:prstGeom prst="rect">
@@ -19123,7 +16822,7 @@
         </p:nvSpPr>
         <p:spPr>
           <a:xfrm>
-            <a:off x="4431228" y="2208017"/>
+            <a:off x="4431228" y="2274692"/>
             <a:ext cx="1828800" cy="1828800"/>
           </a:xfrm>
           <a:prstGeom prst="ellipse">
@@ -19162,250 +16861,13 @@
           <p:nvPr/>
         </p:nvSpPr>
         <p:spPr>
-          <a:xfrm>
-            <a:off x="6250768" y="1504950"/>
-            <a:ext cx="2216907" cy="3234934"/>
+          <a:xfrm rot="18000000">
+            <a:off x="5586387" y="2655692"/>
+            <a:ext cx="3581400" cy="1066800"/>
           </a:xfrm>
-          <a:custGeom>
+          <a:prstGeom prst="rightArrow">
             <a:avLst/>
-            <a:gdLst>
-              <a:gd name="connsiteX0" fmla="*/ 0 w 3581400"/>
-              <a:gd name="connsiteY0" fmla="*/ 266700 h 1066800"/>
-              <a:gd name="connsiteX1" fmla="*/ 3048000 w 3581400"/>
-              <a:gd name="connsiteY1" fmla="*/ 266700 h 1066800"/>
-              <a:gd name="connsiteX2" fmla="*/ 3048000 w 3581400"/>
-              <a:gd name="connsiteY2" fmla="*/ 0 h 1066800"/>
-              <a:gd name="connsiteX3" fmla="*/ 3581400 w 3581400"/>
-              <a:gd name="connsiteY3" fmla="*/ 533400 h 1066800"/>
-              <a:gd name="connsiteX4" fmla="*/ 3048000 w 3581400"/>
-              <a:gd name="connsiteY4" fmla="*/ 1066800 h 1066800"/>
-              <a:gd name="connsiteX5" fmla="*/ 3048000 w 3581400"/>
-              <a:gd name="connsiteY5" fmla="*/ 800100 h 1066800"/>
-              <a:gd name="connsiteX6" fmla="*/ 0 w 3581400"/>
-              <a:gd name="connsiteY6" fmla="*/ 800100 h 1066800"/>
-              <a:gd name="connsiteX7" fmla="*/ 0 w 3581400"/>
-              <a:gd name="connsiteY7" fmla="*/ 266700 h 1066800"/>
-              <a:gd name="connsiteX0" fmla="*/ 5586387 w 9167787"/>
-              <a:gd name="connsiteY0" fmla="*/ 3760592 h 4560692"/>
-              <a:gd name="connsiteX1" fmla="*/ 0 w 9167787"/>
-              <a:gd name="connsiteY1" fmla="*/ 0 h 4560692"/>
-              <a:gd name="connsiteX2" fmla="*/ 8634387 w 9167787"/>
-              <a:gd name="connsiteY2" fmla="*/ 3760592 h 4560692"/>
-              <a:gd name="connsiteX3" fmla="*/ 8634387 w 9167787"/>
-              <a:gd name="connsiteY3" fmla="*/ 3493892 h 4560692"/>
-              <a:gd name="connsiteX4" fmla="*/ 9167787 w 9167787"/>
-              <a:gd name="connsiteY4" fmla="*/ 4027292 h 4560692"/>
-              <a:gd name="connsiteX5" fmla="*/ 8634387 w 9167787"/>
-              <a:gd name="connsiteY5" fmla="*/ 4560692 h 4560692"/>
-              <a:gd name="connsiteX6" fmla="*/ 8634387 w 9167787"/>
-              <a:gd name="connsiteY6" fmla="*/ 4293992 h 4560692"/>
-              <a:gd name="connsiteX7" fmla="*/ 5586387 w 9167787"/>
-              <a:gd name="connsiteY7" fmla="*/ 4293992 h 4560692"/>
-              <a:gd name="connsiteX8" fmla="*/ 5586387 w 9167787"/>
-              <a:gd name="connsiteY8" fmla="*/ 3760592 h 4560692"/>
-              <a:gd name="connsiteX0" fmla="*/ 0 w 3581400"/>
-              <a:gd name="connsiteY0" fmla="*/ 266700 h 1066800"/>
-              <a:gd name="connsiteX1" fmla="*/ 3048000 w 3581400"/>
-              <a:gd name="connsiteY1" fmla="*/ 266700 h 1066800"/>
-              <a:gd name="connsiteX2" fmla="*/ 3048000 w 3581400"/>
-              <a:gd name="connsiteY2" fmla="*/ 0 h 1066800"/>
-              <a:gd name="connsiteX3" fmla="*/ 3581400 w 3581400"/>
-              <a:gd name="connsiteY3" fmla="*/ 533400 h 1066800"/>
-              <a:gd name="connsiteX4" fmla="*/ 3048000 w 3581400"/>
-              <a:gd name="connsiteY4" fmla="*/ 1066800 h 1066800"/>
-              <a:gd name="connsiteX5" fmla="*/ 3048000 w 3581400"/>
-              <a:gd name="connsiteY5" fmla="*/ 800100 h 1066800"/>
-              <a:gd name="connsiteX6" fmla="*/ 0 w 3581400"/>
-              <a:gd name="connsiteY6" fmla="*/ 800100 h 1066800"/>
-              <a:gd name="connsiteX7" fmla="*/ 0 w 3581400"/>
-              <a:gd name="connsiteY7" fmla="*/ 266700 h 1066800"/>
-              <a:gd name="connsiteX0" fmla="*/ 664381 w 3581400"/>
-              <a:gd name="connsiteY0" fmla="*/ 1950842 h 1950842"/>
-              <a:gd name="connsiteX1" fmla="*/ 3048000 w 3581400"/>
-              <a:gd name="connsiteY1" fmla="*/ 266700 h 1950842"/>
-              <a:gd name="connsiteX2" fmla="*/ 3048000 w 3581400"/>
-              <a:gd name="connsiteY2" fmla="*/ 0 h 1950842"/>
-              <a:gd name="connsiteX3" fmla="*/ 3581400 w 3581400"/>
-              <a:gd name="connsiteY3" fmla="*/ 533400 h 1950842"/>
-              <a:gd name="connsiteX4" fmla="*/ 3048000 w 3581400"/>
-              <a:gd name="connsiteY4" fmla="*/ 1066800 h 1950842"/>
-              <a:gd name="connsiteX5" fmla="*/ 3048000 w 3581400"/>
-              <a:gd name="connsiteY5" fmla="*/ 800100 h 1950842"/>
-              <a:gd name="connsiteX6" fmla="*/ 0 w 3581400"/>
-              <a:gd name="connsiteY6" fmla="*/ 800100 h 1950842"/>
-              <a:gd name="connsiteX7" fmla="*/ 0 w 3581400"/>
-              <a:gd name="connsiteY7" fmla="*/ 266700 h 1950842"/>
-              <a:gd name="connsiteX0" fmla="*/ 664381 w 3581400"/>
-              <a:gd name="connsiteY0" fmla="*/ 2639646 h 2639646"/>
-              <a:gd name="connsiteX1" fmla="*/ 2188381 w 3581400"/>
-              <a:gd name="connsiteY1" fmla="*/ 0 h 2639646"/>
-              <a:gd name="connsiteX2" fmla="*/ 3048000 w 3581400"/>
-              <a:gd name="connsiteY2" fmla="*/ 688804 h 2639646"/>
-              <a:gd name="connsiteX3" fmla="*/ 3581400 w 3581400"/>
-              <a:gd name="connsiteY3" fmla="*/ 1222204 h 2639646"/>
-              <a:gd name="connsiteX4" fmla="*/ 3048000 w 3581400"/>
-              <a:gd name="connsiteY4" fmla="*/ 1755604 h 2639646"/>
-              <a:gd name="connsiteX5" fmla="*/ 3048000 w 3581400"/>
-              <a:gd name="connsiteY5" fmla="*/ 1488904 h 2639646"/>
-              <a:gd name="connsiteX6" fmla="*/ 0 w 3581400"/>
-              <a:gd name="connsiteY6" fmla="*/ 1488904 h 2639646"/>
-              <a:gd name="connsiteX7" fmla="*/ 0 w 3581400"/>
-              <a:gd name="connsiteY7" fmla="*/ 955504 h 2639646"/>
-              <a:gd name="connsiteX0" fmla="*/ 664381 w 3581400"/>
-              <a:gd name="connsiteY0" fmla="*/ 2772996 h 2772996"/>
-              <a:gd name="connsiteX1" fmla="*/ 2188381 w 3581400"/>
-              <a:gd name="connsiteY1" fmla="*/ 133350 h 2772996"/>
-              <a:gd name="connsiteX2" fmla="*/ 1957412 w 3581400"/>
-              <a:gd name="connsiteY2" fmla="*/ 0 h 2772996"/>
-              <a:gd name="connsiteX3" fmla="*/ 3581400 w 3581400"/>
-              <a:gd name="connsiteY3" fmla="*/ 1355554 h 2772996"/>
-              <a:gd name="connsiteX4" fmla="*/ 3048000 w 3581400"/>
-              <a:gd name="connsiteY4" fmla="*/ 1888954 h 2772996"/>
-              <a:gd name="connsiteX5" fmla="*/ 3048000 w 3581400"/>
-              <a:gd name="connsiteY5" fmla="*/ 1622254 h 2772996"/>
-              <a:gd name="connsiteX6" fmla="*/ 0 w 3581400"/>
-              <a:gd name="connsiteY6" fmla="*/ 1622254 h 2772996"/>
-              <a:gd name="connsiteX7" fmla="*/ 0 w 3581400"/>
-              <a:gd name="connsiteY7" fmla="*/ 1088854 h 2772996"/>
-              <a:gd name="connsiteX0" fmla="*/ 664381 w 3048000"/>
-              <a:gd name="connsiteY0" fmla="*/ 2968234 h 2968234"/>
-              <a:gd name="connsiteX1" fmla="*/ 2188381 w 3048000"/>
-              <a:gd name="connsiteY1" fmla="*/ 328588 h 2968234"/>
-              <a:gd name="connsiteX2" fmla="*/ 1957412 w 3048000"/>
-              <a:gd name="connsiteY2" fmla="*/ 195238 h 2968234"/>
-              <a:gd name="connsiteX3" fmla="*/ 2686050 w 3048000"/>
-              <a:gd name="connsiteY3" fmla="*/ 0 h 2968234"/>
-              <a:gd name="connsiteX4" fmla="*/ 3048000 w 3048000"/>
-              <a:gd name="connsiteY4" fmla="*/ 2084192 h 2968234"/>
-              <a:gd name="connsiteX5" fmla="*/ 3048000 w 3048000"/>
-              <a:gd name="connsiteY5" fmla="*/ 1817492 h 2968234"/>
-              <a:gd name="connsiteX6" fmla="*/ 0 w 3048000"/>
-              <a:gd name="connsiteY6" fmla="*/ 1817492 h 2968234"/>
-              <a:gd name="connsiteX7" fmla="*/ 0 w 3048000"/>
-              <a:gd name="connsiteY7" fmla="*/ 1284092 h 2968234"/>
-              <a:gd name="connsiteX0" fmla="*/ 664381 w 3048000"/>
-              <a:gd name="connsiteY0" fmla="*/ 2968234 h 2968234"/>
-              <a:gd name="connsiteX1" fmla="*/ 2188381 w 3048000"/>
-              <a:gd name="connsiteY1" fmla="*/ 328588 h 2968234"/>
-              <a:gd name="connsiteX2" fmla="*/ 1957412 w 3048000"/>
-              <a:gd name="connsiteY2" fmla="*/ 195238 h 2968234"/>
-              <a:gd name="connsiteX3" fmla="*/ 2686050 w 3048000"/>
-              <a:gd name="connsiteY3" fmla="*/ 0 h 2968234"/>
-              <a:gd name="connsiteX4" fmla="*/ 2881288 w 3048000"/>
-              <a:gd name="connsiteY4" fmla="*/ 728638 h 2968234"/>
-              <a:gd name="connsiteX5" fmla="*/ 3048000 w 3048000"/>
-              <a:gd name="connsiteY5" fmla="*/ 1817492 h 2968234"/>
-              <a:gd name="connsiteX6" fmla="*/ 0 w 3048000"/>
-              <a:gd name="connsiteY6" fmla="*/ 1817492 h 2968234"/>
-              <a:gd name="connsiteX7" fmla="*/ 0 w 3048000"/>
-              <a:gd name="connsiteY7" fmla="*/ 1284092 h 2968234"/>
-              <a:gd name="connsiteX0" fmla="*/ 664381 w 2881288"/>
-              <a:gd name="connsiteY0" fmla="*/ 2968234 h 2968234"/>
-              <a:gd name="connsiteX1" fmla="*/ 2188381 w 2881288"/>
-              <a:gd name="connsiteY1" fmla="*/ 328588 h 2968234"/>
-              <a:gd name="connsiteX2" fmla="*/ 1957412 w 2881288"/>
-              <a:gd name="connsiteY2" fmla="*/ 195238 h 2968234"/>
-              <a:gd name="connsiteX3" fmla="*/ 2686050 w 2881288"/>
-              <a:gd name="connsiteY3" fmla="*/ 0 h 2968234"/>
-              <a:gd name="connsiteX4" fmla="*/ 2881288 w 2881288"/>
-              <a:gd name="connsiteY4" fmla="*/ 728638 h 2968234"/>
-              <a:gd name="connsiteX5" fmla="*/ 2650319 w 2881288"/>
-              <a:gd name="connsiteY5" fmla="*/ 595288 h 2968234"/>
-              <a:gd name="connsiteX6" fmla="*/ 0 w 2881288"/>
-              <a:gd name="connsiteY6" fmla="*/ 1817492 h 2968234"/>
-              <a:gd name="connsiteX7" fmla="*/ 0 w 2881288"/>
-              <a:gd name="connsiteY7" fmla="*/ 1284092 h 2968234"/>
-              <a:gd name="connsiteX0" fmla="*/ 664381 w 2881288"/>
-              <a:gd name="connsiteY0" fmla="*/ 2968234 h 3234934"/>
-              <a:gd name="connsiteX1" fmla="*/ 2188381 w 2881288"/>
-              <a:gd name="connsiteY1" fmla="*/ 328588 h 3234934"/>
-              <a:gd name="connsiteX2" fmla="*/ 1957412 w 2881288"/>
-              <a:gd name="connsiteY2" fmla="*/ 195238 h 3234934"/>
-              <a:gd name="connsiteX3" fmla="*/ 2686050 w 2881288"/>
-              <a:gd name="connsiteY3" fmla="*/ 0 h 3234934"/>
-              <a:gd name="connsiteX4" fmla="*/ 2881288 w 2881288"/>
-              <a:gd name="connsiteY4" fmla="*/ 728638 h 3234934"/>
-              <a:gd name="connsiteX5" fmla="*/ 2650319 w 2881288"/>
-              <a:gd name="connsiteY5" fmla="*/ 595288 h 3234934"/>
-              <a:gd name="connsiteX6" fmla="*/ 1126319 w 2881288"/>
-              <a:gd name="connsiteY6" fmla="*/ 3234934 h 3234934"/>
-              <a:gd name="connsiteX7" fmla="*/ 0 w 2881288"/>
-              <a:gd name="connsiteY7" fmla="*/ 1284092 h 3234934"/>
-              <a:gd name="connsiteX0" fmla="*/ 0 w 2216907"/>
-              <a:gd name="connsiteY0" fmla="*/ 2968234 h 3234934"/>
-              <a:gd name="connsiteX1" fmla="*/ 1524000 w 2216907"/>
-              <a:gd name="connsiteY1" fmla="*/ 328588 h 3234934"/>
-              <a:gd name="connsiteX2" fmla="*/ 1293031 w 2216907"/>
-              <a:gd name="connsiteY2" fmla="*/ 195238 h 3234934"/>
-              <a:gd name="connsiteX3" fmla="*/ 2021669 w 2216907"/>
-              <a:gd name="connsiteY3" fmla="*/ 0 h 3234934"/>
-              <a:gd name="connsiteX4" fmla="*/ 2216907 w 2216907"/>
-              <a:gd name="connsiteY4" fmla="*/ 728638 h 3234934"/>
-              <a:gd name="connsiteX5" fmla="*/ 1985938 w 2216907"/>
-              <a:gd name="connsiteY5" fmla="*/ 595288 h 3234934"/>
-              <a:gd name="connsiteX6" fmla="*/ 461938 w 2216907"/>
-              <a:gd name="connsiteY6" fmla="*/ 3234934 h 3234934"/>
-              <a:gd name="connsiteX7" fmla="*/ 0 w 2216907"/>
-              <a:gd name="connsiteY7" fmla="*/ 2968234 h 3234934"/>
-            </a:gdLst>
-            <a:ahLst/>
-            <a:cxnLst>
-              <a:cxn ang="0">
-                <a:pos x="connsiteX0" y="connsiteY0"/>
-              </a:cxn>
-              <a:cxn ang="0">
-                <a:pos x="connsiteX1" y="connsiteY1"/>
-              </a:cxn>
-              <a:cxn ang="0">
-                <a:pos x="connsiteX2" y="connsiteY2"/>
-              </a:cxn>
-              <a:cxn ang="0">
-                <a:pos x="connsiteX3" y="connsiteY3"/>
-              </a:cxn>
-              <a:cxn ang="0">
-                <a:pos x="connsiteX4" y="connsiteY4"/>
-              </a:cxn>
-              <a:cxn ang="0">
-                <a:pos x="connsiteX5" y="connsiteY5"/>
-              </a:cxn>
-              <a:cxn ang="0">
-                <a:pos x="connsiteX6" y="connsiteY6"/>
-              </a:cxn>
-              <a:cxn ang="0">
-                <a:pos x="connsiteX7" y="connsiteY7"/>
-              </a:cxn>
-            </a:cxnLst>
-            <a:rect l="l" t="t" r="r" b="b"/>
-            <a:pathLst>
-              <a:path w="2216907" h="3234934">
-                <a:moveTo>
-                  <a:pt x="0" y="2968234"/>
-                </a:moveTo>
-                <a:lnTo>
-                  <a:pt x="1524000" y="328588"/>
-                </a:lnTo>
-                <a:lnTo>
-                  <a:pt x="1293031" y="195238"/>
-                </a:lnTo>
-                <a:lnTo>
-                  <a:pt x="2021669" y="0"/>
-                </a:lnTo>
-                <a:lnTo>
-                  <a:pt x="2216907" y="728638"/>
-                </a:lnTo>
-                <a:lnTo>
-                  <a:pt x="1985938" y="595288"/>
-                </a:lnTo>
-                <a:lnTo>
-                  <a:pt x="461938" y="3234934"/>
-                </a:lnTo>
-                <a:lnTo>
-                  <a:pt x="0" y="2968234"/>
-                </a:lnTo>
-                <a:close/>
-              </a:path>
-            </a:pathLst>
-          </a:custGeom>
+          </a:prstGeom>
         </p:spPr>
         <p:style>
           <a:lnRef idx="2">
@@ -19439,136 +16901,13 @@
           <p:nvPr/>
         </p:nvSpPr>
         <p:spPr>
-          <a:xfrm>
-            <a:off x="1828800" y="2032875"/>
-            <a:ext cx="2121971" cy="2179084"/>
+          <a:xfrm rot="18672083">
+            <a:off x="1975386" y="2579492"/>
+            <a:ext cx="1828800" cy="1219200"/>
           </a:xfrm>
-          <a:custGeom>
+          <a:prstGeom prst="rect">
             <a:avLst/>
-            <a:gdLst>
-              <a:gd name="connsiteX0" fmla="*/ 0 w 1828800"/>
-              <a:gd name="connsiteY0" fmla="*/ 0 h 1219200"/>
-              <a:gd name="connsiteX1" fmla="*/ 1828800 w 1828800"/>
-              <a:gd name="connsiteY1" fmla="*/ 0 h 1219200"/>
-              <a:gd name="connsiteX2" fmla="*/ 1828800 w 1828800"/>
-              <a:gd name="connsiteY2" fmla="*/ 1219200 h 1219200"/>
-              <a:gd name="connsiteX3" fmla="*/ 0 w 1828800"/>
-              <a:gd name="connsiteY3" fmla="*/ 1219200 h 1219200"/>
-              <a:gd name="connsiteX4" fmla="*/ 0 w 1828800"/>
-              <a:gd name="connsiteY4" fmla="*/ 0 h 1219200"/>
-              <a:gd name="connsiteX0" fmla="*/ 1975386 w 3804186"/>
-              <a:gd name="connsiteY0" fmla="*/ 3604142 h 4823342"/>
-              <a:gd name="connsiteX1" fmla="*/ 0 w 3804186"/>
-              <a:gd name="connsiteY1" fmla="*/ 0 h 4823342"/>
-              <a:gd name="connsiteX2" fmla="*/ 3804186 w 3804186"/>
-              <a:gd name="connsiteY2" fmla="*/ 3604142 h 4823342"/>
-              <a:gd name="connsiteX3" fmla="*/ 3804186 w 3804186"/>
-              <a:gd name="connsiteY3" fmla="*/ 4823342 h 4823342"/>
-              <a:gd name="connsiteX4" fmla="*/ 1975386 w 3804186"/>
-              <a:gd name="connsiteY4" fmla="*/ 4823342 h 4823342"/>
-              <a:gd name="connsiteX5" fmla="*/ 1975386 w 3804186"/>
-              <a:gd name="connsiteY5" fmla="*/ 3604142 h 4823342"/>
-              <a:gd name="connsiteX0" fmla="*/ 0 w 1828800"/>
-              <a:gd name="connsiteY0" fmla="*/ 0 h 1219200"/>
-              <a:gd name="connsiteX1" fmla="*/ 1828800 w 1828800"/>
-              <a:gd name="connsiteY1" fmla="*/ 0 h 1219200"/>
-              <a:gd name="connsiteX2" fmla="*/ 1828800 w 1828800"/>
-              <a:gd name="connsiteY2" fmla="*/ 1219200 h 1219200"/>
-              <a:gd name="connsiteX3" fmla="*/ 0 w 1828800"/>
-              <a:gd name="connsiteY3" fmla="*/ 1219200 h 1219200"/>
-              <a:gd name="connsiteX4" fmla="*/ 0 w 1828800"/>
-              <a:gd name="connsiteY4" fmla="*/ 0 h 1219200"/>
-              <a:gd name="connsiteX0" fmla="*/ 0 w 1975385"/>
-              <a:gd name="connsiteY0" fmla="*/ 896045 h 1219200"/>
-              <a:gd name="connsiteX1" fmla="*/ 1975385 w 1975385"/>
-              <a:gd name="connsiteY1" fmla="*/ 0 h 1219200"/>
-              <a:gd name="connsiteX2" fmla="*/ 1975385 w 1975385"/>
-              <a:gd name="connsiteY2" fmla="*/ 1219200 h 1219200"/>
-              <a:gd name="connsiteX3" fmla="*/ 146585 w 1975385"/>
-              <a:gd name="connsiteY3" fmla="*/ 1219200 h 1219200"/>
-              <a:gd name="connsiteX4" fmla="*/ 146585 w 1975385"/>
-              <a:gd name="connsiteY4" fmla="*/ 0 h 1219200"/>
-              <a:gd name="connsiteX0" fmla="*/ 0 w 1975385"/>
-              <a:gd name="connsiteY0" fmla="*/ 1375987 h 1699142"/>
-              <a:gd name="connsiteX1" fmla="*/ 1204646 w 1975385"/>
-              <a:gd name="connsiteY1" fmla="*/ 0 h 1699142"/>
-              <a:gd name="connsiteX2" fmla="*/ 1975385 w 1975385"/>
-              <a:gd name="connsiteY2" fmla="*/ 1699142 h 1699142"/>
-              <a:gd name="connsiteX3" fmla="*/ 146585 w 1975385"/>
-              <a:gd name="connsiteY3" fmla="*/ 1699142 h 1699142"/>
-              <a:gd name="connsiteX4" fmla="*/ 146585 w 1975385"/>
-              <a:gd name="connsiteY4" fmla="*/ 479942 h 1699142"/>
-              <a:gd name="connsiteX0" fmla="*/ 0 w 2121971"/>
-              <a:gd name="connsiteY0" fmla="*/ 1375987 h 1699142"/>
-              <a:gd name="connsiteX1" fmla="*/ 1204646 w 2121971"/>
-              <a:gd name="connsiteY1" fmla="*/ 0 h 1699142"/>
-              <a:gd name="connsiteX2" fmla="*/ 2121971 w 2121971"/>
-              <a:gd name="connsiteY2" fmla="*/ 803097 h 1699142"/>
-              <a:gd name="connsiteX3" fmla="*/ 146585 w 2121971"/>
-              <a:gd name="connsiteY3" fmla="*/ 1699142 h 1699142"/>
-              <a:gd name="connsiteX4" fmla="*/ 146585 w 2121971"/>
-              <a:gd name="connsiteY4" fmla="*/ 479942 h 1699142"/>
-              <a:gd name="connsiteX0" fmla="*/ 0 w 2121971"/>
-              <a:gd name="connsiteY0" fmla="*/ 1375987 h 2179084"/>
-              <a:gd name="connsiteX1" fmla="*/ 1204646 w 2121971"/>
-              <a:gd name="connsiteY1" fmla="*/ 0 h 2179084"/>
-              <a:gd name="connsiteX2" fmla="*/ 2121971 w 2121971"/>
-              <a:gd name="connsiteY2" fmla="*/ 803097 h 2179084"/>
-              <a:gd name="connsiteX3" fmla="*/ 917326 w 2121971"/>
-              <a:gd name="connsiteY3" fmla="*/ 2179084 h 2179084"/>
-              <a:gd name="connsiteX4" fmla="*/ 146585 w 2121971"/>
-              <a:gd name="connsiteY4" fmla="*/ 479942 h 2179084"/>
-              <a:gd name="connsiteX0" fmla="*/ 0 w 2121971"/>
-              <a:gd name="connsiteY0" fmla="*/ 1375987 h 2179084"/>
-              <a:gd name="connsiteX1" fmla="*/ 1204646 w 2121971"/>
-              <a:gd name="connsiteY1" fmla="*/ 0 h 2179084"/>
-              <a:gd name="connsiteX2" fmla="*/ 2121971 w 2121971"/>
-              <a:gd name="connsiteY2" fmla="*/ 803097 h 2179084"/>
-              <a:gd name="connsiteX3" fmla="*/ 917326 w 2121971"/>
-              <a:gd name="connsiteY3" fmla="*/ 2179084 h 2179084"/>
-              <a:gd name="connsiteX4" fmla="*/ 1 w 2121971"/>
-              <a:gd name="connsiteY4" fmla="*/ 1375987 h 2179084"/>
-            </a:gdLst>
-            <a:ahLst/>
-            <a:cxnLst>
-              <a:cxn ang="0">
-                <a:pos x="connsiteX0" y="connsiteY0"/>
-              </a:cxn>
-              <a:cxn ang="0">
-                <a:pos x="connsiteX1" y="connsiteY1"/>
-              </a:cxn>
-              <a:cxn ang="0">
-                <a:pos x="connsiteX2" y="connsiteY2"/>
-              </a:cxn>
-              <a:cxn ang="0">
-                <a:pos x="connsiteX3" y="connsiteY3"/>
-              </a:cxn>
-              <a:cxn ang="0">
-                <a:pos x="connsiteX4" y="connsiteY4"/>
-              </a:cxn>
-            </a:cxnLst>
-            <a:rect l="l" t="t" r="r" b="b"/>
-            <a:pathLst>
-              <a:path w="2121971" h="2179084">
-                <a:moveTo>
-                  <a:pt x="0" y="1375987"/>
-                </a:moveTo>
-                <a:lnTo>
-                  <a:pt x="1204646" y="0"/>
-                </a:lnTo>
-                <a:lnTo>
-                  <a:pt x="2121971" y="803097"/>
-                </a:lnTo>
-                <a:lnTo>
-                  <a:pt x="917326" y="2179084"/>
-                </a:lnTo>
-                <a:lnTo>
-                  <a:pt x="1" y="1375987"/>
-                </a:lnTo>
-                <a:close/>
-              </a:path>
-            </a:pathLst>
-          </a:custGeom>
+          </a:prstGeom>
         </p:spPr>
         <p:style>
           <a:lnRef idx="2">
@@ -19598,7 +16937,7 @@
     </p:spTree>
     <p:extLst>
       <p:ext uri="{BB962C8B-B14F-4D97-AF65-F5344CB8AC3E}">
-        <p14:creationId xmlns:p14="http://schemas.microsoft.com/office/powerpoint/2010/main" val="1606396526"/>
+        <p14:creationId xmlns:p14="http://schemas.microsoft.com/office/powerpoint/2010/main" val="1380792489"/>
       </p:ext>
     </p:extLst>
   </p:cSld>
@@ -19633,7 +16972,7 @@
         </p:nvSpPr>
         <p:spPr>
           <a:xfrm>
-            <a:off x="3586137" y="533400"/>
+            <a:off x="3719487" y="533400"/>
             <a:ext cx="1828800" cy="1219200"/>
           </a:xfrm>
           <a:prstGeom prst="rect">
@@ -19673,7 +17012,7 @@
         </p:nvSpPr>
         <p:spPr>
           <a:xfrm>
-            <a:off x="3586137" y="1284051"/>
+            <a:off x="3719487" y="1284051"/>
             <a:ext cx="1828800" cy="1828800"/>
           </a:xfrm>
           <a:prstGeom prst="ellipse">
@@ -19712,250 +17051,13 @@
           <p:nvPr/>
         </p:nvSpPr>
         <p:spPr>
-          <a:xfrm>
-            <a:off x="3392084" y="2476500"/>
-            <a:ext cx="2216907" cy="3234934"/>
+          <a:xfrm rot="18000000">
+            <a:off x="2843187" y="3493892"/>
+            <a:ext cx="3581400" cy="1066800"/>
           </a:xfrm>
-          <a:custGeom>
+          <a:prstGeom prst="rightArrow">
             <a:avLst/>
-            <a:gdLst>
-              <a:gd name="connsiteX0" fmla="*/ 0 w 3581400"/>
-              <a:gd name="connsiteY0" fmla="*/ 266700 h 1066800"/>
-              <a:gd name="connsiteX1" fmla="*/ 3048000 w 3581400"/>
-              <a:gd name="connsiteY1" fmla="*/ 266700 h 1066800"/>
-              <a:gd name="connsiteX2" fmla="*/ 3048000 w 3581400"/>
-              <a:gd name="connsiteY2" fmla="*/ 0 h 1066800"/>
-              <a:gd name="connsiteX3" fmla="*/ 3581400 w 3581400"/>
-              <a:gd name="connsiteY3" fmla="*/ 533400 h 1066800"/>
-              <a:gd name="connsiteX4" fmla="*/ 3048000 w 3581400"/>
-              <a:gd name="connsiteY4" fmla="*/ 1066800 h 1066800"/>
-              <a:gd name="connsiteX5" fmla="*/ 3048000 w 3581400"/>
-              <a:gd name="connsiteY5" fmla="*/ 800100 h 1066800"/>
-              <a:gd name="connsiteX6" fmla="*/ 0 w 3581400"/>
-              <a:gd name="connsiteY6" fmla="*/ 800100 h 1066800"/>
-              <a:gd name="connsiteX7" fmla="*/ 0 w 3581400"/>
-              <a:gd name="connsiteY7" fmla="*/ 266700 h 1066800"/>
-              <a:gd name="connsiteX0" fmla="*/ 5586387 w 9167787"/>
-              <a:gd name="connsiteY0" fmla="*/ 3760592 h 4560692"/>
-              <a:gd name="connsiteX1" fmla="*/ 0 w 9167787"/>
-              <a:gd name="connsiteY1" fmla="*/ 0 h 4560692"/>
-              <a:gd name="connsiteX2" fmla="*/ 8634387 w 9167787"/>
-              <a:gd name="connsiteY2" fmla="*/ 3760592 h 4560692"/>
-              <a:gd name="connsiteX3" fmla="*/ 8634387 w 9167787"/>
-              <a:gd name="connsiteY3" fmla="*/ 3493892 h 4560692"/>
-              <a:gd name="connsiteX4" fmla="*/ 9167787 w 9167787"/>
-              <a:gd name="connsiteY4" fmla="*/ 4027292 h 4560692"/>
-              <a:gd name="connsiteX5" fmla="*/ 8634387 w 9167787"/>
-              <a:gd name="connsiteY5" fmla="*/ 4560692 h 4560692"/>
-              <a:gd name="connsiteX6" fmla="*/ 8634387 w 9167787"/>
-              <a:gd name="connsiteY6" fmla="*/ 4293992 h 4560692"/>
-              <a:gd name="connsiteX7" fmla="*/ 5586387 w 9167787"/>
-              <a:gd name="connsiteY7" fmla="*/ 4293992 h 4560692"/>
-              <a:gd name="connsiteX8" fmla="*/ 5586387 w 9167787"/>
-              <a:gd name="connsiteY8" fmla="*/ 3760592 h 4560692"/>
-              <a:gd name="connsiteX0" fmla="*/ 0 w 3581400"/>
-              <a:gd name="connsiteY0" fmla="*/ 266700 h 1066800"/>
-              <a:gd name="connsiteX1" fmla="*/ 3048000 w 3581400"/>
-              <a:gd name="connsiteY1" fmla="*/ 266700 h 1066800"/>
-              <a:gd name="connsiteX2" fmla="*/ 3048000 w 3581400"/>
-              <a:gd name="connsiteY2" fmla="*/ 0 h 1066800"/>
-              <a:gd name="connsiteX3" fmla="*/ 3581400 w 3581400"/>
-              <a:gd name="connsiteY3" fmla="*/ 533400 h 1066800"/>
-              <a:gd name="connsiteX4" fmla="*/ 3048000 w 3581400"/>
-              <a:gd name="connsiteY4" fmla="*/ 1066800 h 1066800"/>
-              <a:gd name="connsiteX5" fmla="*/ 3048000 w 3581400"/>
-              <a:gd name="connsiteY5" fmla="*/ 800100 h 1066800"/>
-              <a:gd name="connsiteX6" fmla="*/ 0 w 3581400"/>
-              <a:gd name="connsiteY6" fmla="*/ 800100 h 1066800"/>
-              <a:gd name="connsiteX7" fmla="*/ 0 w 3581400"/>
-              <a:gd name="connsiteY7" fmla="*/ 266700 h 1066800"/>
-              <a:gd name="connsiteX0" fmla="*/ 664381 w 3581400"/>
-              <a:gd name="connsiteY0" fmla="*/ 1950842 h 1950842"/>
-              <a:gd name="connsiteX1" fmla="*/ 3048000 w 3581400"/>
-              <a:gd name="connsiteY1" fmla="*/ 266700 h 1950842"/>
-              <a:gd name="connsiteX2" fmla="*/ 3048000 w 3581400"/>
-              <a:gd name="connsiteY2" fmla="*/ 0 h 1950842"/>
-              <a:gd name="connsiteX3" fmla="*/ 3581400 w 3581400"/>
-              <a:gd name="connsiteY3" fmla="*/ 533400 h 1950842"/>
-              <a:gd name="connsiteX4" fmla="*/ 3048000 w 3581400"/>
-              <a:gd name="connsiteY4" fmla="*/ 1066800 h 1950842"/>
-              <a:gd name="connsiteX5" fmla="*/ 3048000 w 3581400"/>
-              <a:gd name="connsiteY5" fmla="*/ 800100 h 1950842"/>
-              <a:gd name="connsiteX6" fmla="*/ 0 w 3581400"/>
-              <a:gd name="connsiteY6" fmla="*/ 800100 h 1950842"/>
-              <a:gd name="connsiteX7" fmla="*/ 0 w 3581400"/>
-              <a:gd name="connsiteY7" fmla="*/ 266700 h 1950842"/>
-              <a:gd name="connsiteX0" fmla="*/ 664381 w 3581400"/>
-              <a:gd name="connsiteY0" fmla="*/ 2639646 h 2639646"/>
-              <a:gd name="connsiteX1" fmla="*/ 2188381 w 3581400"/>
-              <a:gd name="connsiteY1" fmla="*/ 0 h 2639646"/>
-              <a:gd name="connsiteX2" fmla="*/ 3048000 w 3581400"/>
-              <a:gd name="connsiteY2" fmla="*/ 688804 h 2639646"/>
-              <a:gd name="connsiteX3" fmla="*/ 3581400 w 3581400"/>
-              <a:gd name="connsiteY3" fmla="*/ 1222204 h 2639646"/>
-              <a:gd name="connsiteX4" fmla="*/ 3048000 w 3581400"/>
-              <a:gd name="connsiteY4" fmla="*/ 1755604 h 2639646"/>
-              <a:gd name="connsiteX5" fmla="*/ 3048000 w 3581400"/>
-              <a:gd name="connsiteY5" fmla="*/ 1488904 h 2639646"/>
-              <a:gd name="connsiteX6" fmla="*/ 0 w 3581400"/>
-              <a:gd name="connsiteY6" fmla="*/ 1488904 h 2639646"/>
-              <a:gd name="connsiteX7" fmla="*/ 0 w 3581400"/>
-              <a:gd name="connsiteY7" fmla="*/ 955504 h 2639646"/>
-              <a:gd name="connsiteX0" fmla="*/ 664381 w 3581400"/>
-              <a:gd name="connsiteY0" fmla="*/ 2772996 h 2772996"/>
-              <a:gd name="connsiteX1" fmla="*/ 2188381 w 3581400"/>
-              <a:gd name="connsiteY1" fmla="*/ 133350 h 2772996"/>
-              <a:gd name="connsiteX2" fmla="*/ 1957412 w 3581400"/>
-              <a:gd name="connsiteY2" fmla="*/ 0 h 2772996"/>
-              <a:gd name="connsiteX3" fmla="*/ 3581400 w 3581400"/>
-              <a:gd name="connsiteY3" fmla="*/ 1355554 h 2772996"/>
-              <a:gd name="connsiteX4" fmla="*/ 3048000 w 3581400"/>
-              <a:gd name="connsiteY4" fmla="*/ 1888954 h 2772996"/>
-              <a:gd name="connsiteX5" fmla="*/ 3048000 w 3581400"/>
-              <a:gd name="connsiteY5" fmla="*/ 1622254 h 2772996"/>
-              <a:gd name="connsiteX6" fmla="*/ 0 w 3581400"/>
-              <a:gd name="connsiteY6" fmla="*/ 1622254 h 2772996"/>
-              <a:gd name="connsiteX7" fmla="*/ 0 w 3581400"/>
-              <a:gd name="connsiteY7" fmla="*/ 1088854 h 2772996"/>
-              <a:gd name="connsiteX0" fmla="*/ 664381 w 3048000"/>
-              <a:gd name="connsiteY0" fmla="*/ 2968234 h 2968234"/>
-              <a:gd name="connsiteX1" fmla="*/ 2188381 w 3048000"/>
-              <a:gd name="connsiteY1" fmla="*/ 328588 h 2968234"/>
-              <a:gd name="connsiteX2" fmla="*/ 1957412 w 3048000"/>
-              <a:gd name="connsiteY2" fmla="*/ 195238 h 2968234"/>
-              <a:gd name="connsiteX3" fmla="*/ 2686050 w 3048000"/>
-              <a:gd name="connsiteY3" fmla="*/ 0 h 2968234"/>
-              <a:gd name="connsiteX4" fmla="*/ 3048000 w 3048000"/>
-              <a:gd name="connsiteY4" fmla="*/ 2084192 h 2968234"/>
-              <a:gd name="connsiteX5" fmla="*/ 3048000 w 3048000"/>
-              <a:gd name="connsiteY5" fmla="*/ 1817492 h 2968234"/>
-              <a:gd name="connsiteX6" fmla="*/ 0 w 3048000"/>
-              <a:gd name="connsiteY6" fmla="*/ 1817492 h 2968234"/>
-              <a:gd name="connsiteX7" fmla="*/ 0 w 3048000"/>
-              <a:gd name="connsiteY7" fmla="*/ 1284092 h 2968234"/>
-              <a:gd name="connsiteX0" fmla="*/ 664381 w 3048000"/>
-              <a:gd name="connsiteY0" fmla="*/ 2968234 h 2968234"/>
-              <a:gd name="connsiteX1" fmla="*/ 2188381 w 3048000"/>
-              <a:gd name="connsiteY1" fmla="*/ 328588 h 2968234"/>
-              <a:gd name="connsiteX2" fmla="*/ 1957412 w 3048000"/>
-              <a:gd name="connsiteY2" fmla="*/ 195238 h 2968234"/>
-              <a:gd name="connsiteX3" fmla="*/ 2686050 w 3048000"/>
-              <a:gd name="connsiteY3" fmla="*/ 0 h 2968234"/>
-              <a:gd name="connsiteX4" fmla="*/ 2881288 w 3048000"/>
-              <a:gd name="connsiteY4" fmla="*/ 728638 h 2968234"/>
-              <a:gd name="connsiteX5" fmla="*/ 3048000 w 3048000"/>
-              <a:gd name="connsiteY5" fmla="*/ 1817492 h 2968234"/>
-              <a:gd name="connsiteX6" fmla="*/ 0 w 3048000"/>
-              <a:gd name="connsiteY6" fmla="*/ 1817492 h 2968234"/>
-              <a:gd name="connsiteX7" fmla="*/ 0 w 3048000"/>
-              <a:gd name="connsiteY7" fmla="*/ 1284092 h 2968234"/>
-              <a:gd name="connsiteX0" fmla="*/ 664381 w 2881288"/>
-              <a:gd name="connsiteY0" fmla="*/ 2968234 h 2968234"/>
-              <a:gd name="connsiteX1" fmla="*/ 2188381 w 2881288"/>
-              <a:gd name="connsiteY1" fmla="*/ 328588 h 2968234"/>
-              <a:gd name="connsiteX2" fmla="*/ 1957412 w 2881288"/>
-              <a:gd name="connsiteY2" fmla="*/ 195238 h 2968234"/>
-              <a:gd name="connsiteX3" fmla="*/ 2686050 w 2881288"/>
-              <a:gd name="connsiteY3" fmla="*/ 0 h 2968234"/>
-              <a:gd name="connsiteX4" fmla="*/ 2881288 w 2881288"/>
-              <a:gd name="connsiteY4" fmla="*/ 728638 h 2968234"/>
-              <a:gd name="connsiteX5" fmla="*/ 2650319 w 2881288"/>
-              <a:gd name="connsiteY5" fmla="*/ 595288 h 2968234"/>
-              <a:gd name="connsiteX6" fmla="*/ 0 w 2881288"/>
-              <a:gd name="connsiteY6" fmla="*/ 1817492 h 2968234"/>
-              <a:gd name="connsiteX7" fmla="*/ 0 w 2881288"/>
-              <a:gd name="connsiteY7" fmla="*/ 1284092 h 2968234"/>
-              <a:gd name="connsiteX0" fmla="*/ 664381 w 2881288"/>
-              <a:gd name="connsiteY0" fmla="*/ 2968234 h 3234934"/>
-              <a:gd name="connsiteX1" fmla="*/ 2188381 w 2881288"/>
-              <a:gd name="connsiteY1" fmla="*/ 328588 h 3234934"/>
-              <a:gd name="connsiteX2" fmla="*/ 1957412 w 2881288"/>
-              <a:gd name="connsiteY2" fmla="*/ 195238 h 3234934"/>
-              <a:gd name="connsiteX3" fmla="*/ 2686050 w 2881288"/>
-              <a:gd name="connsiteY3" fmla="*/ 0 h 3234934"/>
-              <a:gd name="connsiteX4" fmla="*/ 2881288 w 2881288"/>
-              <a:gd name="connsiteY4" fmla="*/ 728638 h 3234934"/>
-              <a:gd name="connsiteX5" fmla="*/ 2650319 w 2881288"/>
-              <a:gd name="connsiteY5" fmla="*/ 595288 h 3234934"/>
-              <a:gd name="connsiteX6" fmla="*/ 1126319 w 2881288"/>
-              <a:gd name="connsiteY6" fmla="*/ 3234934 h 3234934"/>
-              <a:gd name="connsiteX7" fmla="*/ 0 w 2881288"/>
-              <a:gd name="connsiteY7" fmla="*/ 1284092 h 3234934"/>
-              <a:gd name="connsiteX0" fmla="*/ 0 w 2216907"/>
-              <a:gd name="connsiteY0" fmla="*/ 2968234 h 3234934"/>
-              <a:gd name="connsiteX1" fmla="*/ 1524000 w 2216907"/>
-              <a:gd name="connsiteY1" fmla="*/ 328588 h 3234934"/>
-              <a:gd name="connsiteX2" fmla="*/ 1293031 w 2216907"/>
-              <a:gd name="connsiteY2" fmla="*/ 195238 h 3234934"/>
-              <a:gd name="connsiteX3" fmla="*/ 2021669 w 2216907"/>
-              <a:gd name="connsiteY3" fmla="*/ 0 h 3234934"/>
-              <a:gd name="connsiteX4" fmla="*/ 2216907 w 2216907"/>
-              <a:gd name="connsiteY4" fmla="*/ 728638 h 3234934"/>
-              <a:gd name="connsiteX5" fmla="*/ 1985938 w 2216907"/>
-              <a:gd name="connsiteY5" fmla="*/ 595288 h 3234934"/>
-              <a:gd name="connsiteX6" fmla="*/ 461938 w 2216907"/>
-              <a:gd name="connsiteY6" fmla="*/ 3234934 h 3234934"/>
-              <a:gd name="connsiteX7" fmla="*/ 0 w 2216907"/>
-              <a:gd name="connsiteY7" fmla="*/ 2968234 h 3234934"/>
-            </a:gdLst>
-            <a:ahLst/>
-            <a:cxnLst>
-              <a:cxn ang="0">
-                <a:pos x="connsiteX0" y="connsiteY0"/>
-              </a:cxn>
-              <a:cxn ang="0">
-                <a:pos x="connsiteX1" y="connsiteY1"/>
-              </a:cxn>
-              <a:cxn ang="0">
-                <a:pos x="connsiteX2" y="connsiteY2"/>
-              </a:cxn>
-              <a:cxn ang="0">
-                <a:pos x="connsiteX3" y="connsiteY3"/>
-              </a:cxn>
-              <a:cxn ang="0">
-                <a:pos x="connsiteX4" y="connsiteY4"/>
-              </a:cxn>
-              <a:cxn ang="0">
-                <a:pos x="connsiteX5" y="connsiteY5"/>
-              </a:cxn>
-              <a:cxn ang="0">
-                <a:pos x="connsiteX6" y="connsiteY6"/>
-              </a:cxn>
-              <a:cxn ang="0">
-                <a:pos x="connsiteX7" y="connsiteY7"/>
-              </a:cxn>
-            </a:cxnLst>
-            <a:rect l="l" t="t" r="r" b="b"/>
-            <a:pathLst>
-              <a:path w="2216907" h="3234934">
-                <a:moveTo>
-                  <a:pt x="0" y="2968234"/>
-                </a:moveTo>
-                <a:lnTo>
-                  <a:pt x="1524000" y="328588"/>
-                </a:lnTo>
-                <a:lnTo>
-                  <a:pt x="1293031" y="195238"/>
-                </a:lnTo>
-                <a:lnTo>
-                  <a:pt x="2021669" y="0"/>
-                </a:lnTo>
-                <a:lnTo>
-                  <a:pt x="2216907" y="728638"/>
-                </a:lnTo>
-                <a:lnTo>
-                  <a:pt x="1985938" y="595288"/>
-                </a:lnTo>
-                <a:lnTo>
-                  <a:pt x="461938" y="3234934"/>
-                </a:lnTo>
-                <a:lnTo>
-                  <a:pt x="0" y="2968234"/>
-                </a:lnTo>
-                <a:close/>
-              </a:path>
-            </a:pathLst>
-          </a:custGeom>
+          </a:prstGeom>
         </p:spPr>
         <p:style>
           <a:lnRef idx="2">
@@ -19989,136 +17091,13 @@
           <p:nvPr/>
         </p:nvSpPr>
         <p:spPr>
-          <a:xfrm>
-            <a:off x="3439552" y="3124200"/>
-            <a:ext cx="2121971" cy="2179084"/>
+          <a:xfrm rot="18672083">
+            <a:off x="3719487" y="3604142"/>
+            <a:ext cx="1828800" cy="1219200"/>
           </a:xfrm>
-          <a:custGeom>
+          <a:prstGeom prst="rect">
             <a:avLst/>
-            <a:gdLst>
-              <a:gd name="connsiteX0" fmla="*/ 0 w 1828800"/>
-              <a:gd name="connsiteY0" fmla="*/ 0 h 1219200"/>
-              <a:gd name="connsiteX1" fmla="*/ 1828800 w 1828800"/>
-              <a:gd name="connsiteY1" fmla="*/ 0 h 1219200"/>
-              <a:gd name="connsiteX2" fmla="*/ 1828800 w 1828800"/>
-              <a:gd name="connsiteY2" fmla="*/ 1219200 h 1219200"/>
-              <a:gd name="connsiteX3" fmla="*/ 0 w 1828800"/>
-              <a:gd name="connsiteY3" fmla="*/ 1219200 h 1219200"/>
-              <a:gd name="connsiteX4" fmla="*/ 0 w 1828800"/>
-              <a:gd name="connsiteY4" fmla="*/ 0 h 1219200"/>
-              <a:gd name="connsiteX0" fmla="*/ 1975386 w 3804186"/>
-              <a:gd name="connsiteY0" fmla="*/ 3604142 h 4823342"/>
-              <a:gd name="connsiteX1" fmla="*/ 0 w 3804186"/>
-              <a:gd name="connsiteY1" fmla="*/ 0 h 4823342"/>
-              <a:gd name="connsiteX2" fmla="*/ 3804186 w 3804186"/>
-              <a:gd name="connsiteY2" fmla="*/ 3604142 h 4823342"/>
-              <a:gd name="connsiteX3" fmla="*/ 3804186 w 3804186"/>
-              <a:gd name="connsiteY3" fmla="*/ 4823342 h 4823342"/>
-              <a:gd name="connsiteX4" fmla="*/ 1975386 w 3804186"/>
-              <a:gd name="connsiteY4" fmla="*/ 4823342 h 4823342"/>
-              <a:gd name="connsiteX5" fmla="*/ 1975386 w 3804186"/>
-              <a:gd name="connsiteY5" fmla="*/ 3604142 h 4823342"/>
-              <a:gd name="connsiteX0" fmla="*/ 0 w 1828800"/>
-              <a:gd name="connsiteY0" fmla="*/ 0 h 1219200"/>
-              <a:gd name="connsiteX1" fmla="*/ 1828800 w 1828800"/>
-              <a:gd name="connsiteY1" fmla="*/ 0 h 1219200"/>
-              <a:gd name="connsiteX2" fmla="*/ 1828800 w 1828800"/>
-              <a:gd name="connsiteY2" fmla="*/ 1219200 h 1219200"/>
-              <a:gd name="connsiteX3" fmla="*/ 0 w 1828800"/>
-              <a:gd name="connsiteY3" fmla="*/ 1219200 h 1219200"/>
-              <a:gd name="connsiteX4" fmla="*/ 0 w 1828800"/>
-              <a:gd name="connsiteY4" fmla="*/ 0 h 1219200"/>
-              <a:gd name="connsiteX0" fmla="*/ 0 w 1975385"/>
-              <a:gd name="connsiteY0" fmla="*/ 896045 h 1219200"/>
-              <a:gd name="connsiteX1" fmla="*/ 1975385 w 1975385"/>
-              <a:gd name="connsiteY1" fmla="*/ 0 h 1219200"/>
-              <a:gd name="connsiteX2" fmla="*/ 1975385 w 1975385"/>
-              <a:gd name="connsiteY2" fmla="*/ 1219200 h 1219200"/>
-              <a:gd name="connsiteX3" fmla="*/ 146585 w 1975385"/>
-              <a:gd name="connsiteY3" fmla="*/ 1219200 h 1219200"/>
-              <a:gd name="connsiteX4" fmla="*/ 146585 w 1975385"/>
-              <a:gd name="connsiteY4" fmla="*/ 0 h 1219200"/>
-              <a:gd name="connsiteX0" fmla="*/ 0 w 1975385"/>
-              <a:gd name="connsiteY0" fmla="*/ 1375987 h 1699142"/>
-              <a:gd name="connsiteX1" fmla="*/ 1204646 w 1975385"/>
-              <a:gd name="connsiteY1" fmla="*/ 0 h 1699142"/>
-              <a:gd name="connsiteX2" fmla="*/ 1975385 w 1975385"/>
-              <a:gd name="connsiteY2" fmla="*/ 1699142 h 1699142"/>
-              <a:gd name="connsiteX3" fmla="*/ 146585 w 1975385"/>
-              <a:gd name="connsiteY3" fmla="*/ 1699142 h 1699142"/>
-              <a:gd name="connsiteX4" fmla="*/ 146585 w 1975385"/>
-              <a:gd name="connsiteY4" fmla="*/ 479942 h 1699142"/>
-              <a:gd name="connsiteX0" fmla="*/ 0 w 2121971"/>
-              <a:gd name="connsiteY0" fmla="*/ 1375987 h 1699142"/>
-              <a:gd name="connsiteX1" fmla="*/ 1204646 w 2121971"/>
-              <a:gd name="connsiteY1" fmla="*/ 0 h 1699142"/>
-              <a:gd name="connsiteX2" fmla="*/ 2121971 w 2121971"/>
-              <a:gd name="connsiteY2" fmla="*/ 803097 h 1699142"/>
-              <a:gd name="connsiteX3" fmla="*/ 146585 w 2121971"/>
-              <a:gd name="connsiteY3" fmla="*/ 1699142 h 1699142"/>
-              <a:gd name="connsiteX4" fmla="*/ 146585 w 2121971"/>
-              <a:gd name="connsiteY4" fmla="*/ 479942 h 1699142"/>
-              <a:gd name="connsiteX0" fmla="*/ 0 w 2121971"/>
-              <a:gd name="connsiteY0" fmla="*/ 1375987 h 2179084"/>
-              <a:gd name="connsiteX1" fmla="*/ 1204646 w 2121971"/>
-              <a:gd name="connsiteY1" fmla="*/ 0 h 2179084"/>
-              <a:gd name="connsiteX2" fmla="*/ 2121971 w 2121971"/>
-              <a:gd name="connsiteY2" fmla="*/ 803097 h 2179084"/>
-              <a:gd name="connsiteX3" fmla="*/ 917326 w 2121971"/>
-              <a:gd name="connsiteY3" fmla="*/ 2179084 h 2179084"/>
-              <a:gd name="connsiteX4" fmla="*/ 146585 w 2121971"/>
-              <a:gd name="connsiteY4" fmla="*/ 479942 h 2179084"/>
-              <a:gd name="connsiteX0" fmla="*/ 0 w 2121971"/>
-              <a:gd name="connsiteY0" fmla="*/ 1375987 h 2179084"/>
-              <a:gd name="connsiteX1" fmla="*/ 1204646 w 2121971"/>
-              <a:gd name="connsiteY1" fmla="*/ 0 h 2179084"/>
-              <a:gd name="connsiteX2" fmla="*/ 2121971 w 2121971"/>
-              <a:gd name="connsiteY2" fmla="*/ 803097 h 2179084"/>
-              <a:gd name="connsiteX3" fmla="*/ 917326 w 2121971"/>
-              <a:gd name="connsiteY3" fmla="*/ 2179084 h 2179084"/>
-              <a:gd name="connsiteX4" fmla="*/ 1 w 2121971"/>
-              <a:gd name="connsiteY4" fmla="*/ 1375987 h 2179084"/>
-            </a:gdLst>
-            <a:ahLst/>
-            <a:cxnLst>
-              <a:cxn ang="0">
-                <a:pos x="connsiteX0" y="connsiteY0"/>
-              </a:cxn>
-              <a:cxn ang="0">
-                <a:pos x="connsiteX1" y="connsiteY1"/>
-              </a:cxn>
-              <a:cxn ang="0">
-                <a:pos x="connsiteX2" y="connsiteY2"/>
-              </a:cxn>
-              <a:cxn ang="0">
-                <a:pos x="connsiteX3" y="connsiteY3"/>
-              </a:cxn>
-              <a:cxn ang="0">
-                <a:pos x="connsiteX4" y="connsiteY4"/>
-              </a:cxn>
-            </a:cxnLst>
-            <a:rect l="l" t="t" r="r" b="b"/>
-            <a:pathLst>
-              <a:path w="2121971" h="2179084">
-                <a:moveTo>
-                  <a:pt x="0" y="1375987"/>
-                </a:moveTo>
-                <a:lnTo>
-                  <a:pt x="1204646" y="0"/>
-                </a:lnTo>
-                <a:lnTo>
-                  <a:pt x="2121971" y="803097"/>
-                </a:lnTo>
-                <a:lnTo>
-                  <a:pt x="917326" y="2179084"/>
-                </a:lnTo>
-                <a:lnTo>
-                  <a:pt x="1" y="1375987"/>
-                </a:lnTo>
-                <a:close/>
-              </a:path>
-            </a:pathLst>
-          </a:custGeom>
+          </a:prstGeom>
         </p:spPr>
         <p:style>
           <a:lnRef idx="2">
@@ -20148,7 +17127,7 @@
     </p:spTree>
     <p:extLst>
       <p:ext uri="{BB962C8B-B14F-4D97-AF65-F5344CB8AC3E}">
-        <p14:creationId xmlns:p14="http://schemas.microsoft.com/office/powerpoint/2010/main" val="3353606780"/>
+        <p14:creationId xmlns:p14="http://schemas.microsoft.com/office/powerpoint/2010/main" val="3068886937"/>
       </p:ext>
     </p:extLst>
   </p:cSld>
@@ -20183,7 +17162,7 @@
         </p:nvSpPr>
         <p:spPr>
           <a:xfrm>
-            <a:off x="3586137" y="2512817"/>
+            <a:off x="3719487" y="2579492"/>
             <a:ext cx="1828800" cy="1219200"/>
           </a:xfrm>
           <a:prstGeom prst="rect">
@@ -20223,7 +17202,7 @@
         </p:nvSpPr>
         <p:spPr>
           <a:xfrm>
-            <a:off x="3586137" y="2208017"/>
+            <a:off x="3719487" y="2274692"/>
             <a:ext cx="1828800" cy="1828800"/>
           </a:xfrm>
           <a:prstGeom prst="ellipse">
@@ -20262,250 +17241,13 @@
           <p:nvPr/>
         </p:nvSpPr>
         <p:spPr>
-          <a:xfrm>
-            <a:off x="3392084" y="1504950"/>
-            <a:ext cx="2216907" cy="3234934"/>
+          <a:xfrm rot="18000000">
+            <a:off x="2843187" y="2655692"/>
+            <a:ext cx="3581400" cy="1066800"/>
           </a:xfrm>
-          <a:custGeom>
+          <a:prstGeom prst="rightArrow">
             <a:avLst/>
-            <a:gdLst>
-              <a:gd name="connsiteX0" fmla="*/ 0 w 3581400"/>
-              <a:gd name="connsiteY0" fmla="*/ 266700 h 1066800"/>
-              <a:gd name="connsiteX1" fmla="*/ 3048000 w 3581400"/>
-              <a:gd name="connsiteY1" fmla="*/ 266700 h 1066800"/>
-              <a:gd name="connsiteX2" fmla="*/ 3048000 w 3581400"/>
-              <a:gd name="connsiteY2" fmla="*/ 0 h 1066800"/>
-              <a:gd name="connsiteX3" fmla="*/ 3581400 w 3581400"/>
-              <a:gd name="connsiteY3" fmla="*/ 533400 h 1066800"/>
-              <a:gd name="connsiteX4" fmla="*/ 3048000 w 3581400"/>
-              <a:gd name="connsiteY4" fmla="*/ 1066800 h 1066800"/>
-              <a:gd name="connsiteX5" fmla="*/ 3048000 w 3581400"/>
-              <a:gd name="connsiteY5" fmla="*/ 800100 h 1066800"/>
-              <a:gd name="connsiteX6" fmla="*/ 0 w 3581400"/>
-              <a:gd name="connsiteY6" fmla="*/ 800100 h 1066800"/>
-              <a:gd name="connsiteX7" fmla="*/ 0 w 3581400"/>
-              <a:gd name="connsiteY7" fmla="*/ 266700 h 1066800"/>
-              <a:gd name="connsiteX0" fmla="*/ 5586387 w 9167787"/>
-              <a:gd name="connsiteY0" fmla="*/ 3760592 h 4560692"/>
-              <a:gd name="connsiteX1" fmla="*/ 0 w 9167787"/>
-              <a:gd name="connsiteY1" fmla="*/ 0 h 4560692"/>
-              <a:gd name="connsiteX2" fmla="*/ 8634387 w 9167787"/>
-              <a:gd name="connsiteY2" fmla="*/ 3760592 h 4560692"/>
-              <a:gd name="connsiteX3" fmla="*/ 8634387 w 9167787"/>
-              <a:gd name="connsiteY3" fmla="*/ 3493892 h 4560692"/>
-              <a:gd name="connsiteX4" fmla="*/ 9167787 w 9167787"/>
-              <a:gd name="connsiteY4" fmla="*/ 4027292 h 4560692"/>
-              <a:gd name="connsiteX5" fmla="*/ 8634387 w 9167787"/>
-              <a:gd name="connsiteY5" fmla="*/ 4560692 h 4560692"/>
-              <a:gd name="connsiteX6" fmla="*/ 8634387 w 9167787"/>
-              <a:gd name="connsiteY6" fmla="*/ 4293992 h 4560692"/>
-              <a:gd name="connsiteX7" fmla="*/ 5586387 w 9167787"/>
-              <a:gd name="connsiteY7" fmla="*/ 4293992 h 4560692"/>
-              <a:gd name="connsiteX8" fmla="*/ 5586387 w 9167787"/>
-              <a:gd name="connsiteY8" fmla="*/ 3760592 h 4560692"/>
-              <a:gd name="connsiteX0" fmla="*/ 0 w 3581400"/>
-              <a:gd name="connsiteY0" fmla="*/ 266700 h 1066800"/>
-              <a:gd name="connsiteX1" fmla="*/ 3048000 w 3581400"/>
-              <a:gd name="connsiteY1" fmla="*/ 266700 h 1066800"/>
-              <a:gd name="connsiteX2" fmla="*/ 3048000 w 3581400"/>
-              <a:gd name="connsiteY2" fmla="*/ 0 h 1066800"/>
-              <a:gd name="connsiteX3" fmla="*/ 3581400 w 3581400"/>
-              <a:gd name="connsiteY3" fmla="*/ 533400 h 1066800"/>
-              <a:gd name="connsiteX4" fmla="*/ 3048000 w 3581400"/>
-              <a:gd name="connsiteY4" fmla="*/ 1066800 h 1066800"/>
-              <a:gd name="connsiteX5" fmla="*/ 3048000 w 3581400"/>
-              <a:gd name="connsiteY5" fmla="*/ 800100 h 1066800"/>
-              <a:gd name="connsiteX6" fmla="*/ 0 w 3581400"/>
-              <a:gd name="connsiteY6" fmla="*/ 800100 h 1066800"/>
-              <a:gd name="connsiteX7" fmla="*/ 0 w 3581400"/>
-              <a:gd name="connsiteY7" fmla="*/ 266700 h 1066800"/>
-              <a:gd name="connsiteX0" fmla="*/ 664381 w 3581400"/>
-              <a:gd name="connsiteY0" fmla="*/ 1950842 h 1950842"/>
-              <a:gd name="connsiteX1" fmla="*/ 3048000 w 3581400"/>
-              <a:gd name="connsiteY1" fmla="*/ 266700 h 1950842"/>
-              <a:gd name="connsiteX2" fmla="*/ 3048000 w 3581400"/>
-              <a:gd name="connsiteY2" fmla="*/ 0 h 1950842"/>
-              <a:gd name="connsiteX3" fmla="*/ 3581400 w 3581400"/>
-              <a:gd name="connsiteY3" fmla="*/ 533400 h 1950842"/>
-              <a:gd name="connsiteX4" fmla="*/ 3048000 w 3581400"/>
-              <a:gd name="connsiteY4" fmla="*/ 1066800 h 1950842"/>
-              <a:gd name="connsiteX5" fmla="*/ 3048000 w 3581400"/>
-              <a:gd name="connsiteY5" fmla="*/ 800100 h 1950842"/>
-              <a:gd name="connsiteX6" fmla="*/ 0 w 3581400"/>
-              <a:gd name="connsiteY6" fmla="*/ 800100 h 1950842"/>
-              <a:gd name="connsiteX7" fmla="*/ 0 w 3581400"/>
-              <a:gd name="connsiteY7" fmla="*/ 266700 h 1950842"/>
-              <a:gd name="connsiteX0" fmla="*/ 664381 w 3581400"/>
-              <a:gd name="connsiteY0" fmla="*/ 2639646 h 2639646"/>
-              <a:gd name="connsiteX1" fmla="*/ 2188381 w 3581400"/>
-              <a:gd name="connsiteY1" fmla="*/ 0 h 2639646"/>
-              <a:gd name="connsiteX2" fmla="*/ 3048000 w 3581400"/>
-              <a:gd name="connsiteY2" fmla="*/ 688804 h 2639646"/>
-              <a:gd name="connsiteX3" fmla="*/ 3581400 w 3581400"/>
-              <a:gd name="connsiteY3" fmla="*/ 1222204 h 2639646"/>
-              <a:gd name="connsiteX4" fmla="*/ 3048000 w 3581400"/>
-              <a:gd name="connsiteY4" fmla="*/ 1755604 h 2639646"/>
-              <a:gd name="connsiteX5" fmla="*/ 3048000 w 3581400"/>
-              <a:gd name="connsiteY5" fmla="*/ 1488904 h 2639646"/>
-              <a:gd name="connsiteX6" fmla="*/ 0 w 3581400"/>
-              <a:gd name="connsiteY6" fmla="*/ 1488904 h 2639646"/>
-              <a:gd name="connsiteX7" fmla="*/ 0 w 3581400"/>
-              <a:gd name="connsiteY7" fmla="*/ 955504 h 2639646"/>
-              <a:gd name="connsiteX0" fmla="*/ 664381 w 3581400"/>
-              <a:gd name="connsiteY0" fmla="*/ 2772996 h 2772996"/>
-              <a:gd name="connsiteX1" fmla="*/ 2188381 w 3581400"/>
-              <a:gd name="connsiteY1" fmla="*/ 133350 h 2772996"/>
-              <a:gd name="connsiteX2" fmla="*/ 1957412 w 3581400"/>
-              <a:gd name="connsiteY2" fmla="*/ 0 h 2772996"/>
-              <a:gd name="connsiteX3" fmla="*/ 3581400 w 3581400"/>
-              <a:gd name="connsiteY3" fmla="*/ 1355554 h 2772996"/>
-              <a:gd name="connsiteX4" fmla="*/ 3048000 w 3581400"/>
-              <a:gd name="connsiteY4" fmla="*/ 1888954 h 2772996"/>
-              <a:gd name="connsiteX5" fmla="*/ 3048000 w 3581400"/>
-              <a:gd name="connsiteY5" fmla="*/ 1622254 h 2772996"/>
-              <a:gd name="connsiteX6" fmla="*/ 0 w 3581400"/>
-              <a:gd name="connsiteY6" fmla="*/ 1622254 h 2772996"/>
-              <a:gd name="connsiteX7" fmla="*/ 0 w 3581400"/>
-              <a:gd name="connsiteY7" fmla="*/ 1088854 h 2772996"/>
-              <a:gd name="connsiteX0" fmla="*/ 664381 w 3048000"/>
-              <a:gd name="connsiteY0" fmla="*/ 2968234 h 2968234"/>
-              <a:gd name="connsiteX1" fmla="*/ 2188381 w 3048000"/>
-              <a:gd name="connsiteY1" fmla="*/ 328588 h 2968234"/>
-              <a:gd name="connsiteX2" fmla="*/ 1957412 w 3048000"/>
-              <a:gd name="connsiteY2" fmla="*/ 195238 h 2968234"/>
-              <a:gd name="connsiteX3" fmla="*/ 2686050 w 3048000"/>
-              <a:gd name="connsiteY3" fmla="*/ 0 h 2968234"/>
-              <a:gd name="connsiteX4" fmla="*/ 3048000 w 3048000"/>
-              <a:gd name="connsiteY4" fmla="*/ 2084192 h 2968234"/>
-              <a:gd name="connsiteX5" fmla="*/ 3048000 w 3048000"/>
-              <a:gd name="connsiteY5" fmla="*/ 1817492 h 2968234"/>
-              <a:gd name="connsiteX6" fmla="*/ 0 w 3048000"/>
-              <a:gd name="connsiteY6" fmla="*/ 1817492 h 2968234"/>
-              <a:gd name="connsiteX7" fmla="*/ 0 w 3048000"/>
-              <a:gd name="connsiteY7" fmla="*/ 1284092 h 2968234"/>
-              <a:gd name="connsiteX0" fmla="*/ 664381 w 3048000"/>
-              <a:gd name="connsiteY0" fmla="*/ 2968234 h 2968234"/>
-              <a:gd name="connsiteX1" fmla="*/ 2188381 w 3048000"/>
-              <a:gd name="connsiteY1" fmla="*/ 328588 h 2968234"/>
-              <a:gd name="connsiteX2" fmla="*/ 1957412 w 3048000"/>
-              <a:gd name="connsiteY2" fmla="*/ 195238 h 2968234"/>
-              <a:gd name="connsiteX3" fmla="*/ 2686050 w 3048000"/>
-              <a:gd name="connsiteY3" fmla="*/ 0 h 2968234"/>
-              <a:gd name="connsiteX4" fmla="*/ 2881288 w 3048000"/>
-              <a:gd name="connsiteY4" fmla="*/ 728638 h 2968234"/>
-              <a:gd name="connsiteX5" fmla="*/ 3048000 w 3048000"/>
-              <a:gd name="connsiteY5" fmla="*/ 1817492 h 2968234"/>
-              <a:gd name="connsiteX6" fmla="*/ 0 w 3048000"/>
-              <a:gd name="connsiteY6" fmla="*/ 1817492 h 2968234"/>
-              <a:gd name="connsiteX7" fmla="*/ 0 w 3048000"/>
-              <a:gd name="connsiteY7" fmla="*/ 1284092 h 2968234"/>
-              <a:gd name="connsiteX0" fmla="*/ 664381 w 2881288"/>
-              <a:gd name="connsiteY0" fmla="*/ 2968234 h 2968234"/>
-              <a:gd name="connsiteX1" fmla="*/ 2188381 w 2881288"/>
-              <a:gd name="connsiteY1" fmla="*/ 328588 h 2968234"/>
-              <a:gd name="connsiteX2" fmla="*/ 1957412 w 2881288"/>
-              <a:gd name="connsiteY2" fmla="*/ 195238 h 2968234"/>
-              <a:gd name="connsiteX3" fmla="*/ 2686050 w 2881288"/>
-              <a:gd name="connsiteY3" fmla="*/ 0 h 2968234"/>
-              <a:gd name="connsiteX4" fmla="*/ 2881288 w 2881288"/>
-              <a:gd name="connsiteY4" fmla="*/ 728638 h 2968234"/>
-              <a:gd name="connsiteX5" fmla="*/ 2650319 w 2881288"/>
-              <a:gd name="connsiteY5" fmla="*/ 595288 h 2968234"/>
-              <a:gd name="connsiteX6" fmla="*/ 0 w 2881288"/>
-              <a:gd name="connsiteY6" fmla="*/ 1817492 h 2968234"/>
-              <a:gd name="connsiteX7" fmla="*/ 0 w 2881288"/>
-              <a:gd name="connsiteY7" fmla="*/ 1284092 h 2968234"/>
-              <a:gd name="connsiteX0" fmla="*/ 664381 w 2881288"/>
-              <a:gd name="connsiteY0" fmla="*/ 2968234 h 3234934"/>
-              <a:gd name="connsiteX1" fmla="*/ 2188381 w 2881288"/>
-              <a:gd name="connsiteY1" fmla="*/ 328588 h 3234934"/>
-              <a:gd name="connsiteX2" fmla="*/ 1957412 w 2881288"/>
-              <a:gd name="connsiteY2" fmla="*/ 195238 h 3234934"/>
-              <a:gd name="connsiteX3" fmla="*/ 2686050 w 2881288"/>
-              <a:gd name="connsiteY3" fmla="*/ 0 h 3234934"/>
-              <a:gd name="connsiteX4" fmla="*/ 2881288 w 2881288"/>
-              <a:gd name="connsiteY4" fmla="*/ 728638 h 3234934"/>
-              <a:gd name="connsiteX5" fmla="*/ 2650319 w 2881288"/>
-              <a:gd name="connsiteY5" fmla="*/ 595288 h 3234934"/>
-              <a:gd name="connsiteX6" fmla="*/ 1126319 w 2881288"/>
-              <a:gd name="connsiteY6" fmla="*/ 3234934 h 3234934"/>
-              <a:gd name="connsiteX7" fmla="*/ 0 w 2881288"/>
-              <a:gd name="connsiteY7" fmla="*/ 1284092 h 3234934"/>
-              <a:gd name="connsiteX0" fmla="*/ 0 w 2216907"/>
-              <a:gd name="connsiteY0" fmla="*/ 2968234 h 3234934"/>
-              <a:gd name="connsiteX1" fmla="*/ 1524000 w 2216907"/>
-              <a:gd name="connsiteY1" fmla="*/ 328588 h 3234934"/>
-              <a:gd name="connsiteX2" fmla="*/ 1293031 w 2216907"/>
-              <a:gd name="connsiteY2" fmla="*/ 195238 h 3234934"/>
-              <a:gd name="connsiteX3" fmla="*/ 2021669 w 2216907"/>
-              <a:gd name="connsiteY3" fmla="*/ 0 h 3234934"/>
-              <a:gd name="connsiteX4" fmla="*/ 2216907 w 2216907"/>
-              <a:gd name="connsiteY4" fmla="*/ 728638 h 3234934"/>
-              <a:gd name="connsiteX5" fmla="*/ 1985938 w 2216907"/>
-              <a:gd name="connsiteY5" fmla="*/ 595288 h 3234934"/>
-              <a:gd name="connsiteX6" fmla="*/ 461938 w 2216907"/>
-              <a:gd name="connsiteY6" fmla="*/ 3234934 h 3234934"/>
-              <a:gd name="connsiteX7" fmla="*/ 0 w 2216907"/>
-              <a:gd name="connsiteY7" fmla="*/ 2968234 h 3234934"/>
-            </a:gdLst>
-            <a:ahLst/>
-            <a:cxnLst>
-              <a:cxn ang="0">
-                <a:pos x="connsiteX0" y="connsiteY0"/>
-              </a:cxn>
-              <a:cxn ang="0">
-                <a:pos x="connsiteX1" y="connsiteY1"/>
-              </a:cxn>
-              <a:cxn ang="0">
-                <a:pos x="connsiteX2" y="connsiteY2"/>
-              </a:cxn>
-              <a:cxn ang="0">
-                <a:pos x="connsiteX3" y="connsiteY3"/>
-              </a:cxn>
-              <a:cxn ang="0">
-                <a:pos x="connsiteX4" y="connsiteY4"/>
-              </a:cxn>
-              <a:cxn ang="0">
-                <a:pos x="connsiteX5" y="connsiteY5"/>
-              </a:cxn>
-              <a:cxn ang="0">
-                <a:pos x="connsiteX6" y="connsiteY6"/>
-              </a:cxn>
-              <a:cxn ang="0">
-                <a:pos x="connsiteX7" y="connsiteY7"/>
-              </a:cxn>
-            </a:cxnLst>
-            <a:rect l="l" t="t" r="r" b="b"/>
-            <a:pathLst>
-              <a:path w="2216907" h="3234934">
-                <a:moveTo>
-                  <a:pt x="0" y="2968234"/>
-                </a:moveTo>
-                <a:lnTo>
-                  <a:pt x="1524000" y="328588"/>
-                </a:lnTo>
-                <a:lnTo>
-                  <a:pt x="1293031" y="195238"/>
-                </a:lnTo>
-                <a:lnTo>
-                  <a:pt x="2021669" y="0"/>
-                </a:lnTo>
-                <a:lnTo>
-                  <a:pt x="2216907" y="728638"/>
-                </a:lnTo>
-                <a:lnTo>
-                  <a:pt x="1985938" y="595288"/>
-                </a:lnTo>
-                <a:lnTo>
-                  <a:pt x="461938" y="3234934"/>
-                </a:lnTo>
-                <a:lnTo>
-                  <a:pt x="0" y="2968234"/>
-                </a:lnTo>
-                <a:close/>
-              </a:path>
-            </a:pathLst>
-          </a:custGeom>
+          </a:prstGeom>
         </p:spPr>
         <p:style>
           <a:lnRef idx="2">
@@ -20539,136 +17281,13 @@
           <p:nvPr/>
         </p:nvSpPr>
         <p:spPr>
-          <a:xfrm>
-            <a:off x="3439552" y="2032875"/>
-            <a:ext cx="2121971" cy="2179084"/>
+          <a:xfrm rot="18672083">
+            <a:off x="3719487" y="2579492"/>
+            <a:ext cx="1828800" cy="1219200"/>
           </a:xfrm>
-          <a:custGeom>
+          <a:prstGeom prst="rect">
             <a:avLst/>
-            <a:gdLst>
-              <a:gd name="connsiteX0" fmla="*/ 0 w 1828800"/>
-              <a:gd name="connsiteY0" fmla="*/ 0 h 1219200"/>
-              <a:gd name="connsiteX1" fmla="*/ 1828800 w 1828800"/>
-              <a:gd name="connsiteY1" fmla="*/ 0 h 1219200"/>
-              <a:gd name="connsiteX2" fmla="*/ 1828800 w 1828800"/>
-              <a:gd name="connsiteY2" fmla="*/ 1219200 h 1219200"/>
-              <a:gd name="connsiteX3" fmla="*/ 0 w 1828800"/>
-              <a:gd name="connsiteY3" fmla="*/ 1219200 h 1219200"/>
-              <a:gd name="connsiteX4" fmla="*/ 0 w 1828800"/>
-              <a:gd name="connsiteY4" fmla="*/ 0 h 1219200"/>
-              <a:gd name="connsiteX0" fmla="*/ 1975386 w 3804186"/>
-              <a:gd name="connsiteY0" fmla="*/ 3604142 h 4823342"/>
-              <a:gd name="connsiteX1" fmla="*/ 0 w 3804186"/>
-              <a:gd name="connsiteY1" fmla="*/ 0 h 4823342"/>
-              <a:gd name="connsiteX2" fmla="*/ 3804186 w 3804186"/>
-              <a:gd name="connsiteY2" fmla="*/ 3604142 h 4823342"/>
-              <a:gd name="connsiteX3" fmla="*/ 3804186 w 3804186"/>
-              <a:gd name="connsiteY3" fmla="*/ 4823342 h 4823342"/>
-              <a:gd name="connsiteX4" fmla="*/ 1975386 w 3804186"/>
-              <a:gd name="connsiteY4" fmla="*/ 4823342 h 4823342"/>
-              <a:gd name="connsiteX5" fmla="*/ 1975386 w 3804186"/>
-              <a:gd name="connsiteY5" fmla="*/ 3604142 h 4823342"/>
-              <a:gd name="connsiteX0" fmla="*/ 0 w 1828800"/>
-              <a:gd name="connsiteY0" fmla="*/ 0 h 1219200"/>
-              <a:gd name="connsiteX1" fmla="*/ 1828800 w 1828800"/>
-              <a:gd name="connsiteY1" fmla="*/ 0 h 1219200"/>
-              <a:gd name="connsiteX2" fmla="*/ 1828800 w 1828800"/>
-              <a:gd name="connsiteY2" fmla="*/ 1219200 h 1219200"/>
-              <a:gd name="connsiteX3" fmla="*/ 0 w 1828800"/>
-              <a:gd name="connsiteY3" fmla="*/ 1219200 h 1219200"/>
-              <a:gd name="connsiteX4" fmla="*/ 0 w 1828800"/>
-              <a:gd name="connsiteY4" fmla="*/ 0 h 1219200"/>
-              <a:gd name="connsiteX0" fmla="*/ 0 w 1975385"/>
-              <a:gd name="connsiteY0" fmla="*/ 896045 h 1219200"/>
-              <a:gd name="connsiteX1" fmla="*/ 1975385 w 1975385"/>
-              <a:gd name="connsiteY1" fmla="*/ 0 h 1219200"/>
-              <a:gd name="connsiteX2" fmla="*/ 1975385 w 1975385"/>
-              <a:gd name="connsiteY2" fmla="*/ 1219200 h 1219200"/>
-              <a:gd name="connsiteX3" fmla="*/ 146585 w 1975385"/>
-              <a:gd name="connsiteY3" fmla="*/ 1219200 h 1219200"/>
-              <a:gd name="connsiteX4" fmla="*/ 146585 w 1975385"/>
-              <a:gd name="connsiteY4" fmla="*/ 0 h 1219200"/>
-              <a:gd name="connsiteX0" fmla="*/ 0 w 1975385"/>
-              <a:gd name="connsiteY0" fmla="*/ 1375987 h 1699142"/>
-              <a:gd name="connsiteX1" fmla="*/ 1204646 w 1975385"/>
-              <a:gd name="connsiteY1" fmla="*/ 0 h 1699142"/>
-              <a:gd name="connsiteX2" fmla="*/ 1975385 w 1975385"/>
-              <a:gd name="connsiteY2" fmla="*/ 1699142 h 1699142"/>
-              <a:gd name="connsiteX3" fmla="*/ 146585 w 1975385"/>
-              <a:gd name="connsiteY3" fmla="*/ 1699142 h 1699142"/>
-              <a:gd name="connsiteX4" fmla="*/ 146585 w 1975385"/>
-              <a:gd name="connsiteY4" fmla="*/ 479942 h 1699142"/>
-              <a:gd name="connsiteX0" fmla="*/ 0 w 2121971"/>
-              <a:gd name="connsiteY0" fmla="*/ 1375987 h 1699142"/>
-              <a:gd name="connsiteX1" fmla="*/ 1204646 w 2121971"/>
-              <a:gd name="connsiteY1" fmla="*/ 0 h 1699142"/>
-              <a:gd name="connsiteX2" fmla="*/ 2121971 w 2121971"/>
-              <a:gd name="connsiteY2" fmla="*/ 803097 h 1699142"/>
-              <a:gd name="connsiteX3" fmla="*/ 146585 w 2121971"/>
-              <a:gd name="connsiteY3" fmla="*/ 1699142 h 1699142"/>
-              <a:gd name="connsiteX4" fmla="*/ 146585 w 2121971"/>
-              <a:gd name="connsiteY4" fmla="*/ 479942 h 1699142"/>
-              <a:gd name="connsiteX0" fmla="*/ 0 w 2121971"/>
-              <a:gd name="connsiteY0" fmla="*/ 1375987 h 2179084"/>
-              <a:gd name="connsiteX1" fmla="*/ 1204646 w 2121971"/>
-              <a:gd name="connsiteY1" fmla="*/ 0 h 2179084"/>
-              <a:gd name="connsiteX2" fmla="*/ 2121971 w 2121971"/>
-              <a:gd name="connsiteY2" fmla="*/ 803097 h 2179084"/>
-              <a:gd name="connsiteX3" fmla="*/ 917326 w 2121971"/>
-              <a:gd name="connsiteY3" fmla="*/ 2179084 h 2179084"/>
-              <a:gd name="connsiteX4" fmla="*/ 146585 w 2121971"/>
-              <a:gd name="connsiteY4" fmla="*/ 479942 h 2179084"/>
-              <a:gd name="connsiteX0" fmla="*/ 0 w 2121971"/>
-              <a:gd name="connsiteY0" fmla="*/ 1375987 h 2179084"/>
-              <a:gd name="connsiteX1" fmla="*/ 1204646 w 2121971"/>
-              <a:gd name="connsiteY1" fmla="*/ 0 h 2179084"/>
-              <a:gd name="connsiteX2" fmla="*/ 2121971 w 2121971"/>
-              <a:gd name="connsiteY2" fmla="*/ 803097 h 2179084"/>
-              <a:gd name="connsiteX3" fmla="*/ 917326 w 2121971"/>
-              <a:gd name="connsiteY3" fmla="*/ 2179084 h 2179084"/>
-              <a:gd name="connsiteX4" fmla="*/ 1 w 2121971"/>
-              <a:gd name="connsiteY4" fmla="*/ 1375987 h 2179084"/>
-            </a:gdLst>
-            <a:ahLst/>
-            <a:cxnLst>
-              <a:cxn ang="0">
-                <a:pos x="connsiteX0" y="connsiteY0"/>
-              </a:cxn>
-              <a:cxn ang="0">
-                <a:pos x="connsiteX1" y="connsiteY1"/>
-              </a:cxn>
-              <a:cxn ang="0">
-                <a:pos x="connsiteX2" y="connsiteY2"/>
-              </a:cxn>
-              <a:cxn ang="0">
-                <a:pos x="connsiteX3" y="connsiteY3"/>
-              </a:cxn>
-              <a:cxn ang="0">
-                <a:pos x="connsiteX4" y="connsiteY4"/>
-              </a:cxn>
-            </a:cxnLst>
-            <a:rect l="l" t="t" r="r" b="b"/>
-            <a:pathLst>
-              <a:path w="2121971" h="2179084">
-                <a:moveTo>
-                  <a:pt x="0" y="1375987"/>
-                </a:moveTo>
-                <a:lnTo>
-                  <a:pt x="1204646" y="0"/>
-                </a:lnTo>
-                <a:lnTo>
-                  <a:pt x="2121971" y="803097"/>
-                </a:lnTo>
-                <a:lnTo>
-                  <a:pt x="917326" y="2179084"/>
-                </a:lnTo>
-                <a:lnTo>
-                  <a:pt x="1" y="1375987"/>
-                </a:lnTo>
-                <a:close/>
-              </a:path>
-            </a:pathLst>
-          </a:custGeom>
+          </a:prstGeom>
         </p:spPr>
         <p:style>
           <a:lnRef idx="2">
@@ -20698,7 +17317,7 @@
     </p:spTree>
     <p:extLst>
       <p:ext uri="{BB962C8B-B14F-4D97-AF65-F5344CB8AC3E}">
-        <p14:creationId xmlns:p14="http://schemas.microsoft.com/office/powerpoint/2010/main" val="320981893"/>
+        <p14:creationId xmlns:p14="http://schemas.microsoft.com/office/powerpoint/2010/main" val="1091288708"/>
       </p:ext>
     </p:extLst>
   </p:cSld>

</xml_diff>